<commit_message>
updated hackathon presentation with naiive
</commit_message>
<xml_diff>
--- a/Hackathon Presentation.pptx
+++ b/Hackathon Presentation.pptx
@@ -8,6 +8,8 @@
     <p:sldId id="258" r:id="rId2"/>
     <p:sldId id="256" r:id="rId3"/>
     <p:sldId id="257" r:id="rId4"/>
+    <p:sldId id="259" r:id="rId5"/>
+    <p:sldId id="260" r:id="rId6"/>
   </p:sldIdLst>
   <p:sldSz cx="12192000" cy="6858000"/>
   <p:notesSz cx="6858000" cy="9144000"/>
@@ -3842,6 +3844,379 @@
     <p:extLst>
       <p:ext uri="{BB962C8B-B14F-4D97-AF65-F5344CB8AC3E}">
         <p14:creationId xmlns:p14="http://schemas.microsoft.com/office/powerpoint/2010/main" val="2066331840"/>
+      </p:ext>
+    </p:extLst>
+  </p:cSld>
+  <p:clrMapOvr>
+    <a:masterClrMapping/>
+  </p:clrMapOvr>
+</p:sld>
+</file>
+
+<file path=ppt/slides/slide4.xml><?xml version="1.0" encoding="utf-8"?>
+<p:sld xmlns:a="http://schemas.openxmlformats.org/drawingml/2006/main" xmlns:r="http://schemas.openxmlformats.org/officeDocument/2006/relationships" xmlns:p="http://schemas.openxmlformats.org/presentationml/2006/main">
+  <p:cSld>
+    <p:spTree>
+      <p:nvGrpSpPr>
+        <p:cNvPr id="1" name=""/>
+        <p:cNvGrpSpPr/>
+        <p:nvPr/>
+      </p:nvGrpSpPr>
+      <p:grpSpPr>
+        <a:xfrm>
+          <a:off x="0" y="0"/>
+          <a:ext cx="0" cy="0"/>
+          <a:chOff x="0" y="0"/>
+          <a:chExt cx="0" cy="0"/>
+        </a:xfrm>
+      </p:grpSpPr>
+      <p:sp>
+        <p:nvSpPr>
+          <p:cNvPr id="2" name="Title 1">
+            <a:extLst>
+              <a:ext uri="{FF2B5EF4-FFF2-40B4-BE49-F238E27FC236}">
+                <a16:creationId xmlns:a16="http://schemas.microsoft.com/office/drawing/2014/main" id="{F07483F7-F105-EE9E-F945-2F2CB35CB47D}"/>
+              </a:ext>
+            </a:extLst>
+          </p:cNvPr>
+          <p:cNvSpPr>
+            <a:spLocks noGrp="1"/>
+          </p:cNvSpPr>
+          <p:nvPr>
+            <p:ph type="title"/>
+          </p:nvPr>
+        </p:nvSpPr>
+        <p:spPr/>
+        <p:txBody>
+          <a:bodyPr/>
+          <a:lstStyle/>
+          <a:p>
+            <a:endParaRPr lang="en-US"/>
+          </a:p>
+        </p:txBody>
+      </p:sp>
+      <p:sp>
+        <p:nvSpPr>
+          <p:cNvPr id="3" name="Content Placeholder 2">
+            <a:extLst>
+              <a:ext uri="{FF2B5EF4-FFF2-40B4-BE49-F238E27FC236}">
+                <a16:creationId xmlns:a16="http://schemas.microsoft.com/office/drawing/2014/main" id="{33A656DA-C422-EF35-BC3F-B165CA0927E0}"/>
+              </a:ext>
+            </a:extLst>
+          </p:cNvPr>
+          <p:cNvSpPr>
+            <a:spLocks noGrp="1"/>
+          </p:cNvSpPr>
+          <p:nvPr>
+            <p:ph idx="1"/>
+          </p:nvPr>
+        </p:nvSpPr>
+        <p:spPr/>
+        <p:txBody>
+          <a:bodyPr>
+            <a:normAutofit/>
+          </a:bodyPr>
+          <a:lstStyle/>
+          <a:p>
+            <a:pPr marL="0" indent="0">
+              <a:buNone/>
+            </a:pPr>
+            <a:r>
+              <a:rPr lang="en-US" dirty="0"/>
+              <a:t>Similar to wilderness1.wav:</a:t>
+            </a:r>
+          </a:p>
+          <a:p>
+            <a:pPr marL="0" indent="0">
+              <a:buNone/>
+            </a:pPr>
+            <a:r>
+              <a:rPr lang="en-US" dirty="0"/>
+              <a:t>wilderness1.wav: 1</a:t>
+            </a:r>
+          </a:p>
+          <a:p>
+            <a:pPr marL="0" indent="0">
+              <a:buNone/>
+            </a:pPr>
+            <a:r>
+              <a:rPr lang="en-US" dirty="0"/>
+              <a:t>wilderness2.wav: 0.7229432647124682</a:t>
+            </a:r>
+          </a:p>
+          <a:p>
+            <a:pPr marL="0" indent="0">
+              <a:buNone/>
+            </a:pPr>
+            <a:endParaRPr lang="en-US" dirty="0"/>
+          </a:p>
+          <a:p>
+            <a:pPr marL="0" indent="0">
+              <a:buNone/>
+            </a:pPr>
+            <a:r>
+              <a:rPr lang="en-US" dirty="0"/>
+              <a:t>jesus2.wav: 0.3134769071964211</a:t>
+            </a:r>
+          </a:p>
+          <a:p>
+            <a:pPr marL="0" indent="0">
+              <a:buNone/>
+            </a:pPr>
+            <a:r>
+              <a:rPr lang="en-US" dirty="0"/>
+              <a:t>God1.wav: 0.23680512842732715</a:t>
+            </a:r>
+          </a:p>
+          <a:p>
+            <a:pPr marL="0" indent="0">
+              <a:buNone/>
+            </a:pPr>
+            <a:r>
+              <a:rPr lang="en-US" dirty="0"/>
+              <a:t>jesus1.wav: 0.21231795463558845</a:t>
+            </a:r>
+          </a:p>
+          <a:p>
+            <a:pPr marL="0" indent="0">
+              <a:buNone/>
+            </a:pPr>
+            <a:r>
+              <a:rPr lang="en-US" dirty="0"/>
+              <a:t>God2.wav: 0.1635381466180469 </a:t>
+            </a:r>
+          </a:p>
+        </p:txBody>
+      </p:sp>
+    </p:spTree>
+    <p:extLst>
+      <p:ext uri="{BB962C8B-B14F-4D97-AF65-F5344CB8AC3E}">
+        <p14:creationId xmlns:p14="http://schemas.microsoft.com/office/powerpoint/2010/main" val="2692368703"/>
+      </p:ext>
+    </p:extLst>
+  </p:cSld>
+  <p:clrMapOvr>
+    <a:masterClrMapping/>
+  </p:clrMapOvr>
+</p:sld>
+</file>
+
+<file path=ppt/slides/slide5.xml><?xml version="1.0" encoding="utf-8"?>
+<p:sld xmlns:a="http://schemas.openxmlformats.org/drawingml/2006/main" xmlns:r="http://schemas.openxmlformats.org/officeDocument/2006/relationships" xmlns:p="http://schemas.openxmlformats.org/presentationml/2006/main">
+  <p:cSld>
+    <p:spTree>
+      <p:nvGrpSpPr>
+        <p:cNvPr id="1" name="">
+          <a:extLst>
+            <a:ext uri="{FF2B5EF4-FFF2-40B4-BE49-F238E27FC236}">
+              <a16:creationId xmlns:a16="http://schemas.microsoft.com/office/drawing/2014/main" id="{A89F8F60-84E6-3ED5-2959-E206DD4A2A50}"/>
+            </a:ext>
+          </a:extLst>
+        </p:cNvPr>
+        <p:cNvGrpSpPr/>
+        <p:nvPr/>
+      </p:nvGrpSpPr>
+      <p:grpSpPr>
+        <a:xfrm>
+          <a:off x="0" y="0"/>
+          <a:ext cx="0" cy="0"/>
+          <a:chOff x="0" y="0"/>
+          <a:chExt cx="0" cy="0"/>
+        </a:xfrm>
+      </p:grpSpPr>
+      <p:sp>
+        <p:nvSpPr>
+          <p:cNvPr id="2" name="Title 1">
+            <a:extLst>
+              <a:ext uri="{FF2B5EF4-FFF2-40B4-BE49-F238E27FC236}">
+                <a16:creationId xmlns:a16="http://schemas.microsoft.com/office/drawing/2014/main" id="{FD185580-4369-A629-C6F8-8A11F1D22E3C}"/>
+              </a:ext>
+            </a:extLst>
+          </p:cNvPr>
+          <p:cNvSpPr>
+            <a:spLocks noGrp="1"/>
+          </p:cNvSpPr>
+          <p:nvPr>
+            <p:ph type="title"/>
+          </p:nvPr>
+        </p:nvSpPr>
+        <p:spPr/>
+        <p:txBody>
+          <a:bodyPr/>
+          <a:lstStyle/>
+          <a:p>
+            <a:endParaRPr lang="en-US"/>
+          </a:p>
+        </p:txBody>
+      </p:sp>
+      <p:sp>
+        <p:nvSpPr>
+          <p:cNvPr id="3" name="Content Placeholder 2">
+            <a:extLst>
+              <a:ext uri="{FF2B5EF4-FFF2-40B4-BE49-F238E27FC236}">
+                <a16:creationId xmlns:a16="http://schemas.microsoft.com/office/drawing/2014/main" id="{30306755-292D-D24C-E837-78CA4B505359}"/>
+              </a:ext>
+            </a:extLst>
+          </p:cNvPr>
+          <p:cNvSpPr>
+            <a:spLocks noGrp="1"/>
+          </p:cNvSpPr>
+          <p:nvPr>
+            <p:ph idx="1"/>
+          </p:nvPr>
+        </p:nvSpPr>
+        <p:spPr/>
+        <p:txBody>
+          <a:bodyPr>
+            <a:normAutofit fontScale="55000" lnSpcReduction="20000"/>
+          </a:bodyPr>
+          <a:lstStyle/>
+          <a:p>
+            <a:pPr marL="0" indent="0">
+              <a:buNone/>
+            </a:pPr>
+            <a:r>
+              <a:rPr lang="en-US" dirty="0"/>
+              <a:t>We can compare to an off-the-shelf solution (`</a:t>
+            </a:r>
+            <a:r>
+              <a:rPr lang="en-US" dirty="0" err="1"/>
+              <a:t>librosa</a:t>
+            </a:r>
+            <a:r>
+              <a:rPr lang="en-US" dirty="0"/>
+              <a:t>` </a:t>
+            </a:r>
+            <a:r>
+              <a:rPr lang="en-US" dirty="0" err="1"/>
+              <a:t>mfcc</a:t>
+            </a:r>
+            <a:r>
+              <a:rPr lang="en-US" dirty="0"/>
+              <a:t> feature extraction):</a:t>
+            </a:r>
+          </a:p>
+          <a:p>
+            <a:pPr marL="0" indent="0">
+              <a:buNone/>
+            </a:pPr>
+            <a:r>
+              <a:rPr lang="en-US" dirty="0"/>
+              <a:t>This solution correctly identifies the correct forms, but it does not detect as much difference between the incorrect forms.</a:t>
+            </a:r>
+          </a:p>
+          <a:p>
+            <a:pPr marL="0" indent="0">
+              <a:buNone/>
+            </a:pPr>
+            <a:r>
+              <a:rPr lang="en-US" dirty="0"/>
+              <a:t>For keyword checking, it might be helpful to have a meaningful measure of how different the words are:</a:t>
+            </a:r>
+          </a:p>
+          <a:p>
+            <a:pPr marL="0" indent="0">
+              <a:buNone/>
+            </a:pPr>
+            <a:endParaRPr lang="en-US" dirty="0"/>
+          </a:p>
+          <a:p>
+            <a:pPr marL="0" indent="0">
+              <a:buNone/>
+            </a:pPr>
+            <a:r>
+              <a:rPr lang="en-US" dirty="0"/>
+              <a:t>Similar to wilderness1.wav:</a:t>
+            </a:r>
+          </a:p>
+          <a:p>
+            <a:pPr marL="0" indent="0">
+              <a:buNone/>
+            </a:pPr>
+            <a:r>
+              <a:rPr lang="en-US" dirty="0"/>
+              <a:t>wilderness1.wav: 0.9999999869496023</a:t>
+            </a:r>
+          </a:p>
+          <a:p>
+            <a:pPr marL="0" indent="0">
+              <a:buNone/>
+            </a:pPr>
+            <a:r>
+              <a:rPr lang="en-US" dirty="0"/>
+              <a:t>wilderness2.wav</a:t>
+            </a:r>
+            <a:r>
+              <a:rPr lang="en-US"/>
+              <a:t>: 0.9993146675340262</a:t>
+            </a:r>
+          </a:p>
+          <a:p>
+            <a:pPr marL="0" indent="0">
+              <a:buNone/>
+            </a:pPr>
+            <a:endParaRPr lang="en-US" dirty="0"/>
+          </a:p>
+          <a:p>
+            <a:pPr marL="0" indent="0">
+              <a:buNone/>
+            </a:pPr>
+            <a:r>
+              <a:rPr lang="en-US" dirty="0"/>
+              <a:t>God1.wav: 0.9987559253705995</a:t>
+            </a:r>
+          </a:p>
+          <a:p>
+            <a:pPr marL="0" indent="0">
+              <a:buNone/>
+            </a:pPr>
+            <a:r>
+              <a:rPr lang="en-US" dirty="0"/>
+              <a:t>God2.wav: 0.9980986833151937</a:t>
+            </a:r>
+          </a:p>
+          <a:p>
+            <a:pPr marL="0" indent="0">
+              <a:buNone/>
+            </a:pPr>
+            <a:r>
+              <a:rPr lang="en-US" dirty="0"/>
+              <a:t>inTheBeginning1.wav: 0.9971207291637255</a:t>
+            </a:r>
+          </a:p>
+          <a:p>
+            <a:pPr marL="0" indent="0">
+              <a:buNone/>
+            </a:pPr>
+            <a:r>
+              <a:rPr lang="en-US" dirty="0"/>
+              <a:t>inTheBeginning2.wav: 0.9969806586039947</a:t>
+            </a:r>
+          </a:p>
+          <a:p>
+            <a:pPr marL="0" indent="0">
+              <a:buNone/>
+            </a:pPr>
+            <a:r>
+              <a:rPr lang="en-US" dirty="0"/>
+              <a:t>jesus2.wav: 0.9958133114595762</a:t>
+            </a:r>
+          </a:p>
+          <a:p>
+            <a:pPr marL="0" indent="0">
+              <a:buNone/>
+            </a:pPr>
+            <a:r>
+              <a:rPr lang="en-US" dirty="0"/>
+              <a:t>jesus1.wav: 0.9942425674771389</a:t>
+            </a:r>
+          </a:p>
+        </p:txBody>
+      </p:sp>
+    </p:spTree>
+    <p:extLst>
+      <p:ext uri="{BB962C8B-B14F-4D97-AF65-F5344CB8AC3E}">
+        <p14:creationId xmlns:p14="http://schemas.microsoft.com/office/powerpoint/2010/main" val="3215222808"/>
       </p:ext>
     </p:extLst>
   </p:cSld>

</xml_diff>

<commit_message>
all alternate solutions + host working
</commit_message>
<xml_diff>
--- a/Hackathon Presentation.pptx
+++ b/Hackathon Presentation.pptx
@@ -12,8 +12,8 @@
     <p:sldId id="256" r:id="rId6"/>
     <p:sldId id="262" r:id="rId7"/>
     <p:sldId id="257" r:id="rId8"/>
-    <p:sldId id="259" r:id="rId9"/>
-    <p:sldId id="260" r:id="rId10"/>
+    <p:sldId id="260" r:id="rId9"/>
+    <p:sldId id="259" r:id="rId10"/>
     <p:sldId id="265" r:id="rId11"/>
   </p:sldIdLst>
   <p:sldSz cx="12192000" cy="6858000"/>
@@ -5028,157 +5028,6 @@
   <p:cSld>
     <p:spTree>
       <p:nvGrpSpPr>
-        <p:cNvPr id="1" name=""/>
-        <p:cNvGrpSpPr/>
-        <p:nvPr/>
-      </p:nvGrpSpPr>
-      <p:grpSpPr>
-        <a:xfrm>
-          <a:off x="0" y="0"/>
-          <a:ext cx="0" cy="0"/>
-          <a:chOff x="0" y="0"/>
-          <a:chExt cx="0" cy="0"/>
-        </a:xfrm>
-      </p:grpSpPr>
-      <p:sp>
-        <p:nvSpPr>
-          <p:cNvPr id="2" name="Title 1">
-            <a:extLst>
-              <a:ext uri="{FF2B5EF4-FFF2-40B4-BE49-F238E27FC236}">
-                <a16:creationId xmlns:a16="http://schemas.microsoft.com/office/drawing/2014/main" id="{F07483F7-F105-EE9E-F945-2F2CB35CB47D}"/>
-              </a:ext>
-            </a:extLst>
-          </p:cNvPr>
-          <p:cNvSpPr>
-            <a:spLocks noGrp="1"/>
-          </p:cNvSpPr>
-          <p:nvPr>
-            <p:ph type="title"/>
-          </p:nvPr>
-        </p:nvSpPr>
-        <p:spPr/>
-        <p:txBody>
-          <a:bodyPr/>
-          <a:lstStyle/>
-          <a:p>
-            <a:r>
-              <a:rPr lang="en-US"/>
-              <a:t>Report:</a:t>
-            </a:r>
-          </a:p>
-        </p:txBody>
-      </p:sp>
-      <p:sp>
-        <p:nvSpPr>
-          <p:cNvPr id="3" name="Content Placeholder 2">
-            <a:extLst>
-              <a:ext uri="{FF2B5EF4-FFF2-40B4-BE49-F238E27FC236}">
-                <a16:creationId xmlns:a16="http://schemas.microsoft.com/office/drawing/2014/main" id="{33A656DA-C422-EF35-BC3F-B165CA0927E0}"/>
-              </a:ext>
-            </a:extLst>
-          </p:cNvPr>
-          <p:cNvSpPr>
-            <a:spLocks noGrp="1"/>
-          </p:cNvSpPr>
-          <p:nvPr>
-            <p:ph idx="1"/>
-          </p:nvPr>
-        </p:nvSpPr>
-        <p:spPr/>
-        <p:txBody>
-          <a:bodyPr>
-            <a:normAutofit/>
-          </a:bodyPr>
-          <a:lstStyle/>
-          <a:p>
-            <a:pPr marL="0" indent="0">
-              <a:buNone/>
-            </a:pPr>
-            <a:r>
-              <a:rPr lang="en-US" dirty="0"/>
-              <a:t>Similar to wilderness1.wav:</a:t>
-            </a:r>
-          </a:p>
-          <a:p>
-            <a:pPr marL="0" indent="0">
-              <a:buNone/>
-            </a:pPr>
-            <a:r>
-              <a:rPr lang="en-US" dirty="0"/>
-              <a:t>wilderness1.wav: 1</a:t>
-            </a:r>
-          </a:p>
-          <a:p>
-            <a:pPr marL="0" indent="0">
-              <a:buNone/>
-            </a:pPr>
-            <a:r>
-              <a:rPr lang="en-US" dirty="0"/>
-              <a:t>wilderness2.wav: 0.7229432647124682</a:t>
-            </a:r>
-          </a:p>
-          <a:p>
-            <a:pPr marL="0" indent="0">
-              <a:buNone/>
-            </a:pPr>
-            <a:endParaRPr lang="en-US" dirty="0"/>
-          </a:p>
-          <a:p>
-            <a:pPr marL="0" indent="0">
-              <a:buNone/>
-            </a:pPr>
-            <a:r>
-              <a:rPr lang="en-US" dirty="0"/>
-              <a:t>jesus2.wav: 0.3134769071964211</a:t>
-            </a:r>
-          </a:p>
-          <a:p>
-            <a:pPr marL="0" indent="0">
-              <a:buNone/>
-            </a:pPr>
-            <a:r>
-              <a:rPr lang="en-US" dirty="0"/>
-              <a:t>God1.wav: 0.23680512842732715</a:t>
-            </a:r>
-          </a:p>
-          <a:p>
-            <a:pPr marL="0" indent="0">
-              <a:buNone/>
-            </a:pPr>
-            <a:r>
-              <a:rPr lang="en-US" dirty="0"/>
-              <a:t>jesus1.wav: 0.21231795463558845</a:t>
-            </a:r>
-          </a:p>
-          <a:p>
-            <a:pPr marL="0" indent="0">
-              <a:buNone/>
-            </a:pPr>
-            <a:r>
-              <a:rPr lang="en-US" dirty="0"/>
-              <a:t>God2.wav: 0.1635381466180469 </a:t>
-            </a:r>
-          </a:p>
-        </p:txBody>
-      </p:sp>
-    </p:spTree>
-    <p:extLst>
-      <p:ext uri="{BB962C8B-B14F-4D97-AF65-F5344CB8AC3E}">
-        <p14:creationId xmlns:p14="http://schemas.microsoft.com/office/powerpoint/2010/main" val="2692368703"/>
-      </p:ext>
-    </p:extLst>
-  </p:cSld>
-  <p:clrMapOvr>
-    <a:masterClrMapping/>
-  </p:clrMapOvr>
-</p:sld>
-</file>
-
-<file path=ppt/slides/slide9.xml><?xml version="1.0" encoding="utf-8"?>
-<p:sld xmlns:a="http://schemas.openxmlformats.org/drawingml/2006/main" xmlns:r="http://schemas.openxmlformats.org/officeDocument/2006/relationships" xmlns:p="http://schemas.openxmlformats.org/presentationml/2006/main">
-  <p:cSld>
-    <p:spTree>
-      <p:nvGrpSpPr>
         <p:cNvPr id="1" name="">
           <a:extLst>
             <a:ext uri="{FF2B5EF4-FFF2-40B4-BE49-F238E27FC236}">
@@ -5244,7 +5093,7 @@
         <p:spPr/>
         <p:txBody>
           <a:bodyPr>
-            <a:normAutofit fontScale="55000" lnSpcReduction="20000"/>
+            <a:normAutofit fontScale="47500" lnSpcReduction="20000"/>
           </a:bodyPr>
           <a:lstStyle/>
           <a:p>
@@ -5301,6 +5150,22 @@
               <a:buNone/>
             </a:pPr>
             <a:r>
+              <a:rPr lang="en-US"/>
+              <a:t>No clustering!</a:t>
+            </a:r>
+            <a:endParaRPr lang="en-US" dirty="0"/>
+          </a:p>
+          <a:p>
+            <a:pPr marL="0" indent="0">
+              <a:buNone/>
+            </a:pPr>
+            <a:endParaRPr lang="en-US" dirty="0"/>
+          </a:p>
+          <a:p>
+            <a:pPr marL="0" indent="0">
+              <a:buNone/>
+            </a:pPr>
+            <a:r>
               <a:rPr lang="en-US" dirty="0"/>
               <a:t>Similar to wilderness1.wav:</a:t>
             </a:r>
@@ -5320,11 +5185,7 @@
             </a:pPr>
             <a:r>
               <a:rPr lang="en-US" dirty="0"/>
-              <a:t>wilderness2.wav</a:t>
-            </a:r>
-            <a:r>
-              <a:rPr lang="en-US"/>
-              <a:t>: 0.9993146675340262</a:t>
+              <a:t>wilderness2.wav: 0.9993146675340262</a:t>
             </a:r>
           </a:p>
           <a:p>
@@ -5393,6 +5254,157 @@
     <p:extLst>
       <p:ext uri="{BB962C8B-B14F-4D97-AF65-F5344CB8AC3E}">
         <p14:creationId xmlns:p14="http://schemas.microsoft.com/office/powerpoint/2010/main" val="3215222808"/>
+      </p:ext>
+    </p:extLst>
+  </p:cSld>
+  <p:clrMapOvr>
+    <a:masterClrMapping/>
+  </p:clrMapOvr>
+</p:sld>
+</file>
+
+<file path=ppt/slides/slide9.xml><?xml version="1.0" encoding="utf-8"?>
+<p:sld xmlns:a="http://schemas.openxmlformats.org/drawingml/2006/main" xmlns:r="http://schemas.openxmlformats.org/officeDocument/2006/relationships" xmlns:p="http://schemas.openxmlformats.org/presentationml/2006/main">
+  <p:cSld>
+    <p:spTree>
+      <p:nvGrpSpPr>
+        <p:cNvPr id="1" name=""/>
+        <p:cNvGrpSpPr/>
+        <p:nvPr/>
+      </p:nvGrpSpPr>
+      <p:grpSpPr>
+        <a:xfrm>
+          <a:off x="0" y="0"/>
+          <a:ext cx="0" cy="0"/>
+          <a:chOff x="0" y="0"/>
+          <a:chExt cx="0" cy="0"/>
+        </a:xfrm>
+      </p:grpSpPr>
+      <p:sp>
+        <p:nvSpPr>
+          <p:cNvPr id="2" name="Title 1">
+            <a:extLst>
+              <a:ext uri="{FF2B5EF4-FFF2-40B4-BE49-F238E27FC236}">
+                <a16:creationId xmlns:a16="http://schemas.microsoft.com/office/drawing/2014/main" id="{F07483F7-F105-EE9E-F945-2F2CB35CB47D}"/>
+              </a:ext>
+            </a:extLst>
+          </p:cNvPr>
+          <p:cNvSpPr>
+            <a:spLocks noGrp="1"/>
+          </p:cNvSpPr>
+          <p:nvPr>
+            <p:ph type="title"/>
+          </p:nvPr>
+        </p:nvSpPr>
+        <p:spPr/>
+        <p:txBody>
+          <a:bodyPr/>
+          <a:lstStyle/>
+          <a:p>
+            <a:r>
+              <a:rPr lang="en-US"/>
+              <a:t>Report:</a:t>
+            </a:r>
+          </a:p>
+        </p:txBody>
+      </p:sp>
+      <p:sp>
+        <p:nvSpPr>
+          <p:cNvPr id="3" name="Content Placeholder 2">
+            <a:extLst>
+              <a:ext uri="{FF2B5EF4-FFF2-40B4-BE49-F238E27FC236}">
+                <a16:creationId xmlns:a16="http://schemas.microsoft.com/office/drawing/2014/main" id="{33A656DA-C422-EF35-BC3F-B165CA0927E0}"/>
+              </a:ext>
+            </a:extLst>
+          </p:cNvPr>
+          <p:cNvSpPr>
+            <a:spLocks noGrp="1"/>
+          </p:cNvSpPr>
+          <p:nvPr>
+            <p:ph idx="1"/>
+          </p:nvPr>
+        </p:nvSpPr>
+        <p:spPr/>
+        <p:txBody>
+          <a:bodyPr>
+            <a:normAutofit/>
+          </a:bodyPr>
+          <a:lstStyle/>
+          <a:p>
+            <a:pPr marL="0" indent="0">
+              <a:buNone/>
+            </a:pPr>
+            <a:r>
+              <a:rPr lang="en-US" dirty="0"/>
+              <a:t>Similar to wilderness1.wav:</a:t>
+            </a:r>
+          </a:p>
+          <a:p>
+            <a:pPr marL="0" indent="0">
+              <a:buNone/>
+            </a:pPr>
+            <a:r>
+              <a:rPr lang="en-US" dirty="0"/>
+              <a:t>wilderness1.wav: 1</a:t>
+            </a:r>
+          </a:p>
+          <a:p>
+            <a:pPr marL="0" indent="0">
+              <a:buNone/>
+            </a:pPr>
+            <a:r>
+              <a:rPr lang="en-US" dirty="0"/>
+              <a:t>wilderness2.wav: 0.7229432647124682</a:t>
+            </a:r>
+          </a:p>
+          <a:p>
+            <a:pPr marL="0" indent="0">
+              <a:buNone/>
+            </a:pPr>
+            <a:endParaRPr lang="en-US" dirty="0"/>
+          </a:p>
+          <a:p>
+            <a:pPr marL="0" indent="0">
+              <a:buNone/>
+            </a:pPr>
+            <a:r>
+              <a:rPr lang="en-US" dirty="0"/>
+              <a:t>jesus2.wav: 0.3134769071964211</a:t>
+            </a:r>
+          </a:p>
+          <a:p>
+            <a:pPr marL="0" indent="0">
+              <a:buNone/>
+            </a:pPr>
+            <a:r>
+              <a:rPr lang="en-US" dirty="0"/>
+              <a:t>God1.wav: 0.23680512842732715</a:t>
+            </a:r>
+          </a:p>
+          <a:p>
+            <a:pPr marL="0" indent="0">
+              <a:buNone/>
+            </a:pPr>
+            <a:r>
+              <a:rPr lang="en-US" dirty="0"/>
+              <a:t>jesus1.wav: 0.21231795463558845</a:t>
+            </a:r>
+          </a:p>
+          <a:p>
+            <a:pPr marL="0" indent="0">
+              <a:buNone/>
+            </a:pPr>
+            <a:r>
+              <a:rPr lang="en-US" dirty="0"/>
+              <a:t>God2.wav: 0.1635381466180469 </a:t>
+            </a:r>
+          </a:p>
+        </p:txBody>
+      </p:sp>
+    </p:spTree>
+    <p:extLst>
+      <p:ext uri="{BB962C8B-B14F-4D97-AF65-F5344CB8AC3E}">
+        <p14:creationId xmlns:p14="http://schemas.microsoft.com/office/powerpoint/2010/main" val="2692368703"/>
       </p:ext>
     </p:extLst>
   </p:cSld>

</xml_diff>

<commit_message>
working with 20 MFCC
</commit_message>
<xml_diff>
--- a/Hackathon Presentation.pptx
+++ b/Hackathon Presentation.pptx
@@ -2,21 +2,25 @@
 <file path=ppt/presentation.xml><?xml version="1.0" encoding="utf-8"?>
 <p:presentation xmlns:a="http://schemas.openxmlformats.org/drawingml/2006/main" xmlns:r="http://schemas.openxmlformats.org/officeDocument/2006/relationships" xmlns:p="http://schemas.openxmlformats.org/presentationml/2006/main" saveSubsetFonts="1">
   <p:sldMasterIdLst>
-    <p:sldMasterId id="2147483648" r:id="rId1"/>
+    <p:sldMasterId id="2147483690" r:id="rId1"/>
   </p:sldMasterIdLst>
   <p:sldIdLst>
     <p:sldId id="258" r:id="rId2"/>
-    <p:sldId id="263" r:id="rId3"/>
-    <p:sldId id="261" r:id="rId4"/>
-    <p:sldId id="264" r:id="rId5"/>
-    <p:sldId id="267" r:id="rId6"/>
-    <p:sldId id="256" r:id="rId7"/>
-    <p:sldId id="262" r:id="rId8"/>
-    <p:sldId id="257" r:id="rId9"/>
-    <p:sldId id="260" r:id="rId10"/>
-    <p:sldId id="259" r:id="rId11"/>
-    <p:sldId id="265" r:id="rId12"/>
-    <p:sldId id="266" r:id="rId13"/>
+    <p:sldId id="271" r:id="rId3"/>
+    <p:sldId id="263" r:id="rId4"/>
+    <p:sldId id="261" r:id="rId5"/>
+    <p:sldId id="264" r:id="rId6"/>
+    <p:sldId id="267" r:id="rId7"/>
+    <p:sldId id="256" r:id="rId8"/>
+    <p:sldId id="262" r:id="rId9"/>
+    <p:sldId id="257" r:id="rId10"/>
+    <p:sldId id="268" r:id="rId11"/>
+    <p:sldId id="260" r:id="rId12"/>
+    <p:sldId id="259" r:id="rId13"/>
+    <p:sldId id="265" r:id="rId14"/>
+    <p:sldId id="266" r:id="rId15"/>
+    <p:sldId id="269" r:id="rId16"/>
+    <p:sldId id="270" r:id="rId17"/>
   </p:sldIdLst>
   <p:sldSz cx="12192000" cy="6858000"/>
   <p:notesSz cx="6858000" cy="9144000"/>
@@ -24,7 +28,7 @@
     <a:defPPr>
       <a:defRPr lang="en-US"/>
     </a:defPPr>
-    <a:lvl1pPr marL="0" algn="l" defTabSz="914400" rtl="0" eaLnBrk="1" latinLnBrk="0" hangingPunct="1">
+    <a:lvl1pPr marL="0" algn="l" defTabSz="457200" rtl="0" eaLnBrk="1" latinLnBrk="0" hangingPunct="1">
       <a:defRPr sz="1800" kern="1200">
         <a:solidFill>
           <a:schemeClr val="tx1"/>
@@ -34,7 +38,7 @@
         <a:cs typeface="+mn-cs"/>
       </a:defRPr>
     </a:lvl1pPr>
-    <a:lvl2pPr marL="457200" algn="l" defTabSz="914400" rtl="0" eaLnBrk="1" latinLnBrk="0" hangingPunct="1">
+    <a:lvl2pPr marL="457200" algn="l" defTabSz="457200" rtl="0" eaLnBrk="1" latinLnBrk="0" hangingPunct="1">
       <a:defRPr sz="1800" kern="1200">
         <a:solidFill>
           <a:schemeClr val="tx1"/>
@@ -44,7 +48,7 @@
         <a:cs typeface="+mn-cs"/>
       </a:defRPr>
     </a:lvl2pPr>
-    <a:lvl3pPr marL="914400" algn="l" defTabSz="914400" rtl="0" eaLnBrk="1" latinLnBrk="0" hangingPunct="1">
+    <a:lvl3pPr marL="914400" algn="l" defTabSz="457200" rtl="0" eaLnBrk="1" latinLnBrk="0" hangingPunct="1">
       <a:defRPr sz="1800" kern="1200">
         <a:solidFill>
           <a:schemeClr val="tx1"/>
@@ -54,7 +58,7 @@
         <a:cs typeface="+mn-cs"/>
       </a:defRPr>
     </a:lvl3pPr>
-    <a:lvl4pPr marL="1371600" algn="l" defTabSz="914400" rtl="0" eaLnBrk="1" latinLnBrk="0" hangingPunct="1">
+    <a:lvl4pPr marL="1371600" algn="l" defTabSz="457200" rtl="0" eaLnBrk="1" latinLnBrk="0" hangingPunct="1">
       <a:defRPr sz="1800" kern="1200">
         <a:solidFill>
           <a:schemeClr val="tx1"/>
@@ -64,7 +68,7 @@
         <a:cs typeface="+mn-cs"/>
       </a:defRPr>
     </a:lvl4pPr>
-    <a:lvl5pPr marL="1828800" algn="l" defTabSz="914400" rtl="0" eaLnBrk="1" latinLnBrk="0" hangingPunct="1">
+    <a:lvl5pPr marL="1828800" algn="l" defTabSz="457200" rtl="0" eaLnBrk="1" latinLnBrk="0" hangingPunct="1">
       <a:defRPr sz="1800" kern="1200">
         <a:solidFill>
           <a:schemeClr val="tx1"/>
@@ -74,7 +78,7 @@
         <a:cs typeface="+mn-cs"/>
       </a:defRPr>
     </a:lvl5pPr>
-    <a:lvl6pPr marL="2286000" algn="l" defTabSz="914400" rtl="0" eaLnBrk="1" latinLnBrk="0" hangingPunct="1">
+    <a:lvl6pPr marL="2286000" algn="l" defTabSz="457200" rtl="0" eaLnBrk="1" latinLnBrk="0" hangingPunct="1">
       <a:defRPr sz="1800" kern="1200">
         <a:solidFill>
           <a:schemeClr val="tx1"/>
@@ -84,7 +88,7 @@
         <a:cs typeface="+mn-cs"/>
       </a:defRPr>
     </a:lvl6pPr>
-    <a:lvl7pPr marL="2743200" algn="l" defTabSz="914400" rtl="0" eaLnBrk="1" latinLnBrk="0" hangingPunct="1">
+    <a:lvl7pPr marL="2743200" algn="l" defTabSz="457200" rtl="0" eaLnBrk="1" latinLnBrk="0" hangingPunct="1">
       <a:defRPr sz="1800" kern="1200">
         <a:solidFill>
           <a:schemeClr val="tx1"/>
@@ -94,7 +98,7 @@
         <a:cs typeface="+mn-cs"/>
       </a:defRPr>
     </a:lvl7pPr>
-    <a:lvl8pPr marL="3200400" algn="l" defTabSz="914400" rtl="0" eaLnBrk="1" latinLnBrk="0" hangingPunct="1">
+    <a:lvl8pPr marL="3200400" algn="l" defTabSz="457200" rtl="0" eaLnBrk="1" latinLnBrk="0" hangingPunct="1">
       <a:defRPr sz="1800" kern="1200">
         <a:solidFill>
           <a:schemeClr val="tx1"/>
@@ -104,7 +108,7 @@
         <a:cs typeface="+mn-cs"/>
       </a:defRPr>
     </a:lvl8pPr>
-    <a:lvl9pPr marL="3657600" algn="l" defTabSz="914400" rtl="0" eaLnBrk="1" latinLnBrk="0" hangingPunct="1">
+    <a:lvl9pPr marL="3657600" algn="l" defTabSz="457200" rtl="0" eaLnBrk="1" latinLnBrk="0" hangingPunct="1">
       <a:defRPr sz="1800" kern="1200">
         <a:solidFill>
           <a:schemeClr val="tx1"/>
@@ -142,13 +146,7 @@
       </p:grpSpPr>
       <p:sp>
         <p:nvSpPr>
-          <p:cNvPr id="2" name="Title 1">
-            <a:extLst>
-              <a:ext uri="{FF2B5EF4-FFF2-40B4-BE49-F238E27FC236}">
-                <a16:creationId xmlns:a16="http://schemas.microsoft.com/office/drawing/2014/main" id="{8B1439CA-DEC6-3879-99B5-16A5C357BDBE}"/>
-              </a:ext>
-            </a:extLst>
-          </p:cNvPr>
+          <p:cNvPr id="2" name="Title 1"/>
           <p:cNvSpPr>
             <a:spLocks noGrp="1"/>
           </p:cNvSpPr>
@@ -174,18 +172,13 @@
               <a:rPr lang="en-US"/>
               <a:t>Click to edit Master title style</a:t>
             </a:r>
-          </a:p>
-        </p:txBody>
-      </p:sp>
-      <p:sp>
-        <p:nvSpPr>
-          <p:cNvPr id="3" name="Subtitle 2">
-            <a:extLst>
-              <a:ext uri="{FF2B5EF4-FFF2-40B4-BE49-F238E27FC236}">
-                <a16:creationId xmlns:a16="http://schemas.microsoft.com/office/drawing/2014/main" id="{B71EC5CA-7D56-A8E4-8CFC-88ACE780ABCF}"/>
-              </a:ext>
-            </a:extLst>
-          </p:cNvPr>
+            <a:endParaRPr lang="en-US" dirty="0"/>
+          </a:p>
+        </p:txBody>
+      </p:sp>
+      <p:sp>
+        <p:nvSpPr>
+          <p:cNvPr id="3" name="Subtitle 2"/>
           <p:cNvSpPr>
             <a:spLocks noGrp="1"/>
           </p:cNvSpPr>
@@ -244,18 +237,13 @@
               <a:rPr lang="en-US"/>
               <a:t>Click to edit Master subtitle style</a:t>
             </a:r>
-          </a:p>
-        </p:txBody>
-      </p:sp>
-      <p:sp>
-        <p:nvSpPr>
-          <p:cNvPr id="4" name="Date Placeholder 3">
-            <a:extLst>
-              <a:ext uri="{FF2B5EF4-FFF2-40B4-BE49-F238E27FC236}">
-                <a16:creationId xmlns:a16="http://schemas.microsoft.com/office/drawing/2014/main" id="{3C97BA2D-4342-5826-3867-59C7FD733472}"/>
-              </a:ext>
-            </a:extLst>
-          </p:cNvPr>
+            <a:endParaRPr lang="en-US" dirty="0"/>
+          </a:p>
+        </p:txBody>
+      </p:sp>
+      <p:sp>
+        <p:nvSpPr>
+          <p:cNvPr id="4" name="Date Placeholder 3"/>
           <p:cNvSpPr>
             <a:spLocks noGrp="1"/>
           </p:cNvSpPr>
@@ -278,13 +266,7 @@
       </p:sp>
       <p:sp>
         <p:nvSpPr>
-          <p:cNvPr id="5" name="Footer Placeholder 4">
-            <a:extLst>
-              <a:ext uri="{FF2B5EF4-FFF2-40B4-BE49-F238E27FC236}">
-                <a16:creationId xmlns:a16="http://schemas.microsoft.com/office/drawing/2014/main" id="{6E5152A6-B992-5E13-A265-9A2D9B7E4F34}"/>
-              </a:ext>
-            </a:extLst>
-          </p:cNvPr>
+          <p:cNvPr id="5" name="Footer Placeholder 4"/>
           <p:cNvSpPr>
             <a:spLocks noGrp="1"/>
           </p:cNvSpPr>
@@ -303,13 +285,7 @@
       </p:sp>
       <p:sp>
         <p:nvSpPr>
-          <p:cNvPr id="6" name="Slide Number Placeholder 5">
-            <a:extLst>
-              <a:ext uri="{FF2B5EF4-FFF2-40B4-BE49-F238E27FC236}">
-                <a16:creationId xmlns:a16="http://schemas.microsoft.com/office/drawing/2014/main" id="{22445D78-DB4B-DA51-7E42-FE9D195BC967}"/>
-              </a:ext>
-            </a:extLst>
-          </p:cNvPr>
+          <p:cNvPr id="6" name="Slide Number Placeholder 5"/>
           <p:cNvSpPr>
             <a:spLocks noGrp="1"/>
           </p:cNvSpPr>
@@ -333,7 +309,7 @@
     </p:spTree>
     <p:extLst>
       <p:ext uri="{BB962C8B-B14F-4D97-AF65-F5344CB8AC3E}">
-        <p14:creationId xmlns:p14="http://schemas.microsoft.com/office/powerpoint/2010/main" val="3025534297"/>
+        <p14:creationId xmlns:p14="http://schemas.microsoft.com/office/powerpoint/2010/main" val="177779842"/>
       </p:ext>
     </p:extLst>
   </p:cSld>
@@ -362,13 +338,7 @@
       </p:grpSpPr>
       <p:sp>
         <p:nvSpPr>
-          <p:cNvPr id="2" name="Title 1">
-            <a:extLst>
-              <a:ext uri="{FF2B5EF4-FFF2-40B4-BE49-F238E27FC236}">
-                <a16:creationId xmlns:a16="http://schemas.microsoft.com/office/drawing/2014/main" id="{3D302463-4C9C-9B1A-876E-6422F7D003BA}"/>
-              </a:ext>
-            </a:extLst>
-          </p:cNvPr>
+          <p:cNvPr id="2" name="Title 1"/>
           <p:cNvSpPr>
             <a:spLocks noGrp="1"/>
           </p:cNvSpPr>
@@ -385,18 +355,13 @@
               <a:rPr lang="en-US"/>
               <a:t>Click to edit Master title style</a:t>
             </a:r>
-          </a:p>
-        </p:txBody>
-      </p:sp>
-      <p:sp>
-        <p:nvSpPr>
-          <p:cNvPr id="3" name="Vertical Text Placeholder 2">
-            <a:extLst>
-              <a:ext uri="{FF2B5EF4-FFF2-40B4-BE49-F238E27FC236}">
-                <a16:creationId xmlns:a16="http://schemas.microsoft.com/office/drawing/2014/main" id="{8710993C-6E29-F07C-559B-A1A545D02E23}"/>
-              </a:ext>
-            </a:extLst>
-          </p:cNvPr>
+            <a:endParaRPr lang="en-US" dirty="0"/>
+          </a:p>
+        </p:txBody>
+      </p:sp>
+      <p:sp>
+        <p:nvSpPr>
+          <p:cNvPr id="3" name="Vertical Text Placeholder 2"/>
           <p:cNvSpPr>
             <a:spLocks noGrp="1"/>
           </p:cNvSpPr>
@@ -442,18 +407,13 @@
               <a:rPr lang="en-US"/>
               <a:t>Fifth level</a:t>
             </a:r>
-          </a:p>
-        </p:txBody>
-      </p:sp>
-      <p:sp>
-        <p:nvSpPr>
-          <p:cNvPr id="4" name="Date Placeholder 3">
-            <a:extLst>
-              <a:ext uri="{FF2B5EF4-FFF2-40B4-BE49-F238E27FC236}">
-                <a16:creationId xmlns:a16="http://schemas.microsoft.com/office/drawing/2014/main" id="{B10EDE01-E1D6-F1A6-E13C-C85C19CA7608}"/>
-              </a:ext>
-            </a:extLst>
-          </p:cNvPr>
+            <a:endParaRPr lang="en-US" dirty="0"/>
+          </a:p>
+        </p:txBody>
+      </p:sp>
+      <p:sp>
+        <p:nvSpPr>
+          <p:cNvPr id="4" name="Date Placeholder 3"/>
           <p:cNvSpPr>
             <a:spLocks noGrp="1"/>
           </p:cNvSpPr>
@@ -476,13 +436,7 @@
       </p:sp>
       <p:sp>
         <p:nvSpPr>
-          <p:cNvPr id="5" name="Footer Placeholder 4">
-            <a:extLst>
-              <a:ext uri="{FF2B5EF4-FFF2-40B4-BE49-F238E27FC236}">
-                <a16:creationId xmlns:a16="http://schemas.microsoft.com/office/drawing/2014/main" id="{FD195C8C-D729-E986-846E-E4D0B4F0E011}"/>
-              </a:ext>
-            </a:extLst>
-          </p:cNvPr>
+          <p:cNvPr id="5" name="Footer Placeholder 4"/>
           <p:cNvSpPr>
             <a:spLocks noGrp="1"/>
           </p:cNvSpPr>
@@ -501,13 +455,7 @@
       </p:sp>
       <p:sp>
         <p:nvSpPr>
-          <p:cNvPr id="6" name="Slide Number Placeholder 5">
-            <a:extLst>
-              <a:ext uri="{FF2B5EF4-FFF2-40B4-BE49-F238E27FC236}">
-                <a16:creationId xmlns:a16="http://schemas.microsoft.com/office/drawing/2014/main" id="{E96EE259-55B8-F2D8-83C1-7C4A5EC3989C}"/>
-              </a:ext>
-            </a:extLst>
-          </p:cNvPr>
+          <p:cNvPr id="6" name="Slide Number Placeholder 5"/>
           <p:cNvSpPr>
             <a:spLocks noGrp="1"/>
           </p:cNvSpPr>
@@ -531,7 +479,7 @@
     </p:spTree>
     <p:extLst>
       <p:ext uri="{BB962C8B-B14F-4D97-AF65-F5344CB8AC3E}">
-        <p14:creationId xmlns:p14="http://schemas.microsoft.com/office/powerpoint/2010/main" val="2113525367"/>
+        <p14:creationId xmlns:p14="http://schemas.microsoft.com/office/powerpoint/2010/main" val="2424141819"/>
       </p:ext>
     </p:extLst>
   </p:cSld>
@@ -560,13 +508,7 @@
       </p:grpSpPr>
       <p:sp>
         <p:nvSpPr>
-          <p:cNvPr id="2" name="Vertical Title 1">
-            <a:extLst>
-              <a:ext uri="{FF2B5EF4-FFF2-40B4-BE49-F238E27FC236}">
-                <a16:creationId xmlns:a16="http://schemas.microsoft.com/office/drawing/2014/main" id="{BE4E191F-212C-0853-B726-31901BD1CF5F}"/>
-              </a:ext>
-            </a:extLst>
-          </p:cNvPr>
+          <p:cNvPr id="2" name="Vertical Title 1"/>
           <p:cNvSpPr>
             <a:spLocks noGrp="1"/>
           </p:cNvSpPr>
@@ -588,18 +530,13 @@
               <a:rPr lang="en-US"/>
               <a:t>Click to edit Master title style</a:t>
             </a:r>
-          </a:p>
-        </p:txBody>
-      </p:sp>
-      <p:sp>
-        <p:nvSpPr>
-          <p:cNvPr id="3" name="Vertical Text Placeholder 2">
-            <a:extLst>
-              <a:ext uri="{FF2B5EF4-FFF2-40B4-BE49-F238E27FC236}">
-                <a16:creationId xmlns:a16="http://schemas.microsoft.com/office/drawing/2014/main" id="{0BD7B1BA-2908-2B70-AB01-A7E59DEF872D}"/>
-              </a:ext>
-            </a:extLst>
-          </p:cNvPr>
+            <a:endParaRPr lang="en-US" dirty="0"/>
+          </a:p>
+        </p:txBody>
+      </p:sp>
+      <p:sp>
+        <p:nvSpPr>
+          <p:cNvPr id="3" name="Vertical Text Placeholder 2"/>
           <p:cNvSpPr>
             <a:spLocks noGrp="1"/>
           </p:cNvSpPr>
@@ -650,18 +587,13 @@
               <a:rPr lang="en-US"/>
               <a:t>Fifth level</a:t>
             </a:r>
-          </a:p>
-        </p:txBody>
-      </p:sp>
-      <p:sp>
-        <p:nvSpPr>
-          <p:cNvPr id="4" name="Date Placeholder 3">
-            <a:extLst>
-              <a:ext uri="{FF2B5EF4-FFF2-40B4-BE49-F238E27FC236}">
-                <a16:creationId xmlns:a16="http://schemas.microsoft.com/office/drawing/2014/main" id="{AE7E7964-2631-642D-CE06-C814D0FF02EB}"/>
-              </a:ext>
-            </a:extLst>
-          </p:cNvPr>
+            <a:endParaRPr lang="en-US" dirty="0"/>
+          </a:p>
+        </p:txBody>
+      </p:sp>
+      <p:sp>
+        <p:nvSpPr>
+          <p:cNvPr id="4" name="Date Placeholder 3"/>
           <p:cNvSpPr>
             <a:spLocks noGrp="1"/>
           </p:cNvSpPr>
@@ -684,13 +616,7 @@
       </p:sp>
       <p:sp>
         <p:nvSpPr>
-          <p:cNvPr id="5" name="Footer Placeholder 4">
-            <a:extLst>
-              <a:ext uri="{FF2B5EF4-FFF2-40B4-BE49-F238E27FC236}">
-                <a16:creationId xmlns:a16="http://schemas.microsoft.com/office/drawing/2014/main" id="{6644626A-D67C-7637-E64D-67674DF239AD}"/>
-              </a:ext>
-            </a:extLst>
-          </p:cNvPr>
+          <p:cNvPr id="5" name="Footer Placeholder 4"/>
           <p:cNvSpPr>
             <a:spLocks noGrp="1"/>
           </p:cNvSpPr>
@@ -709,13 +635,7 @@
       </p:sp>
       <p:sp>
         <p:nvSpPr>
-          <p:cNvPr id="6" name="Slide Number Placeholder 5">
-            <a:extLst>
-              <a:ext uri="{FF2B5EF4-FFF2-40B4-BE49-F238E27FC236}">
-                <a16:creationId xmlns:a16="http://schemas.microsoft.com/office/drawing/2014/main" id="{7E28EC5E-0E96-6079-FAF8-9AB1D2FCC389}"/>
-              </a:ext>
-            </a:extLst>
-          </p:cNvPr>
+          <p:cNvPr id="6" name="Slide Number Placeholder 5"/>
           <p:cNvSpPr>
             <a:spLocks noGrp="1"/>
           </p:cNvSpPr>
@@ -739,7 +659,7 @@
     </p:spTree>
     <p:extLst>
       <p:ext uri="{BB962C8B-B14F-4D97-AF65-F5344CB8AC3E}">
-        <p14:creationId xmlns:p14="http://schemas.microsoft.com/office/powerpoint/2010/main" val="3353869218"/>
+        <p14:creationId xmlns:p14="http://schemas.microsoft.com/office/powerpoint/2010/main" val="1057250654"/>
       </p:ext>
     </p:extLst>
   </p:cSld>
@@ -768,13 +688,7 @@
       </p:grpSpPr>
       <p:sp>
         <p:nvSpPr>
-          <p:cNvPr id="2" name="Title 1">
-            <a:extLst>
-              <a:ext uri="{FF2B5EF4-FFF2-40B4-BE49-F238E27FC236}">
-                <a16:creationId xmlns:a16="http://schemas.microsoft.com/office/drawing/2014/main" id="{54BDCCB5-B140-228E-B008-047C0ED58273}"/>
-              </a:ext>
-            </a:extLst>
-          </p:cNvPr>
+          <p:cNvPr id="2" name="Title 1"/>
           <p:cNvSpPr>
             <a:spLocks noGrp="1"/>
           </p:cNvSpPr>
@@ -791,18 +705,13 @@
               <a:rPr lang="en-US"/>
               <a:t>Click to edit Master title style</a:t>
             </a:r>
-          </a:p>
-        </p:txBody>
-      </p:sp>
-      <p:sp>
-        <p:nvSpPr>
-          <p:cNvPr id="3" name="Content Placeholder 2">
-            <a:extLst>
-              <a:ext uri="{FF2B5EF4-FFF2-40B4-BE49-F238E27FC236}">
-                <a16:creationId xmlns:a16="http://schemas.microsoft.com/office/drawing/2014/main" id="{94598F8D-A9FA-D946-8AE5-56A94B8E09F9}"/>
-              </a:ext>
-            </a:extLst>
-          </p:cNvPr>
+            <a:endParaRPr lang="en-US" dirty="0"/>
+          </a:p>
+        </p:txBody>
+      </p:sp>
+      <p:sp>
+        <p:nvSpPr>
+          <p:cNvPr id="3" name="Content Placeholder 2"/>
           <p:cNvSpPr>
             <a:spLocks noGrp="1"/>
           </p:cNvSpPr>
@@ -848,18 +757,13 @@
               <a:rPr lang="en-US"/>
               <a:t>Fifth level</a:t>
             </a:r>
-          </a:p>
-        </p:txBody>
-      </p:sp>
-      <p:sp>
-        <p:nvSpPr>
-          <p:cNvPr id="4" name="Date Placeholder 3">
-            <a:extLst>
-              <a:ext uri="{FF2B5EF4-FFF2-40B4-BE49-F238E27FC236}">
-                <a16:creationId xmlns:a16="http://schemas.microsoft.com/office/drawing/2014/main" id="{74BB9EF6-3ADF-5040-EB53-A62C92249FAC}"/>
-              </a:ext>
-            </a:extLst>
-          </p:cNvPr>
+            <a:endParaRPr lang="en-US" dirty="0"/>
+          </a:p>
+        </p:txBody>
+      </p:sp>
+      <p:sp>
+        <p:nvSpPr>
+          <p:cNvPr id="4" name="Date Placeholder 3"/>
           <p:cNvSpPr>
             <a:spLocks noGrp="1"/>
           </p:cNvSpPr>
@@ -882,13 +786,7 @@
       </p:sp>
       <p:sp>
         <p:nvSpPr>
-          <p:cNvPr id="5" name="Footer Placeholder 4">
-            <a:extLst>
-              <a:ext uri="{FF2B5EF4-FFF2-40B4-BE49-F238E27FC236}">
-                <a16:creationId xmlns:a16="http://schemas.microsoft.com/office/drawing/2014/main" id="{3197EAF0-9015-035C-947F-2AFCD5D3260E}"/>
-              </a:ext>
-            </a:extLst>
-          </p:cNvPr>
+          <p:cNvPr id="5" name="Footer Placeholder 4"/>
           <p:cNvSpPr>
             <a:spLocks noGrp="1"/>
           </p:cNvSpPr>
@@ -907,13 +805,7 @@
       </p:sp>
       <p:sp>
         <p:nvSpPr>
-          <p:cNvPr id="6" name="Slide Number Placeholder 5">
-            <a:extLst>
-              <a:ext uri="{FF2B5EF4-FFF2-40B4-BE49-F238E27FC236}">
-                <a16:creationId xmlns:a16="http://schemas.microsoft.com/office/drawing/2014/main" id="{793EA16D-7090-7A0E-7A9A-0837B0B698DA}"/>
-              </a:ext>
-            </a:extLst>
-          </p:cNvPr>
+          <p:cNvPr id="6" name="Slide Number Placeholder 5"/>
           <p:cNvSpPr>
             <a:spLocks noGrp="1"/>
           </p:cNvSpPr>
@@ -937,7 +829,7 @@
     </p:spTree>
     <p:extLst>
       <p:ext uri="{BB962C8B-B14F-4D97-AF65-F5344CB8AC3E}">
-        <p14:creationId xmlns:p14="http://schemas.microsoft.com/office/powerpoint/2010/main" val="528083252"/>
+        <p14:creationId xmlns:p14="http://schemas.microsoft.com/office/powerpoint/2010/main" val="1427400567"/>
       </p:ext>
     </p:extLst>
   </p:cSld>
@@ -966,13 +858,7 @@
       </p:grpSpPr>
       <p:sp>
         <p:nvSpPr>
-          <p:cNvPr id="2" name="Title 1">
-            <a:extLst>
-              <a:ext uri="{FF2B5EF4-FFF2-40B4-BE49-F238E27FC236}">
-                <a16:creationId xmlns:a16="http://schemas.microsoft.com/office/drawing/2014/main" id="{AA479FD8-311B-AC94-05FC-F0DD4784EDAF}"/>
-              </a:ext>
-            </a:extLst>
-          </p:cNvPr>
+          <p:cNvPr id="2" name="Title 1"/>
           <p:cNvSpPr>
             <a:spLocks noGrp="1"/>
           </p:cNvSpPr>
@@ -998,18 +884,13 @@
               <a:rPr lang="en-US"/>
               <a:t>Click to edit Master title style</a:t>
             </a:r>
-          </a:p>
-        </p:txBody>
-      </p:sp>
-      <p:sp>
-        <p:nvSpPr>
-          <p:cNvPr id="3" name="Text Placeholder 2">
-            <a:extLst>
-              <a:ext uri="{FF2B5EF4-FFF2-40B4-BE49-F238E27FC236}">
-                <a16:creationId xmlns:a16="http://schemas.microsoft.com/office/drawing/2014/main" id="{E985F50A-8C58-8271-BC3A-7C9890CF2E3E}"/>
-              </a:ext>
-            </a:extLst>
-          </p:cNvPr>
+            <a:endParaRPr lang="en-US" dirty="0"/>
+          </a:p>
+        </p:txBody>
+      </p:sp>
+      <p:sp>
+        <p:nvSpPr>
+          <p:cNvPr id="3" name="Text Placeholder 2"/>
           <p:cNvSpPr>
             <a:spLocks noGrp="1"/>
           </p:cNvSpPr>
@@ -1031,7 +912,7 @@
               <a:defRPr sz="2400">
                 <a:solidFill>
                   <a:schemeClr val="tx1">
-                    <a:tint val="82000"/>
+                    <a:shade val="82000"/>
                   </a:schemeClr>
                 </a:solidFill>
               </a:defRPr>
@@ -1041,7 +922,7 @@
               <a:defRPr sz="2000">
                 <a:solidFill>
                   <a:schemeClr val="tx1">
-                    <a:tint val="82000"/>
+                    <a:shade val="82000"/>
                   </a:schemeClr>
                 </a:solidFill>
               </a:defRPr>
@@ -1051,7 +932,7 @@
               <a:defRPr sz="1800">
                 <a:solidFill>
                   <a:schemeClr val="tx1">
-                    <a:tint val="82000"/>
+                    <a:shade val="82000"/>
                   </a:schemeClr>
                 </a:solidFill>
               </a:defRPr>
@@ -1061,7 +942,7 @@
               <a:defRPr sz="1600">
                 <a:solidFill>
                   <a:schemeClr val="tx1">
-                    <a:tint val="82000"/>
+                    <a:shade val="82000"/>
                   </a:schemeClr>
                 </a:solidFill>
               </a:defRPr>
@@ -1071,7 +952,7 @@
               <a:defRPr sz="1600">
                 <a:solidFill>
                   <a:schemeClr val="tx1">
-                    <a:tint val="82000"/>
+                    <a:shade val="82000"/>
                   </a:schemeClr>
                 </a:solidFill>
               </a:defRPr>
@@ -1081,7 +962,7 @@
               <a:defRPr sz="1600">
                 <a:solidFill>
                   <a:schemeClr val="tx1">
-                    <a:tint val="82000"/>
+                    <a:shade val="82000"/>
                   </a:schemeClr>
                 </a:solidFill>
               </a:defRPr>
@@ -1091,7 +972,7 @@
               <a:defRPr sz="1600">
                 <a:solidFill>
                   <a:schemeClr val="tx1">
-                    <a:tint val="82000"/>
+                    <a:shade val="82000"/>
                   </a:schemeClr>
                 </a:solidFill>
               </a:defRPr>
@@ -1101,7 +982,7 @@
               <a:defRPr sz="1600">
                 <a:solidFill>
                   <a:schemeClr val="tx1">
-                    <a:tint val="82000"/>
+                    <a:shade val="82000"/>
                   </a:schemeClr>
                 </a:solidFill>
               </a:defRPr>
@@ -1111,7 +992,7 @@
               <a:defRPr sz="1600">
                 <a:solidFill>
                   <a:schemeClr val="tx1">
-                    <a:tint val="82000"/>
+                    <a:shade val="82000"/>
                   </a:schemeClr>
                 </a:solidFill>
               </a:defRPr>
@@ -1128,13 +1009,7 @@
       </p:sp>
       <p:sp>
         <p:nvSpPr>
-          <p:cNvPr id="4" name="Date Placeholder 3">
-            <a:extLst>
-              <a:ext uri="{FF2B5EF4-FFF2-40B4-BE49-F238E27FC236}">
-                <a16:creationId xmlns:a16="http://schemas.microsoft.com/office/drawing/2014/main" id="{2AA93F9D-0037-1A7E-8A01-90211C0EACC7}"/>
-              </a:ext>
-            </a:extLst>
-          </p:cNvPr>
+          <p:cNvPr id="4" name="Date Placeholder 3"/>
           <p:cNvSpPr>
             <a:spLocks noGrp="1"/>
           </p:cNvSpPr>
@@ -1157,13 +1032,7 @@
       </p:sp>
       <p:sp>
         <p:nvSpPr>
-          <p:cNvPr id="5" name="Footer Placeholder 4">
-            <a:extLst>
-              <a:ext uri="{FF2B5EF4-FFF2-40B4-BE49-F238E27FC236}">
-                <a16:creationId xmlns:a16="http://schemas.microsoft.com/office/drawing/2014/main" id="{5D2C82A2-EDA3-D1EF-1E0E-CF4ADB99E001}"/>
-              </a:ext>
-            </a:extLst>
-          </p:cNvPr>
+          <p:cNvPr id="5" name="Footer Placeholder 4"/>
           <p:cNvSpPr>
             <a:spLocks noGrp="1"/>
           </p:cNvSpPr>
@@ -1182,13 +1051,7 @@
       </p:sp>
       <p:sp>
         <p:nvSpPr>
-          <p:cNvPr id="6" name="Slide Number Placeholder 5">
-            <a:extLst>
-              <a:ext uri="{FF2B5EF4-FFF2-40B4-BE49-F238E27FC236}">
-                <a16:creationId xmlns:a16="http://schemas.microsoft.com/office/drawing/2014/main" id="{80A6969F-F5D5-94BC-CE05-682E691FF1DF}"/>
-              </a:ext>
-            </a:extLst>
-          </p:cNvPr>
+          <p:cNvPr id="6" name="Slide Number Placeholder 5"/>
           <p:cNvSpPr>
             <a:spLocks noGrp="1"/>
           </p:cNvSpPr>
@@ -1212,7 +1075,7 @@
     </p:spTree>
     <p:extLst>
       <p:ext uri="{BB962C8B-B14F-4D97-AF65-F5344CB8AC3E}">
-        <p14:creationId xmlns:p14="http://schemas.microsoft.com/office/powerpoint/2010/main" val="151365885"/>
+        <p14:creationId xmlns:p14="http://schemas.microsoft.com/office/powerpoint/2010/main" val="3255432261"/>
       </p:ext>
     </p:extLst>
   </p:cSld>
@@ -1241,13 +1104,7 @@
       </p:grpSpPr>
       <p:sp>
         <p:nvSpPr>
-          <p:cNvPr id="2" name="Title 1">
-            <a:extLst>
-              <a:ext uri="{FF2B5EF4-FFF2-40B4-BE49-F238E27FC236}">
-                <a16:creationId xmlns:a16="http://schemas.microsoft.com/office/drawing/2014/main" id="{1C3DDE6E-AA03-C47A-499E-6861B88C8D20}"/>
-              </a:ext>
-            </a:extLst>
-          </p:cNvPr>
+          <p:cNvPr id="2" name="Title 1"/>
           <p:cNvSpPr>
             <a:spLocks noGrp="1"/>
           </p:cNvSpPr>
@@ -1264,18 +1121,13 @@
               <a:rPr lang="en-US"/>
               <a:t>Click to edit Master title style</a:t>
             </a:r>
-          </a:p>
-        </p:txBody>
-      </p:sp>
-      <p:sp>
-        <p:nvSpPr>
-          <p:cNvPr id="3" name="Content Placeholder 2">
-            <a:extLst>
-              <a:ext uri="{FF2B5EF4-FFF2-40B4-BE49-F238E27FC236}">
-                <a16:creationId xmlns:a16="http://schemas.microsoft.com/office/drawing/2014/main" id="{CC6C6539-F79A-D67E-5C69-ABBCBEFA43F5}"/>
-              </a:ext>
-            </a:extLst>
-          </p:cNvPr>
+            <a:endParaRPr lang="en-US" dirty="0"/>
+          </a:p>
+        </p:txBody>
+      </p:sp>
+      <p:sp>
+        <p:nvSpPr>
+          <p:cNvPr id="3" name="Content Placeholder 2"/>
           <p:cNvSpPr>
             <a:spLocks noGrp="1"/>
           </p:cNvSpPr>
@@ -1326,18 +1178,13 @@
               <a:rPr lang="en-US"/>
               <a:t>Fifth level</a:t>
             </a:r>
-          </a:p>
-        </p:txBody>
-      </p:sp>
-      <p:sp>
-        <p:nvSpPr>
-          <p:cNvPr id="4" name="Content Placeholder 3">
-            <a:extLst>
-              <a:ext uri="{FF2B5EF4-FFF2-40B4-BE49-F238E27FC236}">
-                <a16:creationId xmlns:a16="http://schemas.microsoft.com/office/drawing/2014/main" id="{1E20C9A7-F006-B117-9EF9-B64F06446A29}"/>
-              </a:ext>
-            </a:extLst>
-          </p:cNvPr>
+            <a:endParaRPr lang="en-US" dirty="0"/>
+          </a:p>
+        </p:txBody>
+      </p:sp>
+      <p:sp>
+        <p:nvSpPr>
+          <p:cNvPr id="4" name="Content Placeholder 3"/>
           <p:cNvSpPr>
             <a:spLocks noGrp="1"/>
           </p:cNvSpPr>
@@ -1388,18 +1235,13 @@
               <a:rPr lang="en-US"/>
               <a:t>Fifth level</a:t>
             </a:r>
-          </a:p>
-        </p:txBody>
-      </p:sp>
-      <p:sp>
-        <p:nvSpPr>
-          <p:cNvPr id="5" name="Date Placeholder 4">
-            <a:extLst>
-              <a:ext uri="{FF2B5EF4-FFF2-40B4-BE49-F238E27FC236}">
-                <a16:creationId xmlns:a16="http://schemas.microsoft.com/office/drawing/2014/main" id="{C6F0B025-065B-8574-D67E-14F211D9455A}"/>
-              </a:ext>
-            </a:extLst>
-          </p:cNvPr>
+            <a:endParaRPr lang="en-US" dirty="0"/>
+          </a:p>
+        </p:txBody>
+      </p:sp>
+      <p:sp>
+        <p:nvSpPr>
+          <p:cNvPr id="5" name="Date Placeholder 4"/>
           <p:cNvSpPr>
             <a:spLocks noGrp="1"/>
           </p:cNvSpPr>
@@ -1422,13 +1264,7 @@
       </p:sp>
       <p:sp>
         <p:nvSpPr>
-          <p:cNvPr id="6" name="Footer Placeholder 5">
-            <a:extLst>
-              <a:ext uri="{FF2B5EF4-FFF2-40B4-BE49-F238E27FC236}">
-                <a16:creationId xmlns:a16="http://schemas.microsoft.com/office/drawing/2014/main" id="{578A7086-B538-59AB-F1A9-94227F488D47}"/>
-              </a:ext>
-            </a:extLst>
-          </p:cNvPr>
+          <p:cNvPr id="6" name="Footer Placeholder 5"/>
           <p:cNvSpPr>
             <a:spLocks noGrp="1"/>
           </p:cNvSpPr>
@@ -1447,13 +1283,7 @@
       </p:sp>
       <p:sp>
         <p:nvSpPr>
-          <p:cNvPr id="7" name="Slide Number Placeholder 6">
-            <a:extLst>
-              <a:ext uri="{FF2B5EF4-FFF2-40B4-BE49-F238E27FC236}">
-                <a16:creationId xmlns:a16="http://schemas.microsoft.com/office/drawing/2014/main" id="{BD654C81-D2DE-8F6A-4D7C-0C932F83CC02}"/>
-              </a:ext>
-            </a:extLst>
-          </p:cNvPr>
+          <p:cNvPr id="7" name="Slide Number Placeholder 6"/>
           <p:cNvSpPr>
             <a:spLocks noGrp="1"/>
           </p:cNvSpPr>
@@ -1477,7 +1307,7 @@
     </p:spTree>
     <p:extLst>
       <p:ext uri="{BB962C8B-B14F-4D97-AF65-F5344CB8AC3E}">
-        <p14:creationId xmlns:p14="http://schemas.microsoft.com/office/powerpoint/2010/main" val="955612741"/>
+        <p14:creationId xmlns:p14="http://schemas.microsoft.com/office/powerpoint/2010/main" val="1939221207"/>
       </p:ext>
     </p:extLst>
   </p:cSld>
@@ -1506,13 +1336,7 @@
       </p:grpSpPr>
       <p:sp>
         <p:nvSpPr>
-          <p:cNvPr id="2" name="Title 1">
-            <a:extLst>
-              <a:ext uri="{FF2B5EF4-FFF2-40B4-BE49-F238E27FC236}">
-                <a16:creationId xmlns:a16="http://schemas.microsoft.com/office/drawing/2014/main" id="{3A87160A-F1A2-049A-9943-249F8C5A47D2}"/>
-              </a:ext>
-            </a:extLst>
-          </p:cNvPr>
+          <p:cNvPr id="2" name="Title 1"/>
           <p:cNvSpPr>
             <a:spLocks noGrp="1"/>
           </p:cNvSpPr>
@@ -1534,18 +1358,13 @@
               <a:rPr lang="en-US"/>
               <a:t>Click to edit Master title style</a:t>
             </a:r>
-          </a:p>
-        </p:txBody>
-      </p:sp>
-      <p:sp>
-        <p:nvSpPr>
-          <p:cNvPr id="3" name="Text Placeholder 2">
-            <a:extLst>
-              <a:ext uri="{FF2B5EF4-FFF2-40B4-BE49-F238E27FC236}">
-                <a16:creationId xmlns:a16="http://schemas.microsoft.com/office/drawing/2014/main" id="{AC46B21A-288D-527A-C140-3FD99BF94F0D}"/>
-              </a:ext>
-            </a:extLst>
-          </p:cNvPr>
+            <a:endParaRPr lang="en-US" dirty="0"/>
+          </a:p>
+        </p:txBody>
+      </p:sp>
+      <p:sp>
+        <p:nvSpPr>
+          <p:cNvPr id="3" name="Text Placeholder 2"/>
           <p:cNvSpPr>
             <a:spLocks noGrp="1"/>
           </p:cNvSpPr>
@@ -1610,13 +1429,7 @@
       </p:sp>
       <p:sp>
         <p:nvSpPr>
-          <p:cNvPr id="4" name="Content Placeholder 3">
-            <a:extLst>
-              <a:ext uri="{FF2B5EF4-FFF2-40B4-BE49-F238E27FC236}">
-                <a16:creationId xmlns:a16="http://schemas.microsoft.com/office/drawing/2014/main" id="{0AF52209-AF77-A29E-C806-65213DE69373}"/>
-              </a:ext>
-            </a:extLst>
-          </p:cNvPr>
+          <p:cNvPr id="4" name="Content Placeholder 3"/>
           <p:cNvSpPr>
             <a:spLocks noGrp="1"/>
           </p:cNvSpPr>
@@ -1667,18 +1480,13 @@
               <a:rPr lang="en-US"/>
               <a:t>Fifth level</a:t>
             </a:r>
-          </a:p>
-        </p:txBody>
-      </p:sp>
-      <p:sp>
-        <p:nvSpPr>
-          <p:cNvPr id="5" name="Text Placeholder 4">
-            <a:extLst>
-              <a:ext uri="{FF2B5EF4-FFF2-40B4-BE49-F238E27FC236}">
-                <a16:creationId xmlns:a16="http://schemas.microsoft.com/office/drawing/2014/main" id="{5BE738F8-3B1B-07DD-A29B-054F1BA5BA25}"/>
-              </a:ext>
-            </a:extLst>
-          </p:cNvPr>
+            <a:endParaRPr lang="en-US" dirty="0"/>
+          </a:p>
+        </p:txBody>
+      </p:sp>
+      <p:sp>
+        <p:nvSpPr>
+          <p:cNvPr id="5" name="Text Placeholder 4"/>
           <p:cNvSpPr>
             <a:spLocks noGrp="1"/>
           </p:cNvSpPr>
@@ -1743,13 +1551,7 @@
       </p:sp>
       <p:sp>
         <p:nvSpPr>
-          <p:cNvPr id="6" name="Content Placeholder 5">
-            <a:extLst>
-              <a:ext uri="{FF2B5EF4-FFF2-40B4-BE49-F238E27FC236}">
-                <a16:creationId xmlns:a16="http://schemas.microsoft.com/office/drawing/2014/main" id="{05615ABD-04D8-2921-D7BA-7EB1C36D598D}"/>
-              </a:ext>
-            </a:extLst>
-          </p:cNvPr>
+          <p:cNvPr id="6" name="Content Placeholder 5"/>
           <p:cNvSpPr>
             <a:spLocks noGrp="1"/>
           </p:cNvSpPr>
@@ -1800,18 +1602,13 @@
               <a:rPr lang="en-US"/>
               <a:t>Fifth level</a:t>
             </a:r>
-          </a:p>
-        </p:txBody>
-      </p:sp>
-      <p:sp>
-        <p:nvSpPr>
-          <p:cNvPr id="7" name="Date Placeholder 6">
-            <a:extLst>
-              <a:ext uri="{FF2B5EF4-FFF2-40B4-BE49-F238E27FC236}">
-                <a16:creationId xmlns:a16="http://schemas.microsoft.com/office/drawing/2014/main" id="{07D7970B-F5DF-18E2-D00F-14F6BF83CC7E}"/>
-              </a:ext>
-            </a:extLst>
-          </p:cNvPr>
+            <a:endParaRPr lang="en-US" dirty="0"/>
+          </a:p>
+        </p:txBody>
+      </p:sp>
+      <p:sp>
+        <p:nvSpPr>
+          <p:cNvPr id="7" name="Date Placeholder 6"/>
           <p:cNvSpPr>
             <a:spLocks noGrp="1"/>
           </p:cNvSpPr>
@@ -1834,13 +1631,7 @@
       </p:sp>
       <p:sp>
         <p:nvSpPr>
-          <p:cNvPr id="8" name="Footer Placeholder 7">
-            <a:extLst>
-              <a:ext uri="{FF2B5EF4-FFF2-40B4-BE49-F238E27FC236}">
-                <a16:creationId xmlns:a16="http://schemas.microsoft.com/office/drawing/2014/main" id="{81CACB0D-0760-1501-6266-175A5E437D5E}"/>
-              </a:ext>
-            </a:extLst>
-          </p:cNvPr>
+          <p:cNvPr id="8" name="Footer Placeholder 7"/>
           <p:cNvSpPr>
             <a:spLocks noGrp="1"/>
           </p:cNvSpPr>
@@ -1859,13 +1650,7 @@
       </p:sp>
       <p:sp>
         <p:nvSpPr>
-          <p:cNvPr id="9" name="Slide Number Placeholder 8">
-            <a:extLst>
-              <a:ext uri="{FF2B5EF4-FFF2-40B4-BE49-F238E27FC236}">
-                <a16:creationId xmlns:a16="http://schemas.microsoft.com/office/drawing/2014/main" id="{1D9B6210-909C-2867-AD7A-93D56F9FAC15}"/>
-              </a:ext>
-            </a:extLst>
-          </p:cNvPr>
+          <p:cNvPr id="9" name="Slide Number Placeholder 8"/>
           <p:cNvSpPr>
             <a:spLocks noGrp="1"/>
           </p:cNvSpPr>
@@ -1889,7 +1674,7 @@
     </p:spTree>
     <p:extLst>
       <p:ext uri="{BB962C8B-B14F-4D97-AF65-F5344CB8AC3E}">
-        <p14:creationId xmlns:p14="http://schemas.microsoft.com/office/powerpoint/2010/main" val="396903102"/>
+        <p14:creationId xmlns:p14="http://schemas.microsoft.com/office/powerpoint/2010/main" val="682032797"/>
       </p:ext>
     </p:extLst>
   </p:cSld>
@@ -1918,13 +1703,7 @@
       </p:grpSpPr>
       <p:sp>
         <p:nvSpPr>
-          <p:cNvPr id="2" name="Title 1">
-            <a:extLst>
-              <a:ext uri="{FF2B5EF4-FFF2-40B4-BE49-F238E27FC236}">
-                <a16:creationId xmlns:a16="http://schemas.microsoft.com/office/drawing/2014/main" id="{958374AA-F2D3-06D8-08C2-8B687704F1C3}"/>
-              </a:ext>
-            </a:extLst>
-          </p:cNvPr>
+          <p:cNvPr id="2" name="Title 1"/>
           <p:cNvSpPr>
             <a:spLocks noGrp="1"/>
           </p:cNvSpPr>
@@ -1941,18 +1720,13 @@
               <a:rPr lang="en-US"/>
               <a:t>Click to edit Master title style</a:t>
             </a:r>
-          </a:p>
-        </p:txBody>
-      </p:sp>
-      <p:sp>
-        <p:nvSpPr>
-          <p:cNvPr id="3" name="Date Placeholder 2">
-            <a:extLst>
-              <a:ext uri="{FF2B5EF4-FFF2-40B4-BE49-F238E27FC236}">
-                <a16:creationId xmlns:a16="http://schemas.microsoft.com/office/drawing/2014/main" id="{DBF4793E-E3AA-BFF1-773D-C264D5309C81}"/>
-              </a:ext>
-            </a:extLst>
-          </p:cNvPr>
+            <a:endParaRPr lang="en-US" dirty="0"/>
+          </a:p>
+        </p:txBody>
+      </p:sp>
+      <p:sp>
+        <p:nvSpPr>
+          <p:cNvPr id="3" name="Date Placeholder 2"/>
           <p:cNvSpPr>
             <a:spLocks noGrp="1"/>
           </p:cNvSpPr>
@@ -1975,13 +1749,7 @@
       </p:sp>
       <p:sp>
         <p:nvSpPr>
-          <p:cNvPr id="4" name="Footer Placeholder 3">
-            <a:extLst>
-              <a:ext uri="{FF2B5EF4-FFF2-40B4-BE49-F238E27FC236}">
-                <a16:creationId xmlns:a16="http://schemas.microsoft.com/office/drawing/2014/main" id="{B014F7AB-AC68-83CA-DB22-75B0E3454BE6}"/>
-              </a:ext>
-            </a:extLst>
-          </p:cNvPr>
+          <p:cNvPr id="4" name="Footer Placeholder 3"/>
           <p:cNvSpPr>
             <a:spLocks noGrp="1"/>
           </p:cNvSpPr>
@@ -2000,13 +1768,7 @@
       </p:sp>
       <p:sp>
         <p:nvSpPr>
-          <p:cNvPr id="5" name="Slide Number Placeholder 4">
-            <a:extLst>
-              <a:ext uri="{FF2B5EF4-FFF2-40B4-BE49-F238E27FC236}">
-                <a16:creationId xmlns:a16="http://schemas.microsoft.com/office/drawing/2014/main" id="{40813CA2-09E5-6C86-CE9C-46752B21A0F0}"/>
-              </a:ext>
-            </a:extLst>
-          </p:cNvPr>
+          <p:cNvPr id="5" name="Slide Number Placeholder 4"/>
           <p:cNvSpPr>
             <a:spLocks noGrp="1"/>
           </p:cNvSpPr>
@@ -2030,7 +1792,7 @@
     </p:spTree>
     <p:extLst>
       <p:ext uri="{BB962C8B-B14F-4D97-AF65-F5344CB8AC3E}">
-        <p14:creationId xmlns:p14="http://schemas.microsoft.com/office/powerpoint/2010/main" val="1400119468"/>
+        <p14:creationId xmlns:p14="http://schemas.microsoft.com/office/powerpoint/2010/main" val="935239756"/>
       </p:ext>
     </p:extLst>
   </p:cSld>
@@ -2059,13 +1821,7 @@
       </p:grpSpPr>
       <p:sp>
         <p:nvSpPr>
-          <p:cNvPr id="2" name="Date Placeholder 1">
-            <a:extLst>
-              <a:ext uri="{FF2B5EF4-FFF2-40B4-BE49-F238E27FC236}">
-                <a16:creationId xmlns:a16="http://schemas.microsoft.com/office/drawing/2014/main" id="{52FF02DF-0D00-C0F3-BEF1-DBCFDB7FAAE0}"/>
-              </a:ext>
-            </a:extLst>
-          </p:cNvPr>
+          <p:cNvPr id="2" name="Date Placeholder 1"/>
           <p:cNvSpPr>
             <a:spLocks noGrp="1"/>
           </p:cNvSpPr>
@@ -2088,13 +1844,7 @@
       </p:sp>
       <p:sp>
         <p:nvSpPr>
-          <p:cNvPr id="3" name="Footer Placeholder 2">
-            <a:extLst>
-              <a:ext uri="{FF2B5EF4-FFF2-40B4-BE49-F238E27FC236}">
-                <a16:creationId xmlns:a16="http://schemas.microsoft.com/office/drawing/2014/main" id="{1BC0CF54-F1BF-1417-07DF-1FF1E3D5C23F}"/>
-              </a:ext>
-            </a:extLst>
-          </p:cNvPr>
+          <p:cNvPr id="3" name="Footer Placeholder 2"/>
           <p:cNvSpPr>
             <a:spLocks noGrp="1"/>
           </p:cNvSpPr>
@@ -2113,13 +1863,7 @@
       </p:sp>
       <p:sp>
         <p:nvSpPr>
-          <p:cNvPr id="4" name="Slide Number Placeholder 3">
-            <a:extLst>
-              <a:ext uri="{FF2B5EF4-FFF2-40B4-BE49-F238E27FC236}">
-                <a16:creationId xmlns:a16="http://schemas.microsoft.com/office/drawing/2014/main" id="{58C2076B-C8D2-F5A0-7317-693F89CDB56F}"/>
-              </a:ext>
-            </a:extLst>
-          </p:cNvPr>
+          <p:cNvPr id="4" name="Slide Number Placeholder 3"/>
           <p:cNvSpPr>
             <a:spLocks noGrp="1"/>
           </p:cNvSpPr>
@@ -2143,7 +1887,7 @@
     </p:spTree>
     <p:extLst>
       <p:ext uri="{BB962C8B-B14F-4D97-AF65-F5344CB8AC3E}">
-        <p14:creationId xmlns:p14="http://schemas.microsoft.com/office/powerpoint/2010/main" val="2775126502"/>
+        <p14:creationId xmlns:p14="http://schemas.microsoft.com/office/powerpoint/2010/main" val="4257206410"/>
       </p:ext>
     </p:extLst>
   </p:cSld>
@@ -2172,13 +1916,7 @@
       </p:grpSpPr>
       <p:sp>
         <p:nvSpPr>
-          <p:cNvPr id="2" name="Title 1">
-            <a:extLst>
-              <a:ext uri="{FF2B5EF4-FFF2-40B4-BE49-F238E27FC236}">
-                <a16:creationId xmlns:a16="http://schemas.microsoft.com/office/drawing/2014/main" id="{25FDCFF7-791D-0666-DF4D-542F5977A10B}"/>
-              </a:ext>
-            </a:extLst>
-          </p:cNvPr>
+          <p:cNvPr id="2" name="Title 1"/>
           <p:cNvSpPr>
             <a:spLocks noGrp="1"/>
           </p:cNvSpPr>
@@ -2204,18 +1942,13 @@
               <a:rPr lang="en-US"/>
               <a:t>Click to edit Master title style</a:t>
             </a:r>
-          </a:p>
-        </p:txBody>
-      </p:sp>
-      <p:sp>
-        <p:nvSpPr>
-          <p:cNvPr id="3" name="Content Placeholder 2">
-            <a:extLst>
-              <a:ext uri="{FF2B5EF4-FFF2-40B4-BE49-F238E27FC236}">
-                <a16:creationId xmlns:a16="http://schemas.microsoft.com/office/drawing/2014/main" id="{CA88CE89-7D3F-2923-B4EC-A3839807E876}"/>
-              </a:ext>
-            </a:extLst>
-          </p:cNvPr>
+            <a:endParaRPr lang="en-US" dirty="0"/>
+          </a:p>
+        </p:txBody>
+      </p:sp>
+      <p:sp>
+        <p:nvSpPr>
+          <p:cNvPr id="3" name="Content Placeholder 2"/>
           <p:cNvSpPr>
             <a:spLocks noGrp="1"/>
           </p:cNvSpPr>
@@ -2294,18 +2027,13 @@
               <a:rPr lang="en-US"/>
               <a:t>Fifth level</a:t>
             </a:r>
-          </a:p>
-        </p:txBody>
-      </p:sp>
-      <p:sp>
-        <p:nvSpPr>
-          <p:cNvPr id="4" name="Text Placeholder 3">
-            <a:extLst>
-              <a:ext uri="{FF2B5EF4-FFF2-40B4-BE49-F238E27FC236}">
-                <a16:creationId xmlns:a16="http://schemas.microsoft.com/office/drawing/2014/main" id="{760CF01A-03A8-DAAD-1D4C-A00EE6E53BCF}"/>
-              </a:ext>
-            </a:extLst>
-          </p:cNvPr>
+            <a:endParaRPr lang="en-US" dirty="0"/>
+          </a:p>
+        </p:txBody>
+      </p:sp>
+      <p:sp>
+        <p:nvSpPr>
+          <p:cNvPr id="4" name="Text Placeholder 3"/>
           <p:cNvSpPr>
             <a:spLocks noGrp="1"/>
           </p:cNvSpPr>
@@ -2370,13 +2098,7 @@
       </p:sp>
       <p:sp>
         <p:nvSpPr>
-          <p:cNvPr id="5" name="Date Placeholder 4">
-            <a:extLst>
-              <a:ext uri="{FF2B5EF4-FFF2-40B4-BE49-F238E27FC236}">
-                <a16:creationId xmlns:a16="http://schemas.microsoft.com/office/drawing/2014/main" id="{25B09383-CC49-CA76-0F1A-CF5BBE127E50}"/>
-              </a:ext>
-            </a:extLst>
-          </p:cNvPr>
+          <p:cNvPr id="5" name="Date Placeholder 4"/>
           <p:cNvSpPr>
             <a:spLocks noGrp="1"/>
           </p:cNvSpPr>
@@ -2399,13 +2121,7 @@
       </p:sp>
       <p:sp>
         <p:nvSpPr>
-          <p:cNvPr id="6" name="Footer Placeholder 5">
-            <a:extLst>
-              <a:ext uri="{FF2B5EF4-FFF2-40B4-BE49-F238E27FC236}">
-                <a16:creationId xmlns:a16="http://schemas.microsoft.com/office/drawing/2014/main" id="{72B10F66-497C-6FC5-E2C4-6BF626828925}"/>
-              </a:ext>
-            </a:extLst>
-          </p:cNvPr>
+          <p:cNvPr id="6" name="Footer Placeholder 5"/>
           <p:cNvSpPr>
             <a:spLocks noGrp="1"/>
           </p:cNvSpPr>
@@ -2424,13 +2140,7 @@
       </p:sp>
       <p:sp>
         <p:nvSpPr>
-          <p:cNvPr id="7" name="Slide Number Placeholder 6">
-            <a:extLst>
-              <a:ext uri="{FF2B5EF4-FFF2-40B4-BE49-F238E27FC236}">
-                <a16:creationId xmlns:a16="http://schemas.microsoft.com/office/drawing/2014/main" id="{C6EF5761-F7C4-8D15-1776-23C0415B0BA4}"/>
-              </a:ext>
-            </a:extLst>
-          </p:cNvPr>
+          <p:cNvPr id="7" name="Slide Number Placeholder 6"/>
           <p:cNvSpPr>
             <a:spLocks noGrp="1"/>
           </p:cNvSpPr>
@@ -2454,7 +2164,7 @@
     </p:spTree>
     <p:extLst>
       <p:ext uri="{BB962C8B-B14F-4D97-AF65-F5344CB8AC3E}">
-        <p14:creationId xmlns:p14="http://schemas.microsoft.com/office/powerpoint/2010/main" val="2471920112"/>
+        <p14:creationId xmlns:p14="http://schemas.microsoft.com/office/powerpoint/2010/main" val="3338606909"/>
       </p:ext>
     </p:extLst>
   </p:cSld>
@@ -2483,13 +2193,7 @@
       </p:grpSpPr>
       <p:sp>
         <p:nvSpPr>
-          <p:cNvPr id="2" name="Title 1">
-            <a:extLst>
-              <a:ext uri="{FF2B5EF4-FFF2-40B4-BE49-F238E27FC236}">
-                <a16:creationId xmlns:a16="http://schemas.microsoft.com/office/drawing/2014/main" id="{0B7D25FD-9AD9-3876-70D0-1AE6F77E6B80}"/>
-              </a:ext>
-            </a:extLst>
-          </p:cNvPr>
+          <p:cNvPr id="2" name="Title 1"/>
           <p:cNvSpPr>
             <a:spLocks noGrp="1"/>
           </p:cNvSpPr>
@@ -2515,20 +2219,15 @@
               <a:rPr lang="en-US"/>
               <a:t>Click to edit Master title style</a:t>
             </a:r>
-          </a:p>
-        </p:txBody>
-      </p:sp>
-      <p:sp>
-        <p:nvSpPr>
-          <p:cNvPr id="3" name="Picture Placeholder 2">
-            <a:extLst>
-              <a:ext uri="{FF2B5EF4-FFF2-40B4-BE49-F238E27FC236}">
-                <a16:creationId xmlns:a16="http://schemas.microsoft.com/office/drawing/2014/main" id="{C9827778-3D59-03F8-C360-233D040F7D2C}"/>
-              </a:ext>
-            </a:extLst>
-          </p:cNvPr>
-          <p:cNvSpPr>
-            <a:spLocks noGrp="1"/>
+            <a:endParaRPr lang="en-US" dirty="0"/>
+          </a:p>
+        </p:txBody>
+      </p:sp>
+      <p:sp>
+        <p:nvSpPr>
+          <p:cNvPr id="3" name="Picture Placeholder 2"/>
+          <p:cNvSpPr>
+            <a:spLocks noGrp="1" noChangeAspect="1"/>
           </p:cNvSpPr>
           <p:nvPr>
             <p:ph type="pic" idx="1"/>
@@ -2541,77 +2240,75 @@
           </a:xfrm>
         </p:spPr>
         <p:txBody>
+          <a:bodyPr anchor="t"/>
+          <a:lstStyle>
+            <a:lvl1pPr marL="0" indent="0">
+              <a:buNone/>
+              <a:defRPr sz="3200"/>
+            </a:lvl1pPr>
+            <a:lvl2pPr marL="457200" indent="0">
+              <a:buNone/>
+              <a:defRPr sz="2800"/>
+            </a:lvl2pPr>
+            <a:lvl3pPr marL="914400" indent="0">
+              <a:buNone/>
+              <a:defRPr sz="2400"/>
+            </a:lvl3pPr>
+            <a:lvl4pPr marL="1371600" indent="0">
+              <a:buNone/>
+              <a:defRPr sz="2000"/>
+            </a:lvl4pPr>
+            <a:lvl5pPr marL="1828800" indent="0">
+              <a:buNone/>
+              <a:defRPr sz="2000"/>
+            </a:lvl5pPr>
+            <a:lvl6pPr marL="2286000" indent="0">
+              <a:buNone/>
+              <a:defRPr sz="2000"/>
+            </a:lvl6pPr>
+            <a:lvl7pPr marL="2743200" indent="0">
+              <a:buNone/>
+              <a:defRPr sz="2000"/>
+            </a:lvl7pPr>
+            <a:lvl8pPr marL="3200400" indent="0">
+              <a:buNone/>
+              <a:defRPr sz="2000"/>
+            </a:lvl8pPr>
+            <a:lvl9pPr marL="3657600" indent="0">
+              <a:buNone/>
+              <a:defRPr sz="2000"/>
+            </a:lvl9pPr>
+          </a:lstStyle>
+          <a:p>
+            <a:r>
+              <a:rPr lang="en-US"/>
+              <a:t>Click icon to add picture</a:t>
+            </a:r>
+            <a:endParaRPr lang="en-US" dirty="0"/>
+          </a:p>
+        </p:txBody>
+      </p:sp>
+      <p:sp>
+        <p:nvSpPr>
+          <p:cNvPr id="4" name="Text Placeholder 3"/>
+          <p:cNvSpPr>
+            <a:spLocks noGrp="1"/>
+          </p:cNvSpPr>
+          <p:nvPr>
+            <p:ph type="body" sz="half" idx="2"/>
+          </p:nvPr>
+        </p:nvSpPr>
+        <p:spPr>
+          <a:xfrm>
+            <a:off x="839788" y="2057400"/>
+            <a:ext cx="3932237" cy="3811588"/>
+          </a:xfrm>
+        </p:spPr>
+        <p:txBody>
           <a:bodyPr/>
           <a:lstStyle>
             <a:lvl1pPr marL="0" indent="0">
               <a:buNone/>
-              <a:defRPr sz="3200"/>
-            </a:lvl1pPr>
-            <a:lvl2pPr marL="457200" indent="0">
-              <a:buNone/>
-              <a:defRPr sz="2800"/>
-            </a:lvl2pPr>
-            <a:lvl3pPr marL="914400" indent="0">
-              <a:buNone/>
-              <a:defRPr sz="2400"/>
-            </a:lvl3pPr>
-            <a:lvl4pPr marL="1371600" indent="0">
-              <a:buNone/>
-              <a:defRPr sz="2000"/>
-            </a:lvl4pPr>
-            <a:lvl5pPr marL="1828800" indent="0">
-              <a:buNone/>
-              <a:defRPr sz="2000"/>
-            </a:lvl5pPr>
-            <a:lvl6pPr marL="2286000" indent="0">
-              <a:buNone/>
-              <a:defRPr sz="2000"/>
-            </a:lvl6pPr>
-            <a:lvl7pPr marL="2743200" indent="0">
-              <a:buNone/>
-              <a:defRPr sz="2000"/>
-            </a:lvl7pPr>
-            <a:lvl8pPr marL="3200400" indent="0">
-              <a:buNone/>
-              <a:defRPr sz="2000"/>
-            </a:lvl8pPr>
-            <a:lvl9pPr marL="3657600" indent="0">
-              <a:buNone/>
-              <a:defRPr sz="2000"/>
-            </a:lvl9pPr>
-          </a:lstStyle>
-          <a:p>
-            <a:endParaRPr lang="en-US"/>
-          </a:p>
-        </p:txBody>
-      </p:sp>
-      <p:sp>
-        <p:nvSpPr>
-          <p:cNvPr id="4" name="Text Placeholder 3">
-            <a:extLst>
-              <a:ext uri="{FF2B5EF4-FFF2-40B4-BE49-F238E27FC236}">
-                <a16:creationId xmlns:a16="http://schemas.microsoft.com/office/drawing/2014/main" id="{1442465D-A08E-5E27-21A6-AA03CDBFC06A}"/>
-              </a:ext>
-            </a:extLst>
-          </p:cNvPr>
-          <p:cNvSpPr>
-            <a:spLocks noGrp="1"/>
-          </p:cNvSpPr>
-          <p:nvPr>
-            <p:ph type="body" sz="half" idx="2"/>
-          </p:nvPr>
-        </p:nvSpPr>
-        <p:spPr>
-          <a:xfrm>
-            <a:off x="839788" y="2057400"/>
-            <a:ext cx="3932237" cy="3811588"/>
-          </a:xfrm>
-        </p:spPr>
-        <p:txBody>
-          <a:bodyPr/>
-          <a:lstStyle>
-            <a:lvl1pPr marL="0" indent="0">
-              <a:buNone/>
               <a:defRPr sz="1600"/>
             </a:lvl1pPr>
             <a:lvl2pPr marL="457200" indent="0">
@@ -2658,13 +2355,7 @@
       </p:sp>
       <p:sp>
         <p:nvSpPr>
-          <p:cNvPr id="5" name="Date Placeholder 4">
-            <a:extLst>
-              <a:ext uri="{FF2B5EF4-FFF2-40B4-BE49-F238E27FC236}">
-                <a16:creationId xmlns:a16="http://schemas.microsoft.com/office/drawing/2014/main" id="{941AE921-CBEE-6046-68B2-F27C66A1188F}"/>
-              </a:ext>
-            </a:extLst>
-          </p:cNvPr>
+          <p:cNvPr id="5" name="Date Placeholder 4"/>
           <p:cNvSpPr>
             <a:spLocks noGrp="1"/>
           </p:cNvSpPr>
@@ -2687,13 +2378,7 @@
       </p:sp>
       <p:sp>
         <p:nvSpPr>
-          <p:cNvPr id="6" name="Footer Placeholder 5">
-            <a:extLst>
-              <a:ext uri="{FF2B5EF4-FFF2-40B4-BE49-F238E27FC236}">
-                <a16:creationId xmlns:a16="http://schemas.microsoft.com/office/drawing/2014/main" id="{31918B43-4E11-36EE-6A1B-5156A56E6C05}"/>
-              </a:ext>
-            </a:extLst>
-          </p:cNvPr>
+          <p:cNvPr id="6" name="Footer Placeholder 5"/>
           <p:cNvSpPr>
             <a:spLocks noGrp="1"/>
           </p:cNvSpPr>
@@ -2712,13 +2397,7 @@
       </p:sp>
       <p:sp>
         <p:nvSpPr>
-          <p:cNvPr id="7" name="Slide Number Placeholder 6">
-            <a:extLst>
-              <a:ext uri="{FF2B5EF4-FFF2-40B4-BE49-F238E27FC236}">
-                <a16:creationId xmlns:a16="http://schemas.microsoft.com/office/drawing/2014/main" id="{82B133F9-623D-9339-72EE-A035EF6B52B5}"/>
-              </a:ext>
-            </a:extLst>
-          </p:cNvPr>
+          <p:cNvPr id="7" name="Slide Number Placeholder 6"/>
           <p:cNvSpPr>
             <a:spLocks noGrp="1"/>
           </p:cNvSpPr>
@@ -2742,7 +2421,7 @@
     </p:spTree>
     <p:extLst>
       <p:ext uri="{BB962C8B-B14F-4D97-AF65-F5344CB8AC3E}">
-        <p14:creationId xmlns:p14="http://schemas.microsoft.com/office/powerpoint/2010/main" val="3604105927"/>
+        <p14:creationId xmlns:p14="http://schemas.microsoft.com/office/powerpoint/2010/main" val="3593507802"/>
       </p:ext>
     </p:extLst>
   </p:cSld>
@@ -2776,13 +2455,7 @@
       </p:grpSpPr>
       <p:sp>
         <p:nvSpPr>
-          <p:cNvPr id="2" name="Title Placeholder 1">
-            <a:extLst>
-              <a:ext uri="{FF2B5EF4-FFF2-40B4-BE49-F238E27FC236}">
-                <a16:creationId xmlns:a16="http://schemas.microsoft.com/office/drawing/2014/main" id="{F9B3E602-36AB-3C0B-15F0-E4C979D03BA6}"/>
-              </a:ext>
-            </a:extLst>
-          </p:cNvPr>
+          <p:cNvPr id="2" name="Title Placeholder 1"/>
           <p:cNvSpPr>
             <a:spLocks noGrp="1"/>
           </p:cNvSpPr>
@@ -2809,18 +2482,13 @@
               <a:rPr lang="en-US"/>
               <a:t>Click to edit Master title style</a:t>
             </a:r>
-          </a:p>
-        </p:txBody>
-      </p:sp>
-      <p:sp>
-        <p:nvSpPr>
-          <p:cNvPr id="3" name="Text Placeholder 2">
-            <a:extLst>
-              <a:ext uri="{FF2B5EF4-FFF2-40B4-BE49-F238E27FC236}">
-                <a16:creationId xmlns:a16="http://schemas.microsoft.com/office/drawing/2014/main" id="{4091BF2A-2CBE-6DA6-4765-1356B991E5D3}"/>
-              </a:ext>
-            </a:extLst>
-          </p:cNvPr>
+            <a:endParaRPr lang="en-US" dirty="0"/>
+          </a:p>
+        </p:txBody>
+      </p:sp>
+      <p:sp>
+        <p:nvSpPr>
+          <p:cNvPr id="3" name="Text Placeholder 2"/>
           <p:cNvSpPr>
             <a:spLocks noGrp="1"/>
           </p:cNvSpPr>
@@ -2876,18 +2544,13 @@
               <a:rPr lang="en-US"/>
               <a:t>Fifth level</a:t>
             </a:r>
-          </a:p>
-        </p:txBody>
-      </p:sp>
-      <p:sp>
-        <p:nvSpPr>
-          <p:cNvPr id="4" name="Date Placeholder 3">
-            <a:extLst>
-              <a:ext uri="{FF2B5EF4-FFF2-40B4-BE49-F238E27FC236}">
-                <a16:creationId xmlns:a16="http://schemas.microsoft.com/office/drawing/2014/main" id="{7740F6AB-C9A7-C989-7D4C-19B5B1F5BA90}"/>
-              </a:ext>
-            </a:extLst>
-          </p:cNvPr>
+            <a:endParaRPr lang="en-US" dirty="0"/>
+          </a:p>
+        </p:txBody>
+      </p:sp>
+      <p:sp>
+        <p:nvSpPr>
+          <p:cNvPr id="4" name="Date Placeholder 3"/>
           <p:cNvSpPr>
             <a:spLocks noGrp="1"/>
           </p:cNvSpPr>
@@ -2911,7 +2574,7 @@
               <a:defRPr sz="1200">
                 <a:solidFill>
                   <a:schemeClr val="tx1">
-                    <a:tint val="82000"/>
+                    <a:shade val="82000"/>
                   </a:schemeClr>
                 </a:solidFill>
               </a:defRPr>
@@ -2928,13 +2591,7 @@
       </p:sp>
       <p:sp>
         <p:nvSpPr>
-          <p:cNvPr id="5" name="Footer Placeholder 4">
-            <a:extLst>
-              <a:ext uri="{FF2B5EF4-FFF2-40B4-BE49-F238E27FC236}">
-                <a16:creationId xmlns:a16="http://schemas.microsoft.com/office/drawing/2014/main" id="{15356F5C-D005-4E55-4DCE-5ADC28AAEA86}"/>
-              </a:ext>
-            </a:extLst>
-          </p:cNvPr>
+          <p:cNvPr id="5" name="Footer Placeholder 4"/>
           <p:cNvSpPr>
             <a:spLocks noGrp="1"/>
           </p:cNvSpPr>
@@ -2958,7 +2615,7 @@
               <a:defRPr sz="1200">
                 <a:solidFill>
                   <a:schemeClr val="tx1">
-                    <a:tint val="82000"/>
+                    <a:shade val="82000"/>
                   </a:schemeClr>
                 </a:solidFill>
               </a:defRPr>
@@ -2971,13 +2628,7 @@
       </p:sp>
       <p:sp>
         <p:nvSpPr>
-          <p:cNvPr id="6" name="Slide Number Placeholder 5">
-            <a:extLst>
-              <a:ext uri="{FF2B5EF4-FFF2-40B4-BE49-F238E27FC236}">
-                <a16:creationId xmlns:a16="http://schemas.microsoft.com/office/drawing/2014/main" id="{19CE5D35-D4B3-6080-E5C2-8ECA86686552}"/>
-              </a:ext>
-            </a:extLst>
-          </p:cNvPr>
+          <p:cNvPr id="6" name="Slide Number Placeholder 5"/>
           <p:cNvSpPr>
             <a:spLocks noGrp="1"/>
           </p:cNvSpPr>
@@ -3001,7 +2652,7 @@
               <a:defRPr sz="1200">
                 <a:solidFill>
                   <a:schemeClr val="tx1">
-                    <a:tint val="82000"/>
+                    <a:shade val="82000"/>
                   </a:schemeClr>
                 </a:solidFill>
               </a:defRPr>
@@ -3019,23 +2670,23 @@
     </p:spTree>
     <p:extLst>
       <p:ext uri="{BB962C8B-B14F-4D97-AF65-F5344CB8AC3E}">
-        <p14:creationId xmlns:p14="http://schemas.microsoft.com/office/powerpoint/2010/main" val="1192855021"/>
+        <p14:creationId xmlns:p14="http://schemas.microsoft.com/office/powerpoint/2010/main" val="2725010251"/>
       </p:ext>
     </p:extLst>
   </p:cSld>
-  <p:clrMap bg1="lt1" tx1="dk1" bg2="lt2" tx2="dk2" accent1="accent1" accent2="accent2" accent3="accent3" accent4="accent4" accent5="accent5" accent6="accent6" hlink="hlink" folHlink="folHlink"/>
+  <p:clrMap bg1="dk1" tx1="lt1" bg2="dk2" tx2="lt2" accent1="accent1" accent2="accent2" accent3="accent3" accent4="accent4" accent5="accent5" accent6="accent6" hlink="hlink" folHlink="folHlink"/>
   <p:sldLayoutIdLst>
-    <p:sldLayoutId id="2147483649" r:id="rId1"/>
-    <p:sldLayoutId id="2147483650" r:id="rId2"/>
-    <p:sldLayoutId id="2147483651" r:id="rId3"/>
-    <p:sldLayoutId id="2147483652" r:id="rId4"/>
-    <p:sldLayoutId id="2147483653" r:id="rId5"/>
-    <p:sldLayoutId id="2147483654" r:id="rId6"/>
-    <p:sldLayoutId id="2147483655" r:id="rId7"/>
-    <p:sldLayoutId id="2147483656" r:id="rId8"/>
-    <p:sldLayoutId id="2147483657" r:id="rId9"/>
-    <p:sldLayoutId id="2147483658" r:id="rId10"/>
-    <p:sldLayoutId id="2147483659" r:id="rId11"/>
+    <p:sldLayoutId id="2147483691" r:id="rId1"/>
+    <p:sldLayoutId id="2147483692" r:id="rId2"/>
+    <p:sldLayoutId id="2147483693" r:id="rId3"/>
+    <p:sldLayoutId id="2147483694" r:id="rId4"/>
+    <p:sldLayoutId id="2147483695" r:id="rId5"/>
+    <p:sldLayoutId id="2147483696" r:id="rId6"/>
+    <p:sldLayoutId id="2147483697" r:id="rId7"/>
+    <p:sldLayoutId id="2147483698" r:id="rId8"/>
+    <p:sldLayoutId id="2147483699" r:id="rId9"/>
+    <p:sldLayoutId id="2147483700" r:id="rId10"/>
+    <p:sldLayoutId id="2147483701" r:id="rId11"/>
   </p:sldLayoutIdLst>
   <p:txStyles>
     <p:titleStyle>
@@ -3354,6 +3005,34 @@
         <p:blipFill>
           <a:blip r:embed="rId2">
             <a:extLst>
+              <a:ext uri="{BEBA8EAE-BF5A-486C-A8C5-ECC9F3942E4B}">
+                <a14:imgProps xmlns:a14="http://schemas.microsoft.com/office/drawing/2010/main">
+                  <a14:imgLayer r:embed="rId3">
+                    <a14:imgEffect>
+                      <a14:backgroundRemoval t="10000" b="90000" l="10000" r="90000">
+                        <a14:foregroundMark x1="23242" y1="34277" x2="19922" y2="49902"/>
+                        <a14:foregroundMark x1="19922" y1="49902" x2="27051" y2="56055"/>
+                        <a14:foregroundMark x1="27051" y1="56055" x2="35547" y2="50195"/>
+                        <a14:foregroundMark x1="35547" y1="50195" x2="33398" y2="36719"/>
+                        <a14:foregroundMark x1="33398" y1="36719" x2="25195" y2="33301"/>
+                        <a14:foregroundMark x1="25195" y1="33301" x2="23438" y2="33984"/>
+                        <a14:foregroundMark x1="28809" y1="37012" x2="25195" y2="45801"/>
+                        <a14:foregroundMark x1="25195" y1="45801" x2="30371" y2="49512"/>
+                        <a14:foregroundMark x1="42480" y1="34863" x2="42773" y2="43555"/>
+                        <a14:foregroundMark x1="42773" y1="43555" x2="50488" y2="40918"/>
+                        <a14:foregroundMark x1="50488" y1="40918" x2="59961" y2="41211"/>
+                        <a14:foregroundMark x1="59961" y1="41211" x2="79492" y2="34961"/>
+                        <a14:foregroundMark x1="79492" y1="34961" x2="79395" y2="39063"/>
+                        <a14:foregroundMark x1="57715" y1="33301" x2="56934" y2="42969"/>
+                        <a14:foregroundMark x1="70703" y1="34180" x2="80664" y2="30566"/>
+                        <a14:foregroundMark x1="80664" y1="30566" x2="80957" y2="30273"/>
+                        <a14:foregroundMark x1="23535" y1="60449" x2="72754" y2="47070"/>
+                        <a14:foregroundMark x1="77344" y1="46289" x2="81738" y2="51367"/>
+                      </a14:backgroundRemoval>
+                    </a14:imgEffect>
+                  </a14:imgLayer>
+                </a14:imgProps>
+              </a:ext>
               <a:ext uri="{28A0092B-C50C-407E-A947-70E740481C1C}">
                 <a14:useLocalDpi xmlns:a14="http://schemas.microsoft.com/office/drawing/2010/main" val="0"/>
               </a:ext>
@@ -3365,8 +3044,8 @@
         </p:blipFill>
         <p:spPr>
           <a:xfrm>
-            <a:off x="11101387" y="1194647"/>
-            <a:ext cx="504825" cy="504825"/>
+            <a:off x="11117020" y="1210280"/>
+            <a:ext cx="473560" cy="473560"/>
           </a:xfrm>
           <a:prstGeom prst="rect">
             <a:avLst/>
@@ -3633,7 +3312,7 @@
           <p:cNvPr id="2" name="Title 1">
             <a:extLst>
               <a:ext uri="{FF2B5EF4-FFF2-40B4-BE49-F238E27FC236}">
-                <a16:creationId xmlns:a16="http://schemas.microsoft.com/office/drawing/2014/main" id="{F07483F7-F105-EE9E-F945-2F2CB35CB47D}"/>
+                <a16:creationId xmlns:a16="http://schemas.microsoft.com/office/drawing/2014/main" id="{980A703F-D695-0D75-C50B-52CD67D53E9D}"/>
               </a:ext>
             </a:extLst>
           </p:cNvPr>
@@ -3649,157 +3328,85 @@
           <a:bodyPr/>
           <a:lstStyle/>
           <a:p>
-            <a:r>
-              <a:rPr lang="en-US"/>
-              <a:t>Report:</a:t>
-            </a:r>
-          </a:p>
-        </p:txBody>
-      </p:sp>
-      <p:sp>
-        <p:nvSpPr>
-          <p:cNvPr id="3" name="Content Placeholder 2">
-            <a:extLst>
-              <a:ext uri="{FF2B5EF4-FFF2-40B4-BE49-F238E27FC236}">
-                <a16:creationId xmlns:a16="http://schemas.microsoft.com/office/drawing/2014/main" id="{33A656DA-C422-EF35-BC3F-B165CA0927E0}"/>
-              </a:ext>
-            </a:extLst>
-          </p:cNvPr>
-          <p:cNvSpPr>
-            <a:spLocks noGrp="1"/>
-          </p:cNvSpPr>
-          <p:nvPr>
-            <p:ph idx="1"/>
-          </p:nvPr>
-        </p:nvSpPr>
-        <p:spPr/>
-        <p:txBody>
-          <a:bodyPr>
-            <a:normAutofit/>
-          </a:bodyPr>
-          <a:lstStyle/>
-          <a:p>
-            <a:pPr marL="0" indent="0">
-              <a:buNone/>
-            </a:pPr>
-            <a:r>
-              <a:rPr lang="en-US" dirty="0"/>
-              <a:t>Similar to wilderness1.wav:</a:t>
-            </a:r>
-          </a:p>
-          <a:p>
-            <a:pPr marL="0" indent="0">
-              <a:buNone/>
-            </a:pPr>
-            <a:r>
-              <a:rPr lang="en-US" dirty="0"/>
-              <a:t>wilderness1.wav: 1</a:t>
-            </a:r>
-          </a:p>
-          <a:p>
-            <a:pPr marL="0" indent="0">
-              <a:buNone/>
-            </a:pPr>
-            <a:r>
-              <a:rPr lang="en-US" dirty="0"/>
-              <a:t>wilderness2.wav: 0.7229432647124682</a:t>
-            </a:r>
-          </a:p>
-          <a:p>
-            <a:pPr marL="0" indent="0">
-              <a:buNone/>
-            </a:pPr>
-            <a:endParaRPr lang="en-US" dirty="0"/>
-          </a:p>
-          <a:p>
-            <a:pPr marL="0" indent="0">
-              <a:buNone/>
-            </a:pPr>
-            <a:r>
-              <a:rPr lang="en-US" dirty="0"/>
-              <a:t>jesus2.wav: 0.3134769071964211</a:t>
-            </a:r>
-          </a:p>
-          <a:p>
-            <a:pPr marL="0" indent="0">
-              <a:buNone/>
-            </a:pPr>
-            <a:r>
-              <a:rPr lang="en-US" dirty="0"/>
-              <a:t>God1.wav: 0.23680512842732715</a:t>
-            </a:r>
-          </a:p>
-          <a:p>
-            <a:pPr marL="0" indent="0">
-              <a:buNone/>
-            </a:pPr>
-            <a:r>
-              <a:rPr lang="en-US" dirty="0"/>
-              <a:t>jesus1.wav: 0.21231795463558845</a:t>
-            </a:r>
-          </a:p>
-          <a:p>
-            <a:pPr marL="0" indent="0">
-              <a:buNone/>
-            </a:pPr>
-            <a:r>
-              <a:rPr lang="en-US" dirty="0"/>
-              <a:t>God2.wav: 0.1635381466180469 </a:t>
-            </a:r>
+            <a:endParaRPr lang="en-US"/>
           </a:p>
         </p:txBody>
       </p:sp>
       <p:pic>
         <p:nvPicPr>
-          <p:cNvPr id="1026" name="Picture 2" descr="works on my machine, starburst">
+          <p:cNvPr id="5" name="Content Placeholder 4" descr="A blue and white image of a blue and white image&#10;&#10;Description automatically generated with medium confidence">
             <a:extLst>
               <a:ext uri="{FF2B5EF4-FFF2-40B4-BE49-F238E27FC236}">
-                <a16:creationId xmlns:a16="http://schemas.microsoft.com/office/drawing/2014/main" id="{BB8EF7DC-FBE5-822B-4324-2DAEFC2EC8BF}"/>
+                <a16:creationId xmlns:a16="http://schemas.microsoft.com/office/drawing/2014/main" id="{214F0FF7-A7AD-0CC6-BF30-50C617DAA340}"/>
               </a:ext>
             </a:extLst>
           </p:cNvPr>
           <p:cNvPicPr>
-            <a:picLocks noChangeAspect="1" noChangeArrowheads="1"/>
+            <a:picLocks noGrp="1" noChangeAspect="1"/>
+          </p:cNvPicPr>
+          <p:nvPr>
+            <p:ph idx="1"/>
+          </p:nvPr>
+        </p:nvPicPr>
+        <p:blipFill>
+          <a:blip r:embed="rId2">
+            <a:extLst>
+              <a:ext uri="{28A0092B-C50C-407E-A947-70E740481C1C}">
+                <a14:useLocalDpi xmlns:a14="http://schemas.microsoft.com/office/drawing/2010/main" val="0"/>
+              </a:ext>
+            </a:extLst>
+          </a:blip>
+          <a:stretch>
+            <a:fillRect/>
+          </a:stretch>
+        </p:blipFill>
+        <p:spPr>
+          <a:xfrm>
+            <a:off x="136840" y="719219"/>
+            <a:ext cx="7260350" cy="4297689"/>
+          </a:xfrm>
+        </p:spPr>
+      </p:pic>
+      <p:pic>
+        <p:nvPicPr>
+          <p:cNvPr id="7" name="Picture 6" descr="A graph of a diagram&#10;&#10;Description automatically generated with medium confidence">
+            <a:extLst>
+              <a:ext uri="{FF2B5EF4-FFF2-40B4-BE49-F238E27FC236}">
+                <a16:creationId xmlns:a16="http://schemas.microsoft.com/office/drawing/2014/main" id="{BC74B65F-2CDB-A2BD-6D2A-C77D31BD305C}"/>
+              </a:ext>
+            </a:extLst>
+          </p:cNvPr>
+          <p:cNvPicPr>
+            <a:picLocks noChangeAspect="1"/>
           </p:cNvPicPr>
           <p:nvPr/>
         </p:nvPicPr>
         <p:blipFill>
-          <a:blip r:embed="rId2">
+          <a:blip r:embed="rId3">
             <a:extLst>
               <a:ext uri="{28A0092B-C50C-407E-A947-70E740481C1C}">
                 <a14:useLocalDpi xmlns:a14="http://schemas.microsoft.com/office/drawing/2010/main" val="0"/>
               </a:ext>
             </a:extLst>
           </a:blip>
-          <a:srcRect/>
           <a:stretch>
             <a:fillRect/>
           </a:stretch>
         </p:blipFill>
-        <p:spPr bwMode="auto">
+        <p:spPr>
           <a:xfrm>
-            <a:off x="8064253" y="838994"/>
-            <a:ext cx="1905000" cy="1838325"/>
+            <a:off x="4404041" y="2319601"/>
+            <a:ext cx="7260350" cy="4297689"/>
           </a:xfrm>
           <a:prstGeom prst="rect">
             <a:avLst/>
           </a:prstGeom>
-          <a:noFill/>
-          <a:extLst>
-            <a:ext uri="{909E8E84-426E-40DD-AFC4-6F175D3DCCD1}">
-              <a14:hiddenFill xmlns:a14="http://schemas.microsoft.com/office/drawing/2010/main">
-                <a:solidFill>
-                  <a:srgbClr val="FFFFFF"/>
-                </a:solidFill>
-              </a14:hiddenFill>
-            </a:ext>
-          </a:extLst>
         </p:spPr>
       </p:pic>
     </p:spTree>
     <p:extLst>
       <p:ext uri="{BB962C8B-B14F-4D97-AF65-F5344CB8AC3E}">
-        <p14:creationId xmlns:p14="http://schemas.microsoft.com/office/powerpoint/2010/main" val="2692368703"/>
+        <p14:creationId xmlns:p14="http://schemas.microsoft.com/office/powerpoint/2010/main" val="3325462642"/>
       </p:ext>
     </p:extLst>
   </p:cSld>
@@ -3810,6 +3417,375 @@
 </file>
 
 <file path=ppt/slides/slide11.xml><?xml version="1.0" encoding="utf-8"?>
+<p:sld xmlns:a="http://schemas.openxmlformats.org/drawingml/2006/main" xmlns:r="http://schemas.openxmlformats.org/officeDocument/2006/relationships" xmlns:p="http://schemas.openxmlformats.org/presentationml/2006/main">
+  <p:cSld>
+    <p:spTree>
+      <p:nvGrpSpPr>
+        <p:cNvPr id="1" name="">
+          <a:extLst>
+            <a:ext uri="{FF2B5EF4-FFF2-40B4-BE49-F238E27FC236}">
+              <a16:creationId xmlns:a16="http://schemas.microsoft.com/office/drawing/2014/main" id="{A89F8F60-84E6-3ED5-2959-E206DD4A2A50}"/>
+            </a:ext>
+          </a:extLst>
+        </p:cNvPr>
+        <p:cNvGrpSpPr/>
+        <p:nvPr/>
+      </p:nvGrpSpPr>
+      <p:grpSpPr>
+        <a:xfrm>
+          <a:off x="0" y="0"/>
+          <a:ext cx="0" cy="0"/>
+          <a:chOff x="0" y="0"/>
+          <a:chExt cx="0" cy="0"/>
+        </a:xfrm>
+      </p:grpSpPr>
+      <p:sp>
+        <p:nvSpPr>
+          <p:cNvPr id="2" name="Title 1">
+            <a:extLst>
+              <a:ext uri="{FF2B5EF4-FFF2-40B4-BE49-F238E27FC236}">
+                <a16:creationId xmlns:a16="http://schemas.microsoft.com/office/drawing/2014/main" id="{FD185580-4369-A629-C6F8-8A11F1D22E3C}"/>
+              </a:ext>
+            </a:extLst>
+          </p:cNvPr>
+          <p:cNvSpPr>
+            <a:spLocks noGrp="1"/>
+          </p:cNvSpPr>
+          <p:nvPr>
+            <p:ph type="title"/>
+          </p:nvPr>
+        </p:nvSpPr>
+        <p:spPr>
+          <a:xfrm>
+            <a:off x="838200" y="0"/>
+            <a:ext cx="10515600" cy="1325563"/>
+          </a:xfrm>
+        </p:spPr>
+        <p:txBody>
+          <a:bodyPr/>
+          <a:lstStyle/>
+          <a:p>
+            <a:r>
+              <a:rPr lang="en-US" dirty="0"/>
+              <a:t>Off-the-Shelf Solution</a:t>
+            </a:r>
+          </a:p>
+        </p:txBody>
+      </p:sp>
+      <p:sp>
+        <p:nvSpPr>
+          <p:cNvPr id="3" name="Content Placeholder 2">
+            <a:extLst>
+              <a:ext uri="{FF2B5EF4-FFF2-40B4-BE49-F238E27FC236}">
+                <a16:creationId xmlns:a16="http://schemas.microsoft.com/office/drawing/2014/main" id="{30306755-292D-D24C-E837-78CA4B505359}"/>
+              </a:ext>
+            </a:extLst>
+          </p:cNvPr>
+          <p:cNvSpPr>
+            <a:spLocks noGrp="1"/>
+          </p:cNvSpPr>
+          <p:nvPr>
+            <p:ph idx="1"/>
+          </p:nvPr>
+        </p:nvSpPr>
+        <p:spPr>
+          <a:xfrm>
+            <a:off x="65843" y="1325563"/>
+            <a:ext cx="10515600" cy="4351338"/>
+          </a:xfrm>
+        </p:spPr>
+        <p:txBody>
+          <a:bodyPr>
+            <a:noAutofit/>
+          </a:bodyPr>
+          <a:lstStyle/>
+          <a:p>
+            <a:pPr marL="0" indent="0">
+              <a:lnSpc>
+                <a:spcPct val="120000"/>
+              </a:lnSpc>
+              <a:buNone/>
+            </a:pPr>
+            <a:r>
+              <a:rPr lang="en-US" sz="1600" dirty="0">
+                <a:latin typeface="Georgia" panose="02040502050405020303" pitchFamily="18" charset="0"/>
+              </a:rPr>
+              <a:t>We can start with an off-the-shelf solution (`</a:t>
+            </a:r>
+            <a:r>
+              <a:rPr lang="en-US" sz="1600" dirty="0" err="1">
+                <a:latin typeface="Georgia" panose="02040502050405020303" pitchFamily="18" charset="0"/>
+              </a:rPr>
+              <a:t>librosa</a:t>
+            </a:r>
+            <a:r>
+              <a:rPr lang="en-US" sz="1600" dirty="0">
+                <a:latin typeface="Georgia" panose="02040502050405020303" pitchFamily="18" charset="0"/>
+              </a:rPr>
+              <a:t>` </a:t>
+            </a:r>
+            <a:r>
+              <a:rPr lang="en-US" sz="1600" dirty="0" err="1">
+                <a:latin typeface="Georgia" panose="02040502050405020303" pitchFamily="18" charset="0"/>
+              </a:rPr>
+              <a:t>mfcc</a:t>
+            </a:r>
+            <a:r>
+              <a:rPr lang="en-US" sz="1600" dirty="0">
+                <a:latin typeface="Georgia" panose="02040502050405020303" pitchFamily="18" charset="0"/>
+              </a:rPr>
+              <a:t> feature extraction):</a:t>
+            </a:r>
+          </a:p>
+          <a:p>
+            <a:pPr marL="0" indent="0">
+              <a:lnSpc>
+                <a:spcPct val="120000"/>
+              </a:lnSpc>
+              <a:buNone/>
+            </a:pPr>
+            <a:r>
+              <a:rPr lang="en-US" sz="1600" dirty="0">
+                <a:latin typeface="Georgia" panose="02040502050405020303" pitchFamily="18" charset="0"/>
+              </a:rPr>
+              <a:t>✔ This solution correctly identifies the correct forms, </a:t>
+            </a:r>
+          </a:p>
+          <a:p>
+            <a:pPr marL="0" indent="0">
+              <a:lnSpc>
+                <a:spcPct val="120000"/>
+              </a:lnSpc>
+              <a:buNone/>
+            </a:pPr>
+            <a:r>
+              <a:rPr lang="en-US" sz="1600" dirty="0">
+                <a:latin typeface="Georgia" panose="02040502050405020303" pitchFamily="18" charset="0"/>
+              </a:rPr>
+              <a:t>❌ but it does not detect as much difference between the incorrect forms.</a:t>
+            </a:r>
+          </a:p>
+          <a:p>
+            <a:pPr marL="0" indent="0">
+              <a:lnSpc>
+                <a:spcPct val="120000"/>
+              </a:lnSpc>
+              <a:buNone/>
+            </a:pPr>
+            <a:r>
+              <a:rPr lang="en-US" sz="1600" dirty="0">
+                <a:latin typeface="Georgia" panose="02040502050405020303" pitchFamily="18" charset="0"/>
+              </a:rPr>
+              <a:t>For keyword checking, it might be helpful to have a meaningful measure of how different the words are:</a:t>
+            </a:r>
+          </a:p>
+          <a:p>
+            <a:pPr marL="0" indent="0">
+              <a:lnSpc>
+                <a:spcPct val="120000"/>
+              </a:lnSpc>
+              <a:buNone/>
+            </a:pPr>
+            <a:r>
+              <a:rPr lang="en-US" sz="1600" dirty="0">
+                <a:latin typeface="Georgia" panose="02040502050405020303" pitchFamily="18" charset="0"/>
+              </a:rPr>
+              <a:t>No clustering!</a:t>
+            </a:r>
+          </a:p>
+          <a:p>
+            <a:pPr marL="0" indent="0">
+              <a:lnSpc>
+                <a:spcPct val="120000"/>
+              </a:lnSpc>
+              <a:buNone/>
+            </a:pPr>
+            <a:endParaRPr lang="en-US" sz="1600" dirty="0">
+              <a:latin typeface="Georgia" panose="02040502050405020303" pitchFamily="18" charset="0"/>
+            </a:endParaRPr>
+          </a:p>
+        </p:txBody>
+      </p:sp>
+      <p:sp>
+        <p:nvSpPr>
+          <p:cNvPr id="5" name="TextBox 4">
+            <a:extLst>
+              <a:ext uri="{FF2B5EF4-FFF2-40B4-BE49-F238E27FC236}">
+                <a16:creationId xmlns:a16="http://schemas.microsoft.com/office/drawing/2014/main" id="{B404ADE4-A3D5-4A2D-F245-281AF0692A49}"/>
+              </a:ext>
+            </a:extLst>
+          </p:cNvPr>
+          <p:cNvSpPr txBox="1"/>
+          <p:nvPr/>
+        </p:nvSpPr>
+        <p:spPr>
+          <a:xfrm>
+            <a:off x="7217546" y="3364638"/>
+            <a:ext cx="5537446" cy="3386633"/>
+          </a:xfrm>
+          <a:prstGeom prst="rect">
+            <a:avLst/>
+          </a:prstGeom>
+          <a:noFill/>
+        </p:spPr>
+        <p:txBody>
+          <a:bodyPr wrap="square">
+            <a:spAutoFit/>
+          </a:bodyPr>
+          <a:lstStyle/>
+          <a:p>
+            <a:pPr marL="0" indent="0">
+              <a:lnSpc>
+                <a:spcPct val="120000"/>
+              </a:lnSpc>
+              <a:buNone/>
+            </a:pPr>
+            <a:r>
+              <a:rPr lang="en-US" sz="1800" dirty="0">
+                <a:latin typeface="Georgia" panose="02040502050405020303" pitchFamily="18" charset="0"/>
+              </a:rPr>
+              <a:t>Similar to wilderness1.wav:</a:t>
+            </a:r>
+          </a:p>
+          <a:p>
+            <a:pPr marL="0" indent="0">
+              <a:lnSpc>
+                <a:spcPct val="120000"/>
+              </a:lnSpc>
+              <a:buNone/>
+            </a:pPr>
+            <a:r>
+              <a:rPr lang="en-US" sz="1800" dirty="0">
+                <a:latin typeface="Georgia" panose="02040502050405020303" pitchFamily="18" charset="0"/>
+              </a:rPr>
+              <a:t>wilderness1.wav: 0.9999999869496023</a:t>
+            </a:r>
+          </a:p>
+          <a:p>
+            <a:pPr marL="0" indent="0">
+              <a:lnSpc>
+                <a:spcPct val="120000"/>
+              </a:lnSpc>
+              <a:buNone/>
+            </a:pPr>
+            <a:r>
+              <a:rPr lang="en-US" sz="1800" dirty="0">
+                <a:latin typeface="Georgia" panose="02040502050405020303" pitchFamily="18" charset="0"/>
+              </a:rPr>
+              <a:t>wilderness2.wav: 0.9993146675340262</a:t>
+            </a:r>
+          </a:p>
+          <a:p>
+            <a:pPr marL="0" indent="0">
+              <a:lnSpc>
+                <a:spcPct val="120000"/>
+              </a:lnSpc>
+              <a:buNone/>
+            </a:pPr>
+            <a:endParaRPr lang="en-US" sz="1800" dirty="0">
+              <a:latin typeface="Georgia" panose="02040502050405020303" pitchFamily="18" charset="0"/>
+            </a:endParaRPr>
+          </a:p>
+          <a:p>
+            <a:pPr marL="0" indent="0">
+              <a:lnSpc>
+                <a:spcPct val="120000"/>
+              </a:lnSpc>
+              <a:buNone/>
+            </a:pPr>
+            <a:r>
+              <a:rPr lang="en-US" sz="1800" dirty="0">
+                <a:latin typeface="Georgia" panose="02040502050405020303" pitchFamily="18" charset="0"/>
+              </a:rPr>
+              <a:t>God1.wav: 0.9987559253705995</a:t>
+            </a:r>
+          </a:p>
+          <a:p>
+            <a:pPr marL="0" indent="0">
+              <a:lnSpc>
+                <a:spcPct val="120000"/>
+              </a:lnSpc>
+              <a:buNone/>
+            </a:pPr>
+            <a:r>
+              <a:rPr lang="en-US" sz="1800" dirty="0">
+                <a:latin typeface="Georgia" panose="02040502050405020303" pitchFamily="18" charset="0"/>
+              </a:rPr>
+              <a:t>God2.wav: 0.9980986833151937</a:t>
+            </a:r>
+          </a:p>
+          <a:p>
+            <a:pPr marL="0" indent="0">
+              <a:lnSpc>
+                <a:spcPct val="120000"/>
+              </a:lnSpc>
+              <a:buNone/>
+            </a:pPr>
+            <a:r>
+              <a:rPr lang="en-US" sz="1800" dirty="0">
+                <a:latin typeface="Georgia" panose="02040502050405020303" pitchFamily="18" charset="0"/>
+              </a:rPr>
+              <a:t>inTheBeginning1.wav: 0.9971207291637255</a:t>
+            </a:r>
+          </a:p>
+          <a:p>
+            <a:pPr marL="0" indent="0">
+              <a:lnSpc>
+                <a:spcPct val="120000"/>
+              </a:lnSpc>
+              <a:buNone/>
+            </a:pPr>
+            <a:r>
+              <a:rPr lang="en-US" sz="1800" dirty="0">
+                <a:latin typeface="Georgia" panose="02040502050405020303" pitchFamily="18" charset="0"/>
+              </a:rPr>
+              <a:t>inTheBeginning2.wav: 0.9969806586039947</a:t>
+            </a:r>
+          </a:p>
+          <a:p>
+            <a:pPr marL="0" indent="0">
+              <a:lnSpc>
+                <a:spcPct val="120000"/>
+              </a:lnSpc>
+              <a:buNone/>
+            </a:pPr>
+            <a:r>
+              <a:rPr lang="en-US" sz="1800" dirty="0">
+                <a:latin typeface="Georgia" panose="02040502050405020303" pitchFamily="18" charset="0"/>
+              </a:rPr>
+              <a:t>jesus2.wav: 0.9958133114595762</a:t>
+            </a:r>
+          </a:p>
+          <a:p>
+            <a:pPr marL="0" indent="0">
+              <a:lnSpc>
+                <a:spcPct val="120000"/>
+              </a:lnSpc>
+              <a:buNone/>
+            </a:pPr>
+            <a:r>
+              <a:rPr lang="en-US" sz="1800" dirty="0">
+                <a:latin typeface="Georgia" panose="02040502050405020303" pitchFamily="18" charset="0"/>
+              </a:rPr>
+              <a:t>jesus1.wav: 0.9942425674771389</a:t>
+            </a:r>
+          </a:p>
+        </p:txBody>
+      </p:sp>
+    </p:spTree>
+    <p:extLst>
+      <p:ext uri="{BB962C8B-B14F-4D97-AF65-F5344CB8AC3E}">
+        <p14:creationId xmlns:p14="http://schemas.microsoft.com/office/powerpoint/2010/main" val="3215222808"/>
+      </p:ext>
+    </p:extLst>
+  </p:cSld>
+  <p:clrMapOvr>
+    <a:masterClrMapping/>
+  </p:clrMapOvr>
+</p:sld>
+</file>
+
+<file path=ppt/slides/slide12.xml><?xml version="1.0" encoding="utf-8"?>
 <p:sld xmlns:a="http://schemas.openxmlformats.org/drawingml/2006/main" xmlns:r="http://schemas.openxmlformats.org/officeDocument/2006/relationships" xmlns:p="http://schemas.openxmlformats.org/presentationml/2006/main">
   <p:cSld>
     <p:spTree>
@@ -3831,6 +3807,204 @@
           <p:cNvPr id="2" name="Title 1">
             <a:extLst>
               <a:ext uri="{FF2B5EF4-FFF2-40B4-BE49-F238E27FC236}">
+                <a16:creationId xmlns:a16="http://schemas.microsoft.com/office/drawing/2014/main" id="{F07483F7-F105-EE9E-F945-2F2CB35CB47D}"/>
+              </a:ext>
+            </a:extLst>
+          </p:cNvPr>
+          <p:cNvSpPr>
+            <a:spLocks noGrp="1"/>
+          </p:cNvSpPr>
+          <p:nvPr>
+            <p:ph type="title"/>
+          </p:nvPr>
+        </p:nvSpPr>
+        <p:spPr/>
+        <p:txBody>
+          <a:bodyPr/>
+          <a:lstStyle/>
+          <a:p>
+            <a:r>
+              <a:rPr lang="en-US"/>
+              <a:t>Report:</a:t>
+            </a:r>
+          </a:p>
+        </p:txBody>
+      </p:sp>
+      <p:sp>
+        <p:nvSpPr>
+          <p:cNvPr id="3" name="Content Placeholder 2">
+            <a:extLst>
+              <a:ext uri="{FF2B5EF4-FFF2-40B4-BE49-F238E27FC236}">
+                <a16:creationId xmlns:a16="http://schemas.microsoft.com/office/drawing/2014/main" id="{33A656DA-C422-EF35-BC3F-B165CA0927E0}"/>
+              </a:ext>
+            </a:extLst>
+          </p:cNvPr>
+          <p:cNvSpPr>
+            <a:spLocks noGrp="1"/>
+          </p:cNvSpPr>
+          <p:nvPr>
+            <p:ph idx="1"/>
+          </p:nvPr>
+        </p:nvSpPr>
+        <p:spPr/>
+        <p:txBody>
+          <a:bodyPr>
+            <a:normAutofit/>
+          </a:bodyPr>
+          <a:lstStyle/>
+          <a:p>
+            <a:pPr marL="0" indent="0">
+              <a:buNone/>
+            </a:pPr>
+            <a:r>
+              <a:rPr lang="en-US" dirty="0"/>
+              <a:t>Similar to wilderness1.wav:</a:t>
+            </a:r>
+          </a:p>
+          <a:p>
+            <a:pPr marL="0" indent="0">
+              <a:buNone/>
+            </a:pPr>
+            <a:r>
+              <a:rPr lang="en-US" dirty="0"/>
+              <a:t>wilderness1.wav: 1</a:t>
+            </a:r>
+          </a:p>
+          <a:p>
+            <a:pPr marL="0" indent="0">
+              <a:buNone/>
+            </a:pPr>
+            <a:r>
+              <a:rPr lang="en-US" dirty="0"/>
+              <a:t>wilderness2.wav: 0.7229432647124682</a:t>
+            </a:r>
+          </a:p>
+          <a:p>
+            <a:pPr marL="0" indent="0">
+              <a:buNone/>
+            </a:pPr>
+            <a:endParaRPr lang="en-US" dirty="0"/>
+          </a:p>
+          <a:p>
+            <a:pPr marL="0" indent="0">
+              <a:buNone/>
+            </a:pPr>
+            <a:r>
+              <a:rPr lang="en-US" dirty="0"/>
+              <a:t>jesus2.wav: 0.3134769071964211</a:t>
+            </a:r>
+          </a:p>
+          <a:p>
+            <a:pPr marL="0" indent="0">
+              <a:buNone/>
+            </a:pPr>
+            <a:r>
+              <a:rPr lang="en-US" dirty="0"/>
+              <a:t>God1.wav: 0.23680512842732715</a:t>
+            </a:r>
+          </a:p>
+          <a:p>
+            <a:pPr marL="0" indent="0">
+              <a:buNone/>
+            </a:pPr>
+            <a:r>
+              <a:rPr lang="en-US" dirty="0"/>
+              <a:t>jesus1.wav: 0.21231795463558845</a:t>
+            </a:r>
+          </a:p>
+          <a:p>
+            <a:pPr marL="0" indent="0">
+              <a:buNone/>
+            </a:pPr>
+            <a:r>
+              <a:rPr lang="en-US" dirty="0"/>
+              <a:t>God2.wav: 0.1635381466180469 </a:t>
+            </a:r>
+          </a:p>
+        </p:txBody>
+      </p:sp>
+      <p:pic>
+        <p:nvPicPr>
+          <p:cNvPr id="1026" name="Picture 2" descr="works on my machine, starburst">
+            <a:extLst>
+              <a:ext uri="{FF2B5EF4-FFF2-40B4-BE49-F238E27FC236}">
+                <a16:creationId xmlns:a16="http://schemas.microsoft.com/office/drawing/2014/main" id="{BB8EF7DC-FBE5-822B-4324-2DAEFC2EC8BF}"/>
+              </a:ext>
+            </a:extLst>
+          </p:cNvPr>
+          <p:cNvPicPr>
+            <a:picLocks noChangeAspect="1" noChangeArrowheads="1"/>
+          </p:cNvPicPr>
+          <p:nvPr/>
+        </p:nvPicPr>
+        <p:blipFill>
+          <a:blip r:embed="rId2">
+            <a:extLst>
+              <a:ext uri="{28A0092B-C50C-407E-A947-70E740481C1C}">
+                <a14:useLocalDpi xmlns:a14="http://schemas.microsoft.com/office/drawing/2010/main" val="0"/>
+              </a:ext>
+            </a:extLst>
+          </a:blip>
+          <a:srcRect/>
+          <a:stretch>
+            <a:fillRect/>
+          </a:stretch>
+        </p:blipFill>
+        <p:spPr bwMode="auto">
+          <a:xfrm>
+            <a:off x="8064253" y="838994"/>
+            <a:ext cx="1905000" cy="1838325"/>
+          </a:xfrm>
+          <a:prstGeom prst="rect">
+            <a:avLst/>
+          </a:prstGeom>
+          <a:noFill/>
+          <a:extLst>
+            <a:ext uri="{909E8E84-426E-40DD-AFC4-6F175D3DCCD1}">
+              <a14:hiddenFill xmlns:a14="http://schemas.microsoft.com/office/drawing/2010/main">
+                <a:solidFill>
+                  <a:srgbClr val="FFFFFF"/>
+                </a:solidFill>
+              </a14:hiddenFill>
+            </a:ext>
+          </a:extLst>
+        </p:spPr>
+      </p:pic>
+    </p:spTree>
+    <p:extLst>
+      <p:ext uri="{BB962C8B-B14F-4D97-AF65-F5344CB8AC3E}">
+        <p14:creationId xmlns:p14="http://schemas.microsoft.com/office/powerpoint/2010/main" val="2692368703"/>
+      </p:ext>
+    </p:extLst>
+  </p:cSld>
+  <p:clrMapOvr>
+    <a:masterClrMapping/>
+  </p:clrMapOvr>
+</p:sld>
+</file>
+
+<file path=ppt/slides/slide13.xml><?xml version="1.0" encoding="utf-8"?>
+<p:sld xmlns:a="http://schemas.openxmlformats.org/drawingml/2006/main" xmlns:r="http://schemas.openxmlformats.org/officeDocument/2006/relationships" xmlns:p="http://schemas.openxmlformats.org/presentationml/2006/main">
+  <p:cSld>
+    <p:spTree>
+      <p:nvGrpSpPr>
+        <p:cNvPr id="1" name=""/>
+        <p:cNvGrpSpPr/>
+        <p:nvPr/>
+      </p:nvGrpSpPr>
+      <p:grpSpPr>
+        <a:xfrm>
+          <a:off x="0" y="0"/>
+          <a:ext cx="0" cy="0"/>
+          <a:chOff x="0" y="0"/>
+          <a:chExt cx="0" cy="0"/>
+        </a:xfrm>
+      </p:grpSpPr>
+      <p:sp>
+        <p:nvSpPr>
+          <p:cNvPr id="2" name="Title 1">
+            <a:extLst>
+              <a:ext uri="{FF2B5EF4-FFF2-40B4-BE49-F238E27FC236}">
                 <a16:creationId xmlns:a16="http://schemas.microsoft.com/office/drawing/2014/main" id="{5B24CD70-B7ED-27E6-4EAD-F9192B5AB679}"/>
               </a:ext>
             </a:extLst>
@@ -3904,7 +4078,7 @@
 </p:sld>
 </file>
 
-<file path=ppt/slides/slide12.xml><?xml version="1.0" encoding="utf-8"?>
+<file path=ppt/slides/slide14.xml><?xml version="1.0" encoding="utf-8"?>
 <p:sld xmlns:a="http://schemas.openxmlformats.org/drawingml/2006/main" xmlns:r="http://schemas.openxmlformats.org/officeDocument/2006/relationships" xmlns:p="http://schemas.openxmlformats.org/presentationml/2006/main">
   <p:cSld>
     <p:spTree>
@@ -5087,7 +5261,511 @@
 </p:sld>
 </file>
 
+<file path=ppt/slides/slide15.xml><?xml version="1.0" encoding="utf-8"?>
+<p:sld xmlns:a="http://schemas.openxmlformats.org/drawingml/2006/main" xmlns:r="http://schemas.openxmlformats.org/officeDocument/2006/relationships" xmlns:p="http://schemas.openxmlformats.org/presentationml/2006/main">
+  <p:cSld>
+    <p:spTree>
+      <p:nvGrpSpPr>
+        <p:cNvPr id="1" name="">
+          <a:extLst>
+            <a:ext uri="{FF2B5EF4-FFF2-40B4-BE49-F238E27FC236}">
+              <a16:creationId xmlns:a16="http://schemas.microsoft.com/office/drawing/2014/main" id="{1FCC7695-75EC-2122-53A1-EACEC67AE159}"/>
+            </a:ext>
+          </a:extLst>
+        </p:cNvPr>
+        <p:cNvGrpSpPr/>
+        <p:nvPr/>
+      </p:nvGrpSpPr>
+      <p:grpSpPr>
+        <a:xfrm>
+          <a:off x="0" y="0"/>
+          <a:ext cx="0" cy="0"/>
+          <a:chOff x="0" y="0"/>
+          <a:chExt cx="0" cy="0"/>
+        </a:xfrm>
+      </p:grpSpPr>
+      <p:sp>
+        <p:nvSpPr>
+          <p:cNvPr id="2" name="Title 1">
+            <a:extLst>
+              <a:ext uri="{FF2B5EF4-FFF2-40B4-BE49-F238E27FC236}">
+                <a16:creationId xmlns:a16="http://schemas.microsoft.com/office/drawing/2014/main" id="{F0CE6BDC-A7E4-907D-6372-B8AC1EEBD578}"/>
+              </a:ext>
+            </a:extLst>
+          </p:cNvPr>
+          <p:cNvSpPr>
+            <a:spLocks noGrp="1"/>
+          </p:cNvSpPr>
+          <p:nvPr>
+            <p:ph type="title"/>
+          </p:nvPr>
+        </p:nvSpPr>
+        <p:spPr/>
+        <p:txBody>
+          <a:bodyPr/>
+          <a:lstStyle/>
+          <a:p>
+            <a:r>
+              <a:rPr lang="en-US" dirty="0"/>
+              <a:t>(Analytical) Limitations</a:t>
+            </a:r>
+          </a:p>
+        </p:txBody>
+      </p:sp>
+      <p:sp>
+        <p:nvSpPr>
+          <p:cNvPr id="3" name="Content Placeholder 2">
+            <a:extLst>
+              <a:ext uri="{FF2B5EF4-FFF2-40B4-BE49-F238E27FC236}">
+                <a16:creationId xmlns:a16="http://schemas.microsoft.com/office/drawing/2014/main" id="{AB2D4B4D-1B91-FC3E-15CA-3651AA7854E3}"/>
+              </a:ext>
+            </a:extLst>
+          </p:cNvPr>
+          <p:cNvSpPr>
+            <a:spLocks noGrp="1"/>
+          </p:cNvSpPr>
+          <p:nvPr>
+            <p:ph idx="1"/>
+          </p:nvPr>
+        </p:nvSpPr>
+        <p:spPr/>
+        <p:txBody>
+          <a:bodyPr/>
+          <a:lstStyle/>
+          <a:p>
+            <a:pPr marL="0" indent="0">
+              <a:buNone/>
+            </a:pPr>
+            <a:r>
+              <a:rPr lang="en-US" dirty="0"/>
+              <a:t>- Supervised method:</a:t>
+            </a:r>
+          </a:p>
+          <a:p>
+            <a:pPr marL="0" indent="0">
+              <a:buNone/>
+            </a:pPr>
+            <a:r>
+              <a:rPr lang="en-US" i="1" dirty="0"/>
+              <a:t>	- </a:t>
+            </a:r>
+            <a:r>
+              <a:rPr lang="en-US" dirty="0"/>
+              <a:t>Requires tagged data</a:t>
+            </a:r>
+          </a:p>
+          <a:p>
+            <a:pPr marL="0" indent="0">
+              <a:buNone/>
+            </a:pPr>
+            <a:endParaRPr lang="en-US" i="1" dirty="0"/>
+          </a:p>
+          <a:p>
+            <a:pPr marL="0" indent="0">
+              <a:buNone/>
+            </a:pPr>
+            <a:r>
+              <a:rPr lang="en-US" i="1" dirty="0"/>
+              <a:t>- </a:t>
+            </a:r>
+            <a:r>
+              <a:rPr lang="en-US" dirty="0"/>
+              <a:t>Poverty of stimulus:</a:t>
+            </a:r>
+          </a:p>
+          <a:p>
+            <a:pPr marL="0" indent="0">
+              <a:buNone/>
+            </a:pPr>
+            <a:r>
+              <a:rPr lang="en-US" i="1" dirty="0"/>
+              <a:t>	-</a:t>
+            </a:r>
+            <a:r>
+              <a:rPr lang="en-US" dirty="0"/>
+              <a:t> Needs to collect more data </a:t>
+            </a:r>
+            <a:r>
+              <a:rPr lang="en-US"/>
+              <a:t>over time</a:t>
+            </a:r>
+            <a:endParaRPr lang="en-US" i="1" dirty="0"/>
+          </a:p>
+          <a:p>
+            <a:pPr marL="0" indent="0">
+              <a:buNone/>
+            </a:pPr>
+            <a:endParaRPr lang="en-US" dirty="0"/>
+          </a:p>
+        </p:txBody>
+      </p:sp>
+    </p:spTree>
+    <p:extLst>
+      <p:ext uri="{BB962C8B-B14F-4D97-AF65-F5344CB8AC3E}">
+        <p14:creationId xmlns:p14="http://schemas.microsoft.com/office/powerpoint/2010/main" val="445627313"/>
+      </p:ext>
+    </p:extLst>
+  </p:cSld>
+  <p:clrMapOvr>
+    <a:masterClrMapping/>
+  </p:clrMapOvr>
+</p:sld>
+</file>
+
+<file path=ppt/slides/slide16.xml><?xml version="1.0" encoding="utf-8"?>
+<p:sld xmlns:a="http://schemas.openxmlformats.org/drawingml/2006/main" xmlns:r="http://schemas.openxmlformats.org/officeDocument/2006/relationships" xmlns:p="http://schemas.openxmlformats.org/presentationml/2006/main">
+  <p:cSld>
+    <p:spTree>
+      <p:nvGrpSpPr>
+        <p:cNvPr id="1" name="">
+          <a:extLst>
+            <a:ext uri="{FF2B5EF4-FFF2-40B4-BE49-F238E27FC236}">
+              <a16:creationId xmlns:a16="http://schemas.microsoft.com/office/drawing/2014/main" id="{6D89CB16-FC26-D779-3F51-EF4D27618D47}"/>
+            </a:ext>
+          </a:extLst>
+        </p:cNvPr>
+        <p:cNvGrpSpPr/>
+        <p:nvPr/>
+      </p:nvGrpSpPr>
+      <p:grpSpPr>
+        <a:xfrm>
+          <a:off x="0" y="0"/>
+          <a:ext cx="0" cy="0"/>
+          <a:chOff x="0" y="0"/>
+          <a:chExt cx="0" cy="0"/>
+        </a:xfrm>
+      </p:grpSpPr>
+      <p:sp>
+        <p:nvSpPr>
+          <p:cNvPr id="2" name="Title 1">
+            <a:extLst>
+              <a:ext uri="{FF2B5EF4-FFF2-40B4-BE49-F238E27FC236}">
+                <a16:creationId xmlns:a16="http://schemas.microsoft.com/office/drawing/2014/main" id="{7F3CB485-135B-6C6C-F8FB-C43F8E63E21B}"/>
+              </a:ext>
+            </a:extLst>
+          </p:cNvPr>
+          <p:cNvSpPr>
+            <a:spLocks noGrp="1"/>
+          </p:cNvSpPr>
+          <p:nvPr>
+            <p:ph type="title"/>
+          </p:nvPr>
+        </p:nvSpPr>
+        <p:spPr/>
+        <p:txBody>
+          <a:bodyPr/>
+          <a:lstStyle/>
+          <a:p>
+            <a:r>
+              <a:rPr lang="en-US" dirty="0"/>
+              <a:t>(Practical) Limitations</a:t>
+            </a:r>
+          </a:p>
+        </p:txBody>
+      </p:sp>
+      <p:sp>
+        <p:nvSpPr>
+          <p:cNvPr id="3" name="Content Placeholder 2">
+            <a:extLst>
+              <a:ext uri="{FF2B5EF4-FFF2-40B4-BE49-F238E27FC236}">
+                <a16:creationId xmlns:a16="http://schemas.microsoft.com/office/drawing/2014/main" id="{C95656B2-B138-5272-9F61-23B4F80A8F93}"/>
+              </a:ext>
+            </a:extLst>
+          </p:cNvPr>
+          <p:cNvSpPr>
+            <a:spLocks noGrp="1"/>
+          </p:cNvSpPr>
+          <p:nvPr>
+            <p:ph idx="1"/>
+          </p:nvPr>
+        </p:nvSpPr>
+        <p:spPr/>
+        <p:txBody>
+          <a:bodyPr/>
+          <a:lstStyle/>
+          <a:p>
+            <a:pPr marL="0" indent="0">
+              <a:buNone/>
+            </a:pPr>
+            <a:r>
+              <a:rPr lang="en-US" dirty="0"/>
+              <a:t>- Requires Internet access</a:t>
+            </a:r>
+          </a:p>
+          <a:p>
+            <a:pPr marL="0" indent="0">
+              <a:buNone/>
+            </a:pPr>
+            <a:r>
+              <a:rPr lang="en-US" dirty="0"/>
+              <a:t>	- Also requires transmitting entire audio file</a:t>
+            </a:r>
+          </a:p>
+          <a:p>
+            <a:pPr marL="0" indent="0">
+              <a:buNone/>
+            </a:pPr>
+            <a:r>
+              <a:rPr lang="en-US" dirty="0"/>
+              <a:t>	- ⁉ Possible to port to JS ? </a:t>
+            </a:r>
+            <a:r>
+              <a:rPr lang="en-US" dirty="0">
+                <a:sym typeface="Wingdings" panose="05000000000000000000" pitchFamily="2" charset="2"/>
+              </a:rPr>
+              <a:t> Transmit “Fingerprint”</a:t>
+            </a:r>
+            <a:r>
+              <a:rPr lang="en-US" dirty="0"/>
+              <a:t> </a:t>
+            </a:r>
+          </a:p>
+          <a:p>
+            <a:pPr marL="0" indent="0">
+              <a:buNone/>
+            </a:pPr>
+            <a:endParaRPr lang="en-US" dirty="0"/>
+          </a:p>
+          <a:p>
+            <a:pPr marL="0" indent="0">
+              <a:buNone/>
+            </a:pPr>
+            <a:r>
+              <a:rPr lang="en-US" dirty="0"/>
+              <a:t>- </a:t>
+            </a:r>
+            <a:r>
+              <a:rPr lang="en-US" b="1" dirty="0"/>
+              <a:t>File format </a:t>
+            </a:r>
+            <a:r>
+              <a:rPr lang="en-US" dirty="0"/>
+              <a:t>impedance:</a:t>
+            </a:r>
+          </a:p>
+          <a:p>
+            <a:pPr marL="0" indent="0">
+              <a:buNone/>
+            </a:pPr>
+            <a:r>
+              <a:rPr lang="en-US" dirty="0"/>
+              <a:t>	Web audio uses </a:t>
+            </a:r>
+            <a:r>
+              <a:rPr lang="en-US" i="1" dirty="0" err="1"/>
+              <a:t>webm</a:t>
+            </a:r>
+            <a:r>
+              <a:rPr lang="en-US" i="1" dirty="0"/>
+              <a:t>/</a:t>
+            </a:r>
+            <a:r>
+              <a:rPr lang="en-US" i="1" dirty="0" err="1"/>
+              <a:t>ogg</a:t>
+            </a:r>
+            <a:r>
+              <a:rPr lang="en-US" i="1" dirty="0"/>
+              <a:t>, </a:t>
+            </a:r>
+            <a:br>
+              <a:rPr lang="en-US" i="1" dirty="0"/>
+            </a:br>
+            <a:r>
+              <a:rPr lang="en-US" i="1" dirty="0"/>
+              <a:t>	</a:t>
+            </a:r>
+            <a:r>
+              <a:rPr lang="en-US" dirty="0"/>
+              <a:t>but analysis libraries use </a:t>
+            </a:r>
+            <a:r>
+              <a:rPr lang="en-US" i="1" dirty="0"/>
+              <a:t>wav/mp3</a:t>
+            </a:r>
+          </a:p>
+          <a:p>
+            <a:pPr marL="0" indent="0">
+              <a:buNone/>
+            </a:pPr>
+            <a:endParaRPr lang="en-US" dirty="0"/>
+          </a:p>
+        </p:txBody>
+      </p:sp>
+    </p:spTree>
+    <p:extLst>
+      <p:ext uri="{BB962C8B-B14F-4D97-AF65-F5344CB8AC3E}">
+        <p14:creationId xmlns:p14="http://schemas.microsoft.com/office/powerpoint/2010/main" val="2097374177"/>
+      </p:ext>
+    </p:extLst>
+  </p:cSld>
+  <p:clrMapOvr>
+    <a:masterClrMapping/>
+  </p:clrMapOvr>
+</p:sld>
+</file>
+
 <file path=ppt/slides/slide2.xml><?xml version="1.0" encoding="utf-8"?>
+<p:sld xmlns:a="http://schemas.openxmlformats.org/drawingml/2006/main" xmlns:r="http://schemas.openxmlformats.org/officeDocument/2006/relationships" xmlns:p="http://schemas.openxmlformats.org/presentationml/2006/main">
+  <p:cSld>
+    <p:spTree>
+      <p:nvGrpSpPr>
+        <p:cNvPr id="1" name="">
+          <a:extLst>
+            <a:ext uri="{FF2B5EF4-FFF2-40B4-BE49-F238E27FC236}">
+              <a16:creationId xmlns:a16="http://schemas.microsoft.com/office/drawing/2014/main" id="{22DF9C79-3E28-99C8-7637-4083F42174A5}"/>
+            </a:ext>
+          </a:extLst>
+        </p:cNvPr>
+        <p:cNvGrpSpPr/>
+        <p:nvPr/>
+      </p:nvGrpSpPr>
+      <p:grpSpPr>
+        <a:xfrm>
+          <a:off x="0" y="0"/>
+          <a:ext cx="0" cy="0"/>
+          <a:chOff x="0" y="0"/>
+          <a:chExt cx="0" cy="0"/>
+        </a:xfrm>
+      </p:grpSpPr>
+      <p:sp>
+        <p:nvSpPr>
+          <p:cNvPr id="2" name="Title 1">
+            <a:extLst>
+              <a:ext uri="{FF2B5EF4-FFF2-40B4-BE49-F238E27FC236}">
+                <a16:creationId xmlns:a16="http://schemas.microsoft.com/office/drawing/2014/main" id="{3111F55A-5E9D-E1FD-1E9E-E03CF38D1192}"/>
+              </a:ext>
+            </a:extLst>
+          </p:cNvPr>
+          <p:cNvSpPr>
+            <a:spLocks noGrp="1"/>
+          </p:cNvSpPr>
+          <p:nvPr>
+            <p:ph type="title"/>
+          </p:nvPr>
+        </p:nvSpPr>
+        <p:spPr/>
+        <p:txBody>
+          <a:bodyPr/>
+          <a:lstStyle/>
+          <a:p>
+            <a:r>
+              <a:rPr lang="en-US" dirty="0" err="1"/>
+              <a:t>uW</a:t>
+            </a:r>
+            <a:r>
+              <a:rPr lang="en-US" dirty="0"/>
+              <a:t> Hackathon – 2024</a:t>
+            </a:r>
+          </a:p>
+        </p:txBody>
+      </p:sp>
+      <p:sp>
+        <p:nvSpPr>
+          <p:cNvPr id="3" name="Content Placeholder 2">
+            <a:extLst>
+              <a:ext uri="{FF2B5EF4-FFF2-40B4-BE49-F238E27FC236}">
+                <a16:creationId xmlns:a16="http://schemas.microsoft.com/office/drawing/2014/main" id="{6897B471-8C70-2B80-6711-11F968847A27}"/>
+              </a:ext>
+            </a:extLst>
+          </p:cNvPr>
+          <p:cNvSpPr>
+            <a:spLocks noGrp="1"/>
+          </p:cNvSpPr>
+          <p:nvPr>
+            <p:ph idx="1"/>
+          </p:nvPr>
+        </p:nvSpPr>
+        <p:spPr>
+          <a:xfrm>
+            <a:off x="328246" y="2076167"/>
+            <a:ext cx="11025554" cy="4511064"/>
+          </a:xfrm>
+        </p:spPr>
+        <p:txBody>
+          <a:bodyPr>
+            <a:normAutofit/>
+          </a:bodyPr>
+          <a:lstStyle/>
+          <a:p>
+            <a:pPr marL="0" indent="0">
+              <a:lnSpc>
+                <a:spcPct val="120000"/>
+              </a:lnSpc>
+              <a:buNone/>
+            </a:pPr>
+            <a:r>
+              <a:rPr lang="en-US" sz="3600" dirty="0">
+                <a:latin typeface="Georgia" panose="02040502050405020303" pitchFamily="18" charset="0"/>
+              </a:rPr>
+              <a:t>Keyword checking prototype </a:t>
+            </a:r>
+          </a:p>
+          <a:p>
+            <a:pPr marL="0" indent="0">
+              <a:lnSpc>
+                <a:spcPct val="120000"/>
+              </a:lnSpc>
+              <a:buNone/>
+            </a:pPr>
+            <a:r>
+              <a:rPr lang="en-US" sz="3600" dirty="0">
+                <a:latin typeface="Georgia" panose="02040502050405020303" pitchFamily="18" charset="0"/>
+              </a:rPr>
+              <a:t>AKA – “Is this thing on?”</a:t>
+            </a:r>
+          </a:p>
+        </p:txBody>
+      </p:sp>
+      <p:pic>
+        <p:nvPicPr>
+          <p:cNvPr id="6" name="Picture 5" descr="A person standing on a stage holding a box with a microphone&#10;&#10;Description automatically generated">
+            <a:extLst>
+              <a:ext uri="{FF2B5EF4-FFF2-40B4-BE49-F238E27FC236}">
+                <a16:creationId xmlns:a16="http://schemas.microsoft.com/office/drawing/2014/main" id="{BA41436D-E2B5-32E3-074C-4D0A7FA9BEC1}"/>
+              </a:ext>
+            </a:extLst>
+          </p:cNvPr>
+          <p:cNvPicPr>
+            <a:picLocks noChangeAspect="1"/>
+          </p:cNvPicPr>
+          <p:nvPr/>
+        </p:nvPicPr>
+        <p:blipFill>
+          <a:blip r:embed="rId2">
+            <a:extLst>
+              <a:ext uri="{28A0092B-C50C-407E-A947-70E740481C1C}">
+                <a14:useLocalDpi xmlns:a14="http://schemas.microsoft.com/office/drawing/2010/main" val="0"/>
+              </a:ext>
+            </a:extLst>
+          </a:blip>
+          <a:stretch>
+            <a:fillRect/>
+          </a:stretch>
+        </p:blipFill>
+        <p:spPr>
+          <a:xfrm>
+            <a:off x="7246815" y="2076167"/>
+            <a:ext cx="4763477" cy="4763477"/>
+          </a:xfrm>
+          <a:prstGeom prst="rect">
+            <a:avLst/>
+          </a:prstGeom>
+        </p:spPr>
+      </p:pic>
+    </p:spTree>
+    <p:extLst>
+      <p:ext uri="{BB962C8B-B14F-4D97-AF65-F5344CB8AC3E}">
+        <p14:creationId xmlns:p14="http://schemas.microsoft.com/office/powerpoint/2010/main" val="907859234"/>
+      </p:ext>
+    </p:extLst>
+  </p:cSld>
+  <p:clrMapOvr>
+    <a:masterClrMapping/>
+  </p:clrMapOvr>
+</p:sld>
+</file>
+
+<file path=ppt/slides/slide3.xml><?xml version="1.0" encoding="utf-8"?>
 <p:sld xmlns:a="http://schemas.openxmlformats.org/drawingml/2006/main" xmlns:r="http://schemas.openxmlformats.org/officeDocument/2006/relationships" xmlns:p="http://schemas.openxmlformats.org/presentationml/2006/main">
   <p:cSld>
     <p:spTree>
@@ -5110,12 +5788,148 @@
           <a:chExt cx="0" cy="0"/>
         </a:xfrm>
       </p:grpSpPr>
+      <p:sp>
+        <p:nvSpPr>
+          <p:cNvPr id="3" name="Content Placeholder 2">
+            <a:extLst>
+              <a:ext uri="{FF2B5EF4-FFF2-40B4-BE49-F238E27FC236}">
+                <a16:creationId xmlns:a16="http://schemas.microsoft.com/office/drawing/2014/main" id="{9D090549-E39A-95CD-1921-17A8F4E3F1A5}"/>
+              </a:ext>
+            </a:extLst>
+          </p:cNvPr>
+          <p:cNvSpPr>
+            <a:spLocks noGrp="1"/>
+          </p:cNvSpPr>
+          <p:nvPr>
+            <p:ph idx="1"/>
+          </p:nvPr>
+        </p:nvSpPr>
+        <p:spPr/>
+        <p:txBody>
+          <a:bodyPr>
+            <a:normAutofit/>
+          </a:bodyPr>
+          <a:lstStyle/>
+          <a:p>
+            <a:pPr marL="0" indent="0">
+              <a:buNone/>
+            </a:pPr>
+            <a:r>
+              <a:rPr lang="en-US" dirty="0"/>
+              <a:t>Method:</a:t>
+            </a:r>
+          </a:p>
+          <a:p>
+            <a:pPr marL="0" indent="0">
+              <a:buNone/>
+            </a:pPr>
+            <a:r>
+              <a:rPr lang="en-US" dirty="0"/>
+              <a:t>Python packages:</a:t>
+            </a:r>
+          </a:p>
+          <a:p>
+            <a:pPr marL="0" indent="0">
+              <a:buNone/>
+            </a:pPr>
+            <a:r>
+              <a:rPr lang="en-US" dirty="0"/>
+              <a:t>- </a:t>
+            </a:r>
+            <a:r>
+              <a:rPr lang="en-US" dirty="0" err="1"/>
+              <a:t>librosa</a:t>
+            </a:r>
+            <a:r>
+              <a:rPr lang="en-US" dirty="0"/>
+              <a:t>	Encoding audio data</a:t>
+            </a:r>
+          </a:p>
+          <a:p>
+            <a:pPr marL="0" indent="0">
+              <a:buNone/>
+            </a:pPr>
+            <a:endParaRPr lang="en-US" dirty="0"/>
+          </a:p>
+          <a:p>
+            <a:pPr marL="514350" indent="-514350">
+              <a:buAutoNum type="arabicPeriod"/>
+            </a:pPr>
+            <a:r>
+              <a:rPr lang="en-US" dirty="0"/>
+              <a:t>Collect the Data</a:t>
+            </a:r>
+          </a:p>
+          <a:p>
+            <a:pPr marL="514350" indent="-514350">
+              <a:buAutoNum type="arabicPeriod"/>
+            </a:pPr>
+            <a:r>
+              <a:rPr lang="en-US" dirty="0"/>
+              <a:t>Clean the Data</a:t>
+            </a:r>
+          </a:p>
+          <a:p>
+            <a:pPr marL="514350" indent="-514350">
+              <a:buAutoNum type="arabicPeriod"/>
+            </a:pPr>
+            <a:r>
+              <a:rPr lang="en-US" dirty="0"/>
+              <a:t>Explore/Visualize the Data</a:t>
+            </a:r>
+          </a:p>
+          <a:p>
+            <a:pPr marL="0" indent="0">
+              <a:buNone/>
+            </a:pPr>
+            <a:endParaRPr lang="en-US" dirty="0"/>
+          </a:p>
+          <a:p>
+            <a:pPr marL="0" indent="0">
+              <a:buNone/>
+            </a:pPr>
+            <a:endParaRPr lang="en-US" dirty="0"/>
+          </a:p>
+        </p:txBody>
+      </p:sp>
+      <p:sp>
+        <p:nvSpPr>
+          <p:cNvPr id="2" name="Title 1">
+            <a:extLst>
+              <a:ext uri="{FF2B5EF4-FFF2-40B4-BE49-F238E27FC236}">
+                <a16:creationId xmlns:a16="http://schemas.microsoft.com/office/drawing/2014/main" id="{186F3137-2A61-B919-17E2-7AE5D8C49FDE}"/>
+              </a:ext>
+            </a:extLst>
+          </p:cNvPr>
+          <p:cNvSpPr>
+            <a:spLocks noGrp="1"/>
+          </p:cNvSpPr>
+          <p:nvPr>
+            <p:ph type="title"/>
+          </p:nvPr>
+        </p:nvSpPr>
+        <p:spPr/>
+        <p:txBody>
+          <a:bodyPr/>
+          <a:lstStyle/>
+          <a:p>
+            <a:r>
+              <a:rPr lang="en-US" dirty="0" err="1"/>
+              <a:t>uW</a:t>
+            </a:r>
+            <a:r>
+              <a:rPr lang="en-US" dirty="0"/>
+              <a:t> Hackathon – 2024</a:t>
+            </a:r>
+          </a:p>
+        </p:txBody>
+      </p:sp>
       <p:pic>
         <p:nvPicPr>
-          <p:cNvPr id="4" name="Picture 3" descr="A red and white tag with white text&#10;&#10;Description automatically generated">
+          <p:cNvPr id="5" name="Picture 4" descr="A red and white tag with white text&#10;&#10;Description automatically generated">
             <a:extLst>
               <a:ext uri="{FF2B5EF4-FFF2-40B4-BE49-F238E27FC236}">
-                <a16:creationId xmlns:a16="http://schemas.microsoft.com/office/drawing/2014/main" id="{AFCBF54E-4FE4-02F3-7050-5B9D1DF75B66}"/>
+                <a16:creationId xmlns:a16="http://schemas.microsoft.com/office/drawing/2014/main" id="{AED5D47C-E738-287E-2DDC-2F4377258A6C}"/>
               </a:ext>
             </a:extLst>
           </p:cNvPr>
@@ -5127,6 +5941,34 @@
         <p:blipFill>
           <a:blip r:embed="rId2">
             <a:extLst>
+              <a:ext uri="{BEBA8EAE-BF5A-486C-A8C5-ECC9F3942E4B}">
+                <a14:imgProps xmlns:a14="http://schemas.microsoft.com/office/drawing/2010/main">
+                  <a14:imgLayer r:embed="rId3">
+                    <a14:imgEffect>
+                      <a14:backgroundRemoval t="10000" b="90000" l="10000" r="90000">
+                        <a14:foregroundMark x1="23242" y1="34277" x2="19922" y2="49902"/>
+                        <a14:foregroundMark x1="19922" y1="49902" x2="27051" y2="56055"/>
+                        <a14:foregroundMark x1="27051" y1="56055" x2="35547" y2="50195"/>
+                        <a14:foregroundMark x1="35547" y1="50195" x2="33398" y2="36719"/>
+                        <a14:foregroundMark x1="33398" y1="36719" x2="25195" y2="33301"/>
+                        <a14:foregroundMark x1="25195" y1="33301" x2="23438" y2="33984"/>
+                        <a14:foregroundMark x1="28809" y1="37012" x2="25195" y2="45801"/>
+                        <a14:foregroundMark x1="25195" y1="45801" x2="30371" y2="49512"/>
+                        <a14:foregroundMark x1="42480" y1="34863" x2="42773" y2="43555"/>
+                        <a14:foregroundMark x1="42773" y1="43555" x2="50488" y2="40918"/>
+                        <a14:foregroundMark x1="50488" y1="40918" x2="59961" y2="41211"/>
+                        <a14:foregroundMark x1="59961" y1="41211" x2="79492" y2="34961"/>
+                        <a14:foregroundMark x1="79492" y1="34961" x2="79395" y2="39063"/>
+                        <a14:foregroundMark x1="57715" y1="33301" x2="56934" y2="42969"/>
+                        <a14:foregroundMark x1="70703" y1="34180" x2="80664" y2="30566"/>
+                        <a14:foregroundMark x1="80664" y1="30566" x2="80957" y2="30273"/>
+                        <a14:foregroundMark x1="23535" y1="60449" x2="72754" y2="47070"/>
+                        <a14:foregroundMark x1="77344" y1="46289" x2="81738" y2="51367"/>
+                      </a14:backgroundRemoval>
+                    </a14:imgEffect>
+                  </a14:imgLayer>
+                </a14:imgProps>
+              </a:ext>
               <a:ext uri="{28A0092B-C50C-407E-A947-70E740481C1C}">
                 <a14:useLocalDpi xmlns:a14="http://schemas.microsoft.com/office/drawing/2010/main" val="0"/>
               </a:ext>
@@ -5138,150 +5980,14 @@
         </p:blipFill>
         <p:spPr>
           <a:xfrm>
-            <a:off x="3569286" y="2082414"/>
-            <a:ext cx="504825" cy="504825"/>
+            <a:off x="3582989" y="2109049"/>
+            <a:ext cx="473560" cy="473560"/>
           </a:xfrm>
           <a:prstGeom prst="rect">
             <a:avLst/>
           </a:prstGeom>
         </p:spPr>
       </p:pic>
-      <p:sp>
-        <p:nvSpPr>
-          <p:cNvPr id="2" name="Title 1">
-            <a:extLst>
-              <a:ext uri="{FF2B5EF4-FFF2-40B4-BE49-F238E27FC236}">
-                <a16:creationId xmlns:a16="http://schemas.microsoft.com/office/drawing/2014/main" id="{186F3137-2A61-B919-17E2-7AE5D8C49FDE}"/>
-              </a:ext>
-            </a:extLst>
-          </p:cNvPr>
-          <p:cNvSpPr>
-            <a:spLocks noGrp="1"/>
-          </p:cNvSpPr>
-          <p:nvPr>
-            <p:ph type="title"/>
-          </p:nvPr>
-        </p:nvSpPr>
-        <p:spPr/>
-        <p:txBody>
-          <a:bodyPr/>
-          <a:lstStyle/>
-          <a:p>
-            <a:r>
-              <a:rPr lang="en-US" dirty="0" err="1"/>
-              <a:t>uW</a:t>
-            </a:r>
-            <a:r>
-              <a:rPr lang="en-US" dirty="0"/>
-              <a:t> Hackathon – 2024</a:t>
-            </a:r>
-          </a:p>
-        </p:txBody>
-      </p:sp>
-      <p:sp>
-        <p:nvSpPr>
-          <p:cNvPr id="3" name="Content Placeholder 2">
-            <a:extLst>
-              <a:ext uri="{FF2B5EF4-FFF2-40B4-BE49-F238E27FC236}">
-                <a16:creationId xmlns:a16="http://schemas.microsoft.com/office/drawing/2014/main" id="{9D090549-E39A-95CD-1921-17A8F4E3F1A5}"/>
-              </a:ext>
-            </a:extLst>
-          </p:cNvPr>
-          <p:cNvSpPr>
-            <a:spLocks noGrp="1"/>
-          </p:cNvSpPr>
-          <p:nvPr>
-            <p:ph idx="1"/>
-          </p:nvPr>
-        </p:nvSpPr>
-        <p:spPr/>
-        <p:txBody>
-          <a:bodyPr>
-            <a:normAutofit/>
-          </a:bodyPr>
-          <a:lstStyle/>
-          <a:p>
-            <a:pPr marL="0" indent="0">
-              <a:buNone/>
-            </a:pPr>
-            <a:r>
-              <a:rPr lang="en-US" dirty="0"/>
-              <a:t>Method:</a:t>
-            </a:r>
-          </a:p>
-          <a:p>
-            <a:pPr marL="0" indent="0">
-              <a:buNone/>
-            </a:pPr>
-            <a:r>
-              <a:rPr lang="en-US" dirty="0"/>
-              <a:t>Python packages:</a:t>
-            </a:r>
-          </a:p>
-          <a:p>
-            <a:pPr marL="0" indent="0">
-              <a:buNone/>
-            </a:pPr>
-            <a:r>
-              <a:rPr lang="en-US" dirty="0"/>
-              <a:t>- </a:t>
-            </a:r>
-            <a:r>
-              <a:rPr lang="en-US" dirty="0" err="1"/>
-              <a:t>librosa</a:t>
-            </a:r>
-            <a:r>
-              <a:rPr lang="en-US" dirty="0"/>
-              <a:t>	Encoding audio data</a:t>
-            </a:r>
-          </a:p>
-          <a:p>
-            <a:pPr marL="0" indent="0">
-              <a:buNone/>
-            </a:pPr>
-            <a:endParaRPr lang="en-US" dirty="0"/>
-          </a:p>
-          <a:p>
-            <a:pPr marL="514350" indent="-514350">
-              <a:buAutoNum type="arabicPeriod"/>
-            </a:pPr>
-            <a:r>
-              <a:rPr lang="en-US" dirty="0"/>
-              <a:t>Collect the Data</a:t>
-            </a:r>
-          </a:p>
-          <a:p>
-            <a:pPr marL="514350" indent="-514350">
-              <a:buAutoNum type="arabicPeriod"/>
-            </a:pPr>
-            <a:r>
-              <a:rPr lang="en-US" dirty="0"/>
-              <a:t>Clean the Data</a:t>
-            </a:r>
-          </a:p>
-          <a:p>
-            <a:pPr marL="514350" indent="-514350">
-              <a:buAutoNum type="arabicPeriod"/>
-            </a:pPr>
-            <a:r>
-              <a:rPr lang="en-US" dirty="0"/>
-              <a:t>Explore/Visualize the Data</a:t>
-            </a:r>
-          </a:p>
-          <a:p>
-            <a:pPr marL="0" indent="0">
-              <a:buNone/>
-            </a:pPr>
-            <a:endParaRPr lang="en-US" dirty="0"/>
-          </a:p>
-          <a:p>
-            <a:pPr marL="0" indent="0">
-              <a:buNone/>
-            </a:pPr>
-            <a:endParaRPr lang="en-US" dirty="0"/>
-          </a:p>
-        </p:txBody>
-      </p:sp>
     </p:spTree>
     <p:extLst>
       <p:ext uri="{BB962C8B-B14F-4D97-AF65-F5344CB8AC3E}">
@@ -5295,7 +6001,7 @@
 </p:sld>
 </file>
 
-<file path=ppt/slides/slide3.xml><?xml version="1.0" encoding="utf-8"?>
+<file path=ppt/slides/slide4.xml><?xml version="1.0" encoding="utf-8"?>
 <p:sld xmlns:a="http://schemas.openxmlformats.org/drawingml/2006/main" xmlns:r="http://schemas.openxmlformats.org/officeDocument/2006/relationships" xmlns:p="http://schemas.openxmlformats.org/presentationml/2006/main">
   <p:cSld>
     <p:spTree>
@@ -5378,7 +6084,7 @@
 </p:sld>
 </file>
 
-<file path=ppt/slides/slide4.xml><?xml version="1.0" encoding="utf-8"?>
+<file path=ppt/slides/slide5.xml><?xml version="1.0" encoding="utf-8"?>
 <p:sld xmlns:a="http://schemas.openxmlformats.org/drawingml/2006/main" xmlns:r="http://schemas.openxmlformats.org/officeDocument/2006/relationships" xmlns:p="http://schemas.openxmlformats.org/presentationml/2006/main">
   <p:cSld>
     <p:spTree>
@@ -5721,7 +6427,7 @@
 </p:sld>
 </file>
 
-<file path=ppt/slides/slide5.xml><?xml version="1.0" encoding="utf-8"?>
+<file path=ppt/slides/slide6.xml><?xml version="1.0" encoding="utf-8"?>
 <p:sld xmlns:a="http://schemas.openxmlformats.org/drawingml/2006/main" xmlns:r="http://schemas.openxmlformats.org/officeDocument/2006/relationships" xmlns:p="http://schemas.openxmlformats.org/presentationml/2006/main">
   <p:cSld>
     <p:spTree>
@@ -5744,12 +6450,119 @@
           <a:chExt cx="0" cy="0"/>
         </a:xfrm>
       </p:grpSpPr>
+      <p:sp>
+        <p:nvSpPr>
+          <p:cNvPr id="2" name="Title 1">
+            <a:extLst>
+              <a:ext uri="{FF2B5EF4-FFF2-40B4-BE49-F238E27FC236}">
+                <a16:creationId xmlns:a16="http://schemas.microsoft.com/office/drawing/2014/main" id="{3F5D6987-8A7C-EF18-208A-7255EA476677}"/>
+              </a:ext>
+            </a:extLst>
+          </p:cNvPr>
+          <p:cNvSpPr>
+            <a:spLocks noGrp="1"/>
+          </p:cNvSpPr>
+          <p:nvPr>
+            <p:ph type="title"/>
+          </p:nvPr>
+        </p:nvSpPr>
+        <p:spPr/>
+        <p:txBody>
+          <a:bodyPr/>
+          <a:lstStyle/>
+          <a:p>
+            <a:r>
+              <a:rPr lang="en-US" dirty="0"/>
+              <a:t>Clean the Data</a:t>
+            </a:r>
+          </a:p>
+        </p:txBody>
+      </p:sp>
+      <p:sp>
+        <p:nvSpPr>
+          <p:cNvPr id="3" name="Content Placeholder 2">
+            <a:extLst>
+              <a:ext uri="{FF2B5EF4-FFF2-40B4-BE49-F238E27FC236}">
+                <a16:creationId xmlns:a16="http://schemas.microsoft.com/office/drawing/2014/main" id="{E50D8BDB-18E2-001C-F017-F1A04E850A70}"/>
+              </a:ext>
+            </a:extLst>
+          </p:cNvPr>
+          <p:cNvSpPr>
+            <a:spLocks noGrp="1"/>
+          </p:cNvSpPr>
+          <p:nvPr>
+            <p:ph idx="1"/>
+          </p:nvPr>
+        </p:nvSpPr>
+        <p:spPr>
+          <a:xfrm>
+            <a:off x="275208" y="1589103"/>
+            <a:ext cx="11078592" cy="4587860"/>
+          </a:xfrm>
+        </p:spPr>
+        <p:txBody>
+          <a:bodyPr/>
+          <a:lstStyle/>
+          <a:p>
+            <a:pPr marL="0" indent="0">
+              <a:buNone/>
+            </a:pPr>
+            <a:r>
+              <a:rPr lang="en-US" dirty="0">
+                <a:latin typeface="Georgia" panose="02040502050405020303" pitchFamily="18" charset="0"/>
+              </a:rPr>
+              <a:t>A standard process for cleaning speech data:</a:t>
+            </a:r>
+          </a:p>
+          <a:p>
+            <a:pPr marL="0" indent="0">
+              <a:buNone/>
+            </a:pPr>
+            <a:endParaRPr lang="en-US" b="1" dirty="0">
+              <a:latin typeface="Georgia" panose="02040502050405020303" pitchFamily="18" charset="0"/>
+            </a:endParaRPr>
+          </a:p>
+          <a:p>
+            <a:pPr marL="0" indent="0">
+              <a:buNone/>
+            </a:pPr>
+            <a:r>
+              <a:rPr lang="en-US" b="1" dirty="0">
+                <a:latin typeface="Georgia" panose="02040502050405020303" pitchFamily="18" charset="0"/>
+              </a:rPr>
+              <a:t>Pre-emphasis:</a:t>
+            </a:r>
+          </a:p>
+          <a:p>
+            <a:pPr marL="0" indent="0">
+              <a:buNone/>
+            </a:pPr>
+            <a:r>
+              <a:rPr lang="en-US" dirty="0">
+                <a:latin typeface="Georgia" panose="02040502050405020303" pitchFamily="18" charset="0"/>
+              </a:rPr>
+              <a:t>“Lowering the ceiling”</a:t>
+            </a:r>
+          </a:p>
+          <a:p>
+            <a:pPr marL="0" indent="0">
+              <a:buNone/>
+            </a:pPr>
+            <a:r>
+              <a:rPr lang="en-US" dirty="0">
+                <a:latin typeface="Georgia" panose="02040502050405020303" pitchFamily="18" charset="0"/>
+              </a:rPr>
+              <a:t>~ “reducing contrast”</a:t>
+            </a:r>
+          </a:p>
+        </p:txBody>
+      </p:sp>
       <p:pic>
         <p:nvPicPr>
-          <p:cNvPr id="9" name="Picture 8" descr="A red and white tag with white text&#10;&#10;Description automatically generated">
+          <p:cNvPr id="4" name="Picture 3" descr="A red and white tag with white text&#10;&#10;Description automatically generated">
             <a:extLst>
               <a:ext uri="{FF2B5EF4-FFF2-40B4-BE49-F238E27FC236}">
-                <a16:creationId xmlns:a16="http://schemas.microsoft.com/office/drawing/2014/main" id="{A6FF4597-D405-290D-B155-B961B9A7DB79}"/>
+                <a16:creationId xmlns:a16="http://schemas.microsoft.com/office/drawing/2014/main" id="{7CC6E6B0-72DA-9141-A7B3-D53A6E5FF667}"/>
               </a:ext>
             </a:extLst>
           </p:cNvPr>
@@ -5761,6 +6574,34 @@
         <p:blipFill>
           <a:blip r:embed="rId2">
             <a:extLst>
+              <a:ext uri="{BEBA8EAE-BF5A-486C-A8C5-ECC9F3942E4B}">
+                <a14:imgProps xmlns:a14="http://schemas.microsoft.com/office/drawing/2010/main">
+                  <a14:imgLayer r:embed="rId3">
+                    <a14:imgEffect>
+                      <a14:backgroundRemoval t="10000" b="90000" l="10000" r="90000">
+                        <a14:foregroundMark x1="23242" y1="34277" x2="19922" y2="49902"/>
+                        <a14:foregroundMark x1="19922" y1="49902" x2="27051" y2="56055"/>
+                        <a14:foregroundMark x1="27051" y1="56055" x2="35547" y2="50195"/>
+                        <a14:foregroundMark x1="35547" y1="50195" x2="33398" y2="36719"/>
+                        <a14:foregroundMark x1="33398" y1="36719" x2="25195" y2="33301"/>
+                        <a14:foregroundMark x1="25195" y1="33301" x2="23438" y2="33984"/>
+                        <a14:foregroundMark x1="28809" y1="37012" x2="25195" y2="45801"/>
+                        <a14:foregroundMark x1="25195" y1="45801" x2="30371" y2="49512"/>
+                        <a14:foregroundMark x1="42480" y1="34863" x2="42773" y2="43555"/>
+                        <a14:foregroundMark x1="42773" y1="43555" x2="50488" y2="40918"/>
+                        <a14:foregroundMark x1="50488" y1="40918" x2="59961" y2="41211"/>
+                        <a14:foregroundMark x1="59961" y1="41211" x2="79492" y2="34961"/>
+                        <a14:foregroundMark x1="79492" y1="34961" x2="79395" y2="39063"/>
+                        <a14:foregroundMark x1="57715" y1="33301" x2="56934" y2="42969"/>
+                        <a14:foregroundMark x1="70703" y1="34180" x2="80664" y2="30566"/>
+                        <a14:foregroundMark x1="80664" y1="30566" x2="80957" y2="30273"/>
+                        <a14:foregroundMark x1="23535" y1="60449" x2="72754" y2="47070"/>
+                        <a14:foregroundMark x1="77344" y1="46289" x2="81738" y2="51367"/>
+                      </a14:backgroundRemoval>
+                    </a14:imgEffect>
+                  </a14:imgLayer>
+                </a14:imgProps>
+              </a:ext>
               <a:ext uri="{28A0092B-C50C-407E-A947-70E740481C1C}">
                 <a14:useLocalDpi xmlns:a14="http://schemas.microsoft.com/office/drawing/2010/main" val="0"/>
               </a:ext>
@@ -5772,121 +6613,14 @@
         </p:blipFill>
         <p:spPr>
           <a:xfrm>
-            <a:off x="7235763" y="1336690"/>
-            <a:ext cx="504825" cy="504825"/>
+            <a:off x="7310927" y="1352323"/>
+            <a:ext cx="473560" cy="473560"/>
           </a:xfrm>
           <a:prstGeom prst="rect">
             <a:avLst/>
           </a:prstGeom>
         </p:spPr>
       </p:pic>
-      <p:sp>
-        <p:nvSpPr>
-          <p:cNvPr id="2" name="Title 1">
-            <a:extLst>
-              <a:ext uri="{FF2B5EF4-FFF2-40B4-BE49-F238E27FC236}">
-                <a16:creationId xmlns:a16="http://schemas.microsoft.com/office/drawing/2014/main" id="{3F5D6987-8A7C-EF18-208A-7255EA476677}"/>
-              </a:ext>
-            </a:extLst>
-          </p:cNvPr>
-          <p:cNvSpPr>
-            <a:spLocks noGrp="1"/>
-          </p:cNvSpPr>
-          <p:nvPr>
-            <p:ph type="title"/>
-          </p:nvPr>
-        </p:nvSpPr>
-        <p:spPr/>
-        <p:txBody>
-          <a:bodyPr/>
-          <a:lstStyle/>
-          <a:p>
-            <a:r>
-              <a:rPr lang="en-US" dirty="0"/>
-              <a:t>Clean the Data</a:t>
-            </a:r>
-          </a:p>
-        </p:txBody>
-      </p:sp>
-      <p:sp>
-        <p:nvSpPr>
-          <p:cNvPr id="3" name="Content Placeholder 2">
-            <a:extLst>
-              <a:ext uri="{FF2B5EF4-FFF2-40B4-BE49-F238E27FC236}">
-                <a16:creationId xmlns:a16="http://schemas.microsoft.com/office/drawing/2014/main" id="{E50D8BDB-18E2-001C-F017-F1A04E850A70}"/>
-              </a:ext>
-            </a:extLst>
-          </p:cNvPr>
-          <p:cNvSpPr>
-            <a:spLocks noGrp="1"/>
-          </p:cNvSpPr>
-          <p:nvPr>
-            <p:ph idx="1"/>
-          </p:nvPr>
-        </p:nvSpPr>
-        <p:spPr>
-          <a:xfrm>
-            <a:off x="275208" y="1589103"/>
-            <a:ext cx="11078592" cy="4587860"/>
-          </a:xfrm>
-        </p:spPr>
-        <p:txBody>
-          <a:bodyPr/>
-          <a:lstStyle/>
-          <a:p>
-            <a:pPr marL="0" indent="0">
-              <a:buNone/>
-            </a:pPr>
-            <a:r>
-              <a:rPr lang="en-US" dirty="0">
-                <a:latin typeface="Georgia" panose="02040502050405020303" pitchFamily="18" charset="0"/>
-              </a:rPr>
-              <a:t>A standard process for cleaning speech data:</a:t>
-            </a:r>
-          </a:p>
-          <a:p>
-            <a:pPr marL="0" indent="0">
-              <a:buNone/>
-            </a:pPr>
-            <a:endParaRPr lang="en-US" b="1" dirty="0">
-              <a:latin typeface="Georgia" panose="02040502050405020303" pitchFamily="18" charset="0"/>
-            </a:endParaRPr>
-          </a:p>
-          <a:p>
-            <a:pPr marL="0" indent="0">
-              <a:buNone/>
-            </a:pPr>
-            <a:r>
-              <a:rPr lang="en-US" b="1" dirty="0">
-                <a:latin typeface="Georgia" panose="02040502050405020303" pitchFamily="18" charset="0"/>
-              </a:rPr>
-              <a:t>Pre-emphasis:</a:t>
-            </a:r>
-          </a:p>
-          <a:p>
-            <a:pPr marL="0" indent="0">
-              <a:buNone/>
-            </a:pPr>
-            <a:r>
-              <a:rPr lang="en-US" dirty="0">
-                <a:latin typeface="Georgia" panose="02040502050405020303" pitchFamily="18" charset="0"/>
-              </a:rPr>
-              <a:t>“Lowering the ceiling”</a:t>
-            </a:r>
-          </a:p>
-          <a:p>
-            <a:pPr marL="0" indent="0">
-              <a:buNone/>
-            </a:pPr>
-            <a:r>
-              <a:rPr lang="en-US" dirty="0">
-                <a:latin typeface="Georgia" panose="02040502050405020303" pitchFamily="18" charset="0"/>
-              </a:rPr>
-              <a:t>~ “reducing contrast”</a:t>
-            </a:r>
-          </a:p>
-        </p:txBody>
-      </p:sp>
     </p:spTree>
     <p:extLst>
       <p:ext uri="{BB962C8B-B14F-4D97-AF65-F5344CB8AC3E}">
@@ -5900,7 +6634,7 @@
 </p:sld>
 </file>
 
-<file path=ppt/slides/slide6.xml><?xml version="1.0" encoding="utf-8"?>
+<file path=ppt/slides/slide7.xml><?xml version="1.0" encoding="utf-8"?>
 <p:sld xmlns:a="http://schemas.openxmlformats.org/drawingml/2006/main" xmlns:r="http://schemas.openxmlformats.org/officeDocument/2006/relationships" xmlns:p="http://schemas.openxmlformats.org/presentationml/2006/main">
   <p:cSld>
     <p:spTree>
@@ -6164,7 +6898,7 @@
 </p:sld>
 </file>
 
-<file path=ppt/slides/slide7.xml><?xml version="1.0" encoding="utf-8"?>
+<file path=ppt/slides/slide8.xml><?xml version="1.0" encoding="utf-8"?>
 <p:sld xmlns:a="http://schemas.openxmlformats.org/drawingml/2006/main" xmlns:r="http://schemas.openxmlformats.org/officeDocument/2006/relationships" xmlns:p="http://schemas.openxmlformats.org/presentationml/2006/main">
   <p:cSld>
     <p:spTree>
@@ -6434,7 +7168,7 @@
 </p:sld>
 </file>
 
-<file path=ppt/slides/slide8.xml><?xml version="1.0" encoding="utf-8"?>
+<file path=ppt/slides/slide9.xml><?xml version="1.0" encoding="utf-8"?>
 <p:sld xmlns:a="http://schemas.openxmlformats.org/drawingml/2006/main" xmlns:r="http://schemas.openxmlformats.org/officeDocument/2006/relationships" xmlns:p="http://schemas.openxmlformats.org/presentationml/2006/main">
   <p:cSld>
     <p:spTree>
@@ -6698,379 +7432,10 @@
 </p:sld>
 </file>
 
-<file path=ppt/slides/slide9.xml><?xml version="1.0" encoding="utf-8"?>
-<p:sld xmlns:a="http://schemas.openxmlformats.org/drawingml/2006/main" xmlns:r="http://schemas.openxmlformats.org/officeDocument/2006/relationships" xmlns:p="http://schemas.openxmlformats.org/presentationml/2006/main">
-  <p:cSld>
-    <p:spTree>
-      <p:nvGrpSpPr>
-        <p:cNvPr id="1" name="">
-          <a:extLst>
-            <a:ext uri="{FF2B5EF4-FFF2-40B4-BE49-F238E27FC236}">
-              <a16:creationId xmlns:a16="http://schemas.microsoft.com/office/drawing/2014/main" id="{A89F8F60-84E6-3ED5-2959-E206DD4A2A50}"/>
-            </a:ext>
-          </a:extLst>
-        </p:cNvPr>
-        <p:cNvGrpSpPr/>
-        <p:nvPr/>
-      </p:nvGrpSpPr>
-      <p:grpSpPr>
-        <a:xfrm>
-          <a:off x="0" y="0"/>
-          <a:ext cx="0" cy="0"/>
-          <a:chOff x="0" y="0"/>
-          <a:chExt cx="0" cy="0"/>
-        </a:xfrm>
-      </p:grpSpPr>
-      <p:sp>
-        <p:nvSpPr>
-          <p:cNvPr id="2" name="Title 1">
-            <a:extLst>
-              <a:ext uri="{FF2B5EF4-FFF2-40B4-BE49-F238E27FC236}">
-                <a16:creationId xmlns:a16="http://schemas.microsoft.com/office/drawing/2014/main" id="{FD185580-4369-A629-C6F8-8A11F1D22E3C}"/>
-              </a:ext>
-            </a:extLst>
-          </p:cNvPr>
-          <p:cNvSpPr>
-            <a:spLocks noGrp="1"/>
-          </p:cNvSpPr>
-          <p:nvPr>
-            <p:ph type="title"/>
-          </p:nvPr>
-        </p:nvSpPr>
-        <p:spPr>
-          <a:xfrm>
-            <a:off x="838200" y="0"/>
-            <a:ext cx="10515600" cy="1325563"/>
-          </a:xfrm>
-        </p:spPr>
-        <p:txBody>
-          <a:bodyPr/>
-          <a:lstStyle/>
-          <a:p>
-            <a:r>
-              <a:rPr lang="en-US" dirty="0"/>
-              <a:t>Off-the-Shelf Solution</a:t>
-            </a:r>
-          </a:p>
-        </p:txBody>
-      </p:sp>
-      <p:sp>
-        <p:nvSpPr>
-          <p:cNvPr id="3" name="Content Placeholder 2">
-            <a:extLst>
-              <a:ext uri="{FF2B5EF4-FFF2-40B4-BE49-F238E27FC236}">
-                <a16:creationId xmlns:a16="http://schemas.microsoft.com/office/drawing/2014/main" id="{30306755-292D-D24C-E837-78CA4B505359}"/>
-              </a:ext>
-            </a:extLst>
-          </p:cNvPr>
-          <p:cNvSpPr>
-            <a:spLocks noGrp="1"/>
-          </p:cNvSpPr>
-          <p:nvPr>
-            <p:ph idx="1"/>
-          </p:nvPr>
-        </p:nvSpPr>
-        <p:spPr>
-          <a:xfrm>
-            <a:off x="65843" y="1325563"/>
-            <a:ext cx="10515600" cy="4351338"/>
-          </a:xfrm>
-        </p:spPr>
-        <p:txBody>
-          <a:bodyPr>
-            <a:noAutofit/>
-          </a:bodyPr>
-          <a:lstStyle/>
-          <a:p>
-            <a:pPr marL="0" indent="0">
-              <a:lnSpc>
-                <a:spcPct val="120000"/>
-              </a:lnSpc>
-              <a:buNone/>
-            </a:pPr>
-            <a:r>
-              <a:rPr lang="en-US" sz="1600" dirty="0">
-                <a:latin typeface="Georgia" panose="02040502050405020303" pitchFamily="18" charset="0"/>
-              </a:rPr>
-              <a:t>We can start with an off-the-shelf solution (`</a:t>
-            </a:r>
-            <a:r>
-              <a:rPr lang="en-US" sz="1600" dirty="0" err="1">
-                <a:latin typeface="Georgia" panose="02040502050405020303" pitchFamily="18" charset="0"/>
-              </a:rPr>
-              <a:t>librosa</a:t>
-            </a:r>
-            <a:r>
-              <a:rPr lang="en-US" sz="1600" dirty="0">
-                <a:latin typeface="Georgia" panose="02040502050405020303" pitchFamily="18" charset="0"/>
-              </a:rPr>
-              <a:t>` </a:t>
-            </a:r>
-            <a:r>
-              <a:rPr lang="en-US" sz="1600" dirty="0" err="1">
-                <a:latin typeface="Georgia" panose="02040502050405020303" pitchFamily="18" charset="0"/>
-              </a:rPr>
-              <a:t>mfcc</a:t>
-            </a:r>
-            <a:r>
-              <a:rPr lang="en-US" sz="1600" dirty="0">
-                <a:latin typeface="Georgia" panose="02040502050405020303" pitchFamily="18" charset="0"/>
-              </a:rPr>
-              <a:t> feature extraction):</a:t>
-            </a:r>
-          </a:p>
-          <a:p>
-            <a:pPr marL="0" indent="0">
-              <a:lnSpc>
-                <a:spcPct val="120000"/>
-              </a:lnSpc>
-              <a:buNone/>
-            </a:pPr>
-            <a:r>
-              <a:rPr lang="en-US" sz="1600" dirty="0">
-                <a:latin typeface="Georgia" panose="02040502050405020303" pitchFamily="18" charset="0"/>
-              </a:rPr>
-              <a:t>✔ This solution correctly identifies the correct forms, </a:t>
-            </a:r>
-          </a:p>
-          <a:p>
-            <a:pPr marL="0" indent="0">
-              <a:lnSpc>
-                <a:spcPct val="120000"/>
-              </a:lnSpc>
-              <a:buNone/>
-            </a:pPr>
-            <a:r>
-              <a:rPr lang="en-US" sz="1600" dirty="0">
-                <a:latin typeface="Georgia" panose="02040502050405020303" pitchFamily="18" charset="0"/>
-              </a:rPr>
-              <a:t>❌ but it does not detect as much difference between the incorrect forms.</a:t>
-            </a:r>
-          </a:p>
-          <a:p>
-            <a:pPr marL="0" indent="0">
-              <a:lnSpc>
-                <a:spcPct val="120000"/>
-              </a:lnSpc>
-              <a:buNone/>
-            </a:pPr>
-            <a:r>
-              <a:rPr lang="en-US" sz="1600" dirty="0">
-                <a:latin typeface="Georgia" panose="02040502050405020303" pitchFamily="18" charset="0"/>
-              </a:rPr>
-              <a:t>For keyword checking, it might be helpful to have a meaningful measure of how different the words are:</a:t>
-            </a:r>
-          </a:p>
-          <a:p>
-            <a:pPr marL="0" indent="0">
-              <a:lnSpc>
-                <a:spcPct val="120000"/>
-              </a:lnSpc>
-              <a:buNone/>
-            </a:pPr>
-            <a:r>
-              <a:rPr lang="en-US" sz="1600" dirty="0">
-                <a:latin typeface="Georgia" panose="02040502050405020303" pitchFamily="18" charset="0"/>
-              </a:rPr>
-              <a:t>No clustering!</a:t>
-            </a:r>
-          </a:p>
-          <a:p>
-            <a:pPr marL="0" indent="0">
-              <a:lnSpc>
-                <a:spcPct val="120000"/>
-              </a:lnSpc>
-              <a:buNone/>
-            </a:pPr>
-            <a:endParaRPr lang="en-US" sz="1600" dirty="0">
-              <a:latin typeface="Georgia" panose="02040502050405020303" pitchFamily="18" charset="0"/>
-            </a:endParaRPr>
-          </a:p>
-        </p:txBody>
-      </p:sp>
-      <p:sp>
-        <p:nvSpPr>
-          <p:cNvPr id="5" name="TextBox 4">
-            <a:extLst>
-              <a:ext uri="{FF2B5EF4-FFF2-40B4-BE49-F238E27FC236}">
-                <a16:creationId xmlns:a16="http://schemas.microsoft.com/office/drawing/2014/main" id="{B404ADE4-A3D5-4A2D-F245-281AF0692A49}"/>
-              </a:ext>
-            </a:extLst>
-          </p:cNvPr>
-          <p:cNvSpPr txBox="1"/>
-          <p:nvPr/>
-        </p:nvSpPr>
-        <p:spPr>
-          <a:xfrm>
-            <a:off x="7217546" y="3364638"/>
-            <a:ext cx="5537446" cy="3386633"/>
-          </a:xfrm>
-          <a:prstGeom prst="rect">
-            <a:avLst/>
-          </a:prstGeom>
-          <a:noFill/>
-        </p:spPr>
-        <p:txBody>
-          <a:bodyPr wrap="square">
-            <a:spAutoFit/>
-          </a:bodyPr>
-          <a:lstStyle/>
-          <a:p>
-            <a:pPr marL="0" indent="0">
-              <a:lnSpc>
-                <a:spcPct val="120000"/>
-              </a:lnSpc>
-              <a:buNone/>
-            </a:pPr>
-            <a:r>
-              <a:rPr lang="en-US" sz="1800" dirty="0">
-                <a:latin typeface="Georgia" panose="02040502050405020303" pitchFamily="18" charset="0"/>
-              </a:rPr>
-              <a:t>Similar to wilderness1.wav:</a:t>
-            </a:r>
-          </a:p>
-          <a:p>
-            <a:pPr marL="0" indent="0">
-              <a:lnSpc>
-                <a:spcPct val="120000"/>
-              </a:lnSpc>
-              <a:buNone/>
-            </a:pPr>
-            <a:r>
-              <a:rPr lang="en-US" sz="1800" dirty="0">
-                <a:latin typeface="Georgia" panose="02040502050405020303" pitchFamily="18" charset="0"/>
-              </a:rPr>
-              <a:t>wilderness1.wav: 0.9999999869496023</a:t>
-            </a:r>
-          </a:p>
-          <a:p>
-            <a:pPr marL="0" indent="0">
-              <a:lnSpc>
-                <a:spcPct val="120000"/>
-              </a:lnSpc>
-              <a:buNone/>
-            </a:pPr>
-            <a:r>
-              <a:rPr lang="en-US" sz="1800" dirty="0">
-                <a:latin typeface="Georgia" panose="02040502050405020303" pitchFamily="18" charset="0"/>
-              </a:rPr>
-              <a:t>wilderness2.wav: 0.9993146675340262</a:t>
-            </a:r>
-          </a:p>
-          <a:p>
-            <a:pPr marL="0" indent="0">
-              <a:lnSpc>
-                <a:spcPct val="120000"/>
-              </a:lnSpc>
-              <a:buNone/>
-            </a:pPr>
-            <a:endParaRPr lang="en-US" sz="1800" dirty="0">
-              <a:latin typeface="Georgia" panose="02040502050405020303" pitchFamily="18" charset="0"/>
-            </a:endParaRPr>
-          </a:p>
-          <a:p>
-            <a:pPr marL="0" indent="0">
-              <a:lnSpc>
-                <a:spcPct val="120000"/>
-              </a:lnSpc>
-              <a:buNone/>
-            </a:pPr>
-            <a:r>
-              <a:rPr lang="en-US" sz="1800" dirty="0">
-                <a:latin typeface="Georgia" panose="02040502050405020303" pitchFamily="18" charset="0"/>
-              </a:rPr>
-              <a:t>God1.wav: 0.9987559253705995</a:t>
-            </a:r>
-          </a:p>
-          <a:p>
-            <a:pPr marL="0" indent="0">
-              <a:lnSpc>
-                <a:spcPct val="120000"/>
-              </a:lnSpc>
-              <a:buNone/>
-            </a:pPr>
-            <a:r>
-              <a:rPr lang="en-US" sz="1800" dirty="0">
-                <a:latin typeface="Georgia" panose="02040502050405020303" pitchFamily="18" charset="0"/>
-              </a:rPr>
-              <a:t>God2.wav: 0.9980986833151937</a:t>
-            </a:r>
-          </a:p>
-          <a:p>
-            <a:pPr marL="0" indent="0">
-              <a:lnSpc>
-                <a:spcPct val="120000"/>
-              </a:lnSpc>
-              <a:buNone/>
-            </a:pPr>
-            <a:r>
-              <a:rPr lang="en-US" sz="1800" dirty="0">
-                <a:latin typeface="Georgia" panose="02040502050405020303" pitchFamily="18" charset="0"/>
-              </a:rPr>
-              <a:t>inTheBeginning1.wav: 0.9971207291637255</a:t>
-            </a:r>
-          </a:p>
-          <a:p>
-            <a:pPr marL="0" indent="0">
-              <a:lnSpc>
-                <a:spcPct val="120000"/>
-              </a:lnSpc>
-              <a:buNone/>
-            </a:pPr>
-            <a:r>
-              <a:rPr lang="en-US" sz="1800" dirty="0">
-                <a:latin typeface="Georgia" panose="02040502050405020303" pitchFamily="18" charset="0"/>
-              </a:rPr>
-              <a:t>inTheBeginning2.wav: 0.9969806586039947</a:t>
-            </a:r>
-          </a:p>
-          <a:p>
-            <a:pPr marL="0" indent="0">
-              <a:lnSpc>
-                <a:spcPct val="120000"/>
-              </a:lnSpc>
-              <a:buNone/>
-            </a:pPr>
-            <a:r>
-              <a:rPr lang="en-US" sz="1800" dirty="0">
-                <a:latin typeface="Georgia" panose="02040502050405020303" pitchFamily="18" charset="0"/>
-              </a:rPr>
-              <a:t>jesus2.wav: 0.9958133114595762</a:t>
-            </a:r>
-          </a:p>
-          <a:p>
-            <a:pPr marL="0" indent="0">
-              <a:lnSpc>
-                <a:spcPct val="120000"/>
-              </a:lnSpc>
-              <a:buNone/>
-            </a:pPr>
-            <a:r>
-              <a:rPr lang="en-US" sz="1800" dirty="0">
-                <a:latin typeface="Georgia" panose="02040502050405020303" pitchFamily="18" charset="0"/>
-              </a:rPr>
-              <a:t>jesus1.wav: 0.9942425674771389</a:t>
-            </a:r>
-          </a:p>
-        </p:txBody>
-      </p:sp>
-    </p:spTree>
-    <p:extLst>
-      <p:ext uri="{BB962C8B-B14F-4D97-AF65-F5344CB8AC3E}">
-        <p14:creationId xmlns:p14="http://schemas.microsoft.com/office/powerpoint/2010/main" val="3215222808"/>
-      </p:ext>
-    </p:extLst>
-  </p:cSld>
-  <p:clrMapOvr>
-    <a:masterClrMapping/>
-  </p:clrMapOvr>
-</p:sld>
-</file>
-
 <file path=ppt/theme/theme1.xml><?xml version="1.0" encoding="utf-8"?>
 <a:theme xmlns:a="http://schemas.openxmlformats.org/drawingml/2006/main" name="Office Theme">
   <a:themeElements>
-    <a:clrScheme name="Office">
+    <a:clrScheme name="Office Theme">
       <a:dk1>
         <a:sysClr val="windowText" lastClr="000000"/>
       </a:dk1>
@@ -7102,13 +7467,13 @@
         <a:srgbClr val="4EA72E"/>
       </a:accent6>
       <a:hlink>
-        <a:srgbClr val="467886"/>
+        <a:srgbClr val="538D9D"/>
       </a:hlink>
       <a:folHlink>
-        <a:srgbClr val="96607D"/>
+        <a:srgbClr val="A5738E"/>
       </a:folHlink>
     </a:clrScheme>
-    <a:fontScheme name="Office">
+    <a:fontScheme name="Office Theme">
       <a:majorFont>
         <a:latin typeface="Aptos Display" panose="02110004020202020204"/>
         <a:ea typeface=""/>
@@ -7214,7 +7579,7 @@
         <a:font script="Tfng" typeface="Ebrima"/>
       </a:minorFont>
     </a:fontScheme>
-    <a:fmtScheme name="Office">
+    <a:fmtScheme name="Office Theme">
       <a:fillStyleLst>
         <a:solidFill>
           <a:schemeClr val="phClr"/>
@@ -7376,7 +7741,7 @@
   <a:extraClrSchemeLst/>
   <a:extLst>
     <a:ext uri="{05A4C25C-085E-4340-85A3-A5531E510DB2}">
-      <thm15:themeFamily xmlns:thm15="http://schemas.microsoft.com/office/thememl/2012/main" name="Office Theme" id="{2E142A2C-CD16-42D6-873A-C26D2A0506FA}" vid="{1BDDFF52-6CD6-40A5-AB3C-68EB2F1E4D0A}"/>
+      <thm15:themeFamily xmlns:thm15="http://schemas.microsoft.com/office/thememl/2012/main" name="Office Theme" id="{2E142A2C-CD16-42D6-873A-C26D2A0506FA}" vid="{3A418E6B-C5F0-4B95-8D77-61E3EF3B5DF5}"/>
     </a:ext>
   </a:extLst>
 </a:theme>

</xml_diff>

<commit_message>
ui show top results
</commit_message>
<xml_diff>
--- a/Hackathon Presentation.pptx
+++ b/Hackathon Presentation.pptx
@@ -6,21 +6,22 @@
   </p:sldMasterIdLst>
   <p:sldIdLst>
     <p:sldId id="258" r:id="rId2"/>
-    <p:sldId id="271" r:id="rId3"/>
-    <p:sldId id="263" r:id="rId4"/>
-    <p:sldId id="261" r:id="rId5"/>
-    <p:sldId id="264" r:id="rId6"/>
-    <p:sldId id="267" r:id="rId7"/>
-    <p:sldId id="256" r:id="rId8"/>
-    <p:sldId id="262" r:id="rId9"/>
-    <p:sldId id="257" r:id="rId10"/>
-    <p:sldId id="268" r:id="rId11"/>
-    <p:sldId id="260" r:id="rId12"/>
-    <p:sldId id="259" r:id="rId13"/>
-    <p:sldId id="265" r:id="rId14"/>
-    <p:sldId id="266" r:id="rId15"/>
-    <p:sldId id="269" r:id="rId16"/>
-    <p:sldId id="270" r:id="rId17"/>
+    <p:sldId id="272" r:id="rId3"/>
+    <p:sldId id="271" r:id="rId4"/>
+    <p:sldId id="263" r:id="rId5"/>
+    <p:sldId id="261" r:id="rId6"/>
+    <p:sldId id="264" r:id="rId7"/>
+    <p:sldId id="267" r:id="rId8"/>
+    <p:sldId id="256" r:id="rId9"/>
+    <p:sldId id="262" r:id="rId10"/>
+    <p:sldId id="257" r:id="rId11"/>
+    <p:sldId id="268" r:id="rId12"/>
+    <p:sldId id="260" r:id="rId13"/>
+    <p:sldId id="259" r:id="rId14"/>
+    <p:sldId id="265" r:id="rId15"/>
+    <p:sldId id="266" r:id="rId16"/>
+    <p:sldId id="269" r:id="rId17"/>
+    <p:sldId id="270" r:id="rId18"/>
   </p:sldIdLst>
   <p:sldSz cx="12192000" cy="6858000"/>
   <p:notesSz cx="6858000" cy="9144000"/>
@@ -258,7 +259,7 @@
           <a:p>
             <a:fld id="{6986CF5C-6924-4266-9F77-91BD27A93A3F}" type="datetimeFigureOut">
               <a:rPr lang="en-US" smtClean="0"/>
-              <a:t>3/6/2024</a:t>
+              <a:t>3/8/2024</a:t>
             </a:fld>
             <a:endParaRPr lang="en-US"/>
           </a:p>
@@ -428,7 +429,7 @@
           <a:p>
             <a:fld id="{6986CF5C-6924-4266-9F77-91BD27A93A3F}" type="datetimeFigureOut">
               <a:rPr lang="en-US" smtClean="0"/>
-              <a:t>3/6/2024</a:t>
+              <a:t>3/8/2024</a:t>
             </a:fld>
             <a:endParaRPr lang="en-US"/>
           </a:p>
@@ -608,7 +609,7 @@
           <a:p>
             <a:fld id="{6986CF5C-6924-4266-9F77-91BD27A93A3F}" type="datetimeFigureOut">
               <a:rPr lang="en-US" smtClean="0"/>
-              <a:t>3/6/2024</a:t>
+              <a:t>3/8/2024</a:t>
             </a:fld>
             <a:endParaRPr lang="en-US"/>
           </a:p>
@@ -778,7 +779,7 @@
           <a:p>
             <a:fld id="{6986CF5C-6924-4266-9F77-91BD27A93A3F}" type="datetimeFigureOut">
               <a:rPr lang="en-US" smtClean="0"/>
-              <a:t>3/6/2024</a:t>
+              <a:t>3/8/2024</a:t>
             </a:fld>
             <a:endParaRPr lang="en-US"/>
           </a:p>
@@ -1024,7 +1025,7 @@
           <a:p>
             <a:fld id="{6986CF5C-6924-4266-9F77-91BD27A93A3F}" type="datetimeFigureOut">
               <a:rPr lang="en-US" smtClean="0"/>
-              <a:t>3/6/2024</a:t>
+              <a:t>3/8/2024</a:t>
             </a:fld>
             <a:endParaRPr lang="en-US"/>
           </a:p>
@@ -1256,7 +1257,7 @@
           <a:p>
             <a:fld id="{6986CF5C-6924-4266-9F77-91BD27A93A3F}" type="datetimeFigureOut">
               <a:rPr lang="en-US" smtClean="0"/>
-              <a:t>3/6/2024</a:t>
+              <a:t>3/8/2024</a:t>
             </a:fld>
             <a:endParaRPr lang="en-US"/>
           </a:p>
@@ -1623,7 +1624,7 @@
           <a:p>
             <a:fld id="{6986CF5C-6924-4266-9F77-91BD27A93A3F}" type="datetimeFigureOut">
               <a:rPr lang="en-US" smtClean="0"/>
-              <a:t>3/6/2024</a:t>
+              <a:t>3/8/2024</a:t>
             </a:fld>
             <a:endParaRPr lang="en-US"/>
           </a:p>
@@ -1741,7 +1742,7 @@
           <a:p>
             <a:fld id="{6986CF5C-6924-4266-9F77-91BD27A93A3F}" type="datetimeFigureOut">
               <a:rPr lang="en-US" smtClean="0"/>
-              <a:t>3/6/2024</a:t>
+              <a:t>3/8/2024</a:t>
             </a:fld>
             <a:endParaRPr lang="en-US"/>
           </a:p>
@@ -1836,7 +1837,7 @@
           <a:p>
             <a:fld id="{6986CF5C-6924-4266-9F77-91BD27A93A3F}" type="datetimeFigureOut">
               <a:rPr lang="en-US" smtClean="0"/>
-              <a:t>3/6/2024</a:t>
+              <a:t>3/8/2024</a:t>
             </a:fld>
             <a:endParaRPr lang="en-US"/>
           </a:p>
@@ -2113,7 +2114,7 @@
           <a:p>
             <a:fld id="{6986CF5C-6924-4266-9F77-91BD27A93A3F}" type="datetimeFigureOut">
               <a:rPr lang="en-US" smtClean="0"/>
-              <a:t>3/6/2024</a:t>
+              <a:t>3/8/2024</a:t>
             </a:fld>
             <a:endParaRPr lang="en-US"/>
           </a:p>
@@ -2370,7 +2371,7 @@
           <a:p>
             <a:fld id="{6986CF5C-6924-4266-9F77-91BD27A93A3F}" type="datetimeFigureOut">
               <a:rPr lang="en-US" smtClean="0"/>
-              <a:t>3/6/2024</a:t>
+              <a:t>3/8/2024</a:t>
             </a:fld>
             <a:endParaRPr lang="en-US"/>
           </a:p>
@@ -2583,7 +2584,7 @@
           <a:p>
             <a:fld id="{6986CF5C-6924-4266-9F77-91BD27A93A3F}" type="datetimeFigureOut">
               <a:rPr lang="en-US" smtClean="0"/>
-              <a:t>3/6/2024</a:t>
+              <a:t>3/8/2024</a:t>
             </a:fld>
             <a:endParaRPr lang="en-US"/>
           </a:p>
@@ -3307,6 +3308,270 @@
           <a:chExt cx="0" cy="0"/>
         </a:xfrm>
       </p:grpSpPr>
+      <p:pic>
+        <p:nvPicPr>
+          <p:cNvPr id="5" name="Picture 4" descr="A blue and red graph&#10;&#10;Description automatically generated with medium confidence">
+            <a:extLst>
+              <a:ext uri="{FF2B5EF4-FFF2-40B4-BE49-F238E27FC236}">
+                <a16:creationId xmlns:a16="http://schemas.microsoft.com/office/drawing/2014/main" id="{5A066BEE-C736-2228-3440-6F09BEEDCDE5}"/>
+              </a:ext>
+            </a:extLst>
+          </p:cNvPr>
+          <p:cNvPicPr>
+            <a:picLocks noChangeAspect="1"/>
+          </p:cNvPicPr>
+          <p:nvPr/>
+        </p:nvPicPr>
+        <p:blipFill>
+          <a:blip r:embed="rId2">
+            <a:extLst>
+              <a:ext uri="{28A0092B-C50C-407E-A947-70E740481C1C}">
+                <a14:useLocalDpi xmlns:a14="http://schemas.microsoft.com/office/drawing/2010/main" val="0"/>
+              </a:ext>
+            </a:extLst>
+          </a:blip>
+          <a:stretch>
+            <a:fillRect/>
+          </a:stretch>
+        </p:blipFill>
+        <p:spPr>
+          <a:xfrm>
+            <a:off x="895885" y="1371600"/>
+            <a:ext cx="4690663" cy="2743200"/>
+          </a:xfrm>
+          <a:prstGeom prst="rect">
+            <a:avLst/>
+          </a:prstGeom>
+        </p:spPr>
+      </p:pic>
+      <p:pic>
+        <p:nvPicPr>
+          <p:cNvPr id="7" name="Picture 6" descr="A blue and white screen&#10;&#10;Description automatically generated with medium confidence">
+            <a:extLst>
+              <a:ext uri="{FF2B5EF4-FFF2-40B4-BE49-F238E27FC236}">
+                <a16:creationId xmlns:a16="http://schemas.microsoft.com/office/drawing/2014/main" id="{3E897AA9-E6CF-0EF5-1E81-FB46379FE636}"/>
+              </a:ext>
+            </a:extLst>
+          </p:cNvPr>
+          <p:cNvPicPr>
+            <a:picLocks noChangeAspect="1"/>
+          </p:cNvPicPr>
+          <p:nvPr/>
+        </p:nvPicPr>
+        <p:blipFill>
+          <a:blip r:embed="rId3">
+            <a:extLst>
+              <a:ext uri="{28A0092B-C50C-407E-A947-70E740481C1C}">
+                <a14:useLocalDpi xmlns:a14="http://schemas.microsoft.com/office/drawing/2010/main" val="0"/>
+              </a:ext>
+            </a:extLst>
+          </a:blip>
+          <a:stretch>
+            <a:fillRect/>
+          </a:stretch>
+        </p:blipFill>
+        <p:spPr>
+          <a:xfrm>
+            <a:off x="895884" y="4114800"/>
+            <a:ext cx="4516159" cy="2743200"/>
+          </a:xfrm>
+          <a:prstGeom prst="rect">
+            <a:avLst/>
+          </a:prstGeom>
+        </p:spPr>
+      </p:pic>
+      <p:pic>
+        <p:nvPicPr>
+          <p:cNvPr id="9" name="Picture 8" descr="A blue screen with white lines&#10;&#10;Description automatically generated">
+            <a:extLst>
+              <a:ext uri="{FF2B5EF4-FFF2-40B4-BE49-F238E27FC236}">
+                <a16:creationId xmlns:a16="http://schemas.microsoft.com/office/drawing/2014/main" id="{4283C9BC-28B4-CCFC-49AC-F55A2761DFD4}"/>
+              </a:ext>
+            </a:extLst>
+          </p:cNvPr>
+          <p:cNvPicPr>
+            <a:picLocks noChangeAspect="1"/>
+          </p:cNvPicPr>
+          <p:nvPr/>
+        </p:nvPicPr>
+        <p:blipFill>
+          <a:blip r:embed="rId4">
+            <a:extLst>
+              <a:ext uri="{28A0092B-C50C-407E-A947-70E740481C1C}">
+                <a14:useLocalDpi xmlns:a14="http://schemas.microsoft.com/office/drawing/2010/main" val="0"/>
+              </a:ext>
+            </a:extLst>
+          </a:blip>
+          <a:stretch>
+            <a:fillRect/>
+          </a:stretch>
+        </p:blipFill>
+        <p:spPr>
+          <a:xfrm>
+            <a:off x="6655294" y="1371600"/>
+            <a:ext cx="4516159" cy="2743200"/>
+          </a:xfrm>
+          <a:prstGeom prst="rect">
+            <a:avLst/>
+          </a:prstGeom>
+        </p:spPr>
+      </p:pic>
+      <p:pic>
+        <p:nvPicPr>
+          <p:cNvPr id="11" name="Picture 10" descr="A blue screen with white lines&#10;&#10;Description automatically generated">
+            <a:extLst>
+              <a:ext uri="{FF2B5EF4-FFF2-40B4-BE49-F238E27FC236}">
+                <a16:creationId xmlns:a16="http://schemas.microsoft.com/office/drawing/2014/main" id="{170419DD-F4F4-7033-C47B-EEC047BE1D7D}"/>
+              </a:ext>
+            </a:extLst>
+          </p:cNvPr>
+          <p:cNvPicPr>
+            <a:picLocks noChangeAspect="1"/>
+          </p:cNvPicPr>
+          <p:nvPr/>
+        </p:nvPicPr>
+        <p:blipFill>
+          <a:blip r:embed="rId5">
+            <a:extLst>
+              <a:ext uri="{28A0092B-C50C-407E-A947-70E740481C1C}">
+                <a14:useLocalDpi xmlns:a14="http://schemas.microsoft.com/office/drawing/2010/main" val="0"/>
+              </a:ext>
+            </a:extLst>
+          </a:blip>
+          <a:stretch>
+            <a:fillRect/>
+          </a:stretch>
+        </p:blipFill>
+        <p:spPr>
+          <a:xfrm>
+            <a:off x="6655293" y="4114800"/>
+            <a:ext cx="4516159" cy="2743200"/>
+          </a:xfrm>
+          <a:prstGeom prst="rect">
+            <a:avLst/>
+          </a:prstGeom>
+        </p:spPr>
+      </p:pic>
+      <p:sp>
+        <p:nvSpPr>
+          <p:cNvPr id="2" name="Title 1">
+            <a:extLst>
+              <a:ext uri="{FF2B5EF4-FFF2-40B4-BE49-F238E27FC236}">
+                <a16:creationId xmlns:a16="http://schemas.microsoft.com/office/drawing/2014/main" id="{52A374CE-A32F-D188-5958-2820E4BDC9D9}"/>
+              </a:ext>
+            </a:extLst>
+          </p:cNvPr>
+          <p:cNvSpPr txBox="1">
+            <a:spLocks/>
+          </p:cNvSpPr>
+          <p:nvPr/>
+        </p:nvSpPr>
+        <p:spPr>
+          <a:xfrm>
+            <a:off x="838200" y="107673"/>
+            <a:ext cx="10515600" cy="904382"/>
+          </a:xfrm>
+          <a:prstGeom prst="rect">
+            <a:avLst/>
+          </a:prstGeom>
+        </p:spPr>
+        <p:txBody>
+          <a:bodyPr vert="horz" lIns="91440" tIns="45720" rIns="91440" bIns="45720" rtlCol="0" anchor="b">
+            <a:normAutofit lnSpcReduction="10000"/>
+          </a:bodyPr>
+          <a:lstStyle>
+            <a:lvl1pPr algn="ctr" defTabSz="914400" rtl="0" eaLnBrk="1" latinLnBrk="0" hangingPunct="1">
+              <a:lnSpc>
+                <a:spcPct val="90000"/>
+              </a:lnSpc>
+              <a:spcBef>
+                <a:spcPct val="0"/>
+              </a:spcBef>
+              <a:buNone/>
+              <a:defRPr sz="6000" kern="1200">
+                <a:solidFill>
+                  <a:schemeClr val="tx1"/>
+                </a:solidFill>
+                <a:latin typeface="+mj-lt"/>
+                <a:ea typeface="+mj-ea"/>
+                <a:cs typeface="+mj-cs"/>
+              </a:defRPr>
+            </a:lvl1pPr>
+          </a:lstStyle>
+          <a:p>
+            <a:r>
+              <a:rPr lang="en-US" dirty="0"/>
+              <a:t>Explore/Visualize the Data</a:t>
+            </a:r>
+          </a:p>
+        </p:txBody>
+      </p:sp>
+      <p:cxnSp>
+        <p:nvCxnSpPr>
+          <p:cNvPr id="3" name="Straight Connector 2">
+            <a:extLst>
+              <a:ext uri="{FF2B5EF4-FFF2-40B4-BE49-F238E27FC236}">
+                <a16:creationId xmlns:a16="http://schemas.microsoft.com/office/drawing/2014/main" id="{69F028A0-17F1-DE2C-397E-311FD527E14F}"/>
+              </a:ext>
+            </a:extLst>
+          </p:cNvPr>
+          <p:cNvCxnSpPr/>
+          <p:nvPr/>
+        </p:nvCxnSpPr>
+        <p:spPr>
+          <a:xfrm>
+            <a:off x="5930283" y="1340528"/>
+            <a:ext cx="0" cy="5255581"/>
+          </a:xfrm>
+          <a:prstGeom prst="line">
+            <a:avLst/>
+          </a:prstGeom>
+        </p:spPr>
+        <p:style>
+          <a:lnRef idx="2">
+            <a:schemeClr val="accent1"/>
+          </a:lnRef>
+          <a:fillRef idx="0">
+            <a:schemeClr val="accent1"/>
+          </a:fillRef>
+          <a:effectRef idx="1">
+            <a:schemeClr val="accent1"/>
+          </a:effectRef>
+          <a:fontRef idx="minor">
+            <a:schemeClr val="tx1"/>
+          </a:fontRef>
+        </p:style>
+      </p:cxnSp>
+    </p:spTree>
+    <p:extLst>
+      <p:ext uri="{BB962C8B-B14F-4D97-AF65-F5344CB8AC3E}">
+        <p14:creationId xmlns:p14="http://schemas.microsoft.com/office/powerpoint/2010/main" val="2066331840"/>
+      </p:ext>
+    </p:extLst>
+  </p:cSld>
+  <p:clrMapOvr>
+    <a:masterClrMapping/>
+  </p:clrMapOvr>
+</p:sld>
+</file>
+
+<file path=ppt/slides/slide11.xml><?xml version="1.0" encoding="utf-8"?>
+<p:sld xmlns:a="http://schemas.openxmlformats.org/drawingml/2006/main" xmlns:r="http://schemas.openxmlformats.org/officeDocument/2006/relationships" xmlns:p="http://schemas.openxmlformats.org/presentationml/2006/main">
+  <p:cSld>
+    <p:spTree>
+      <p:nvGrpSpPr>
+        <p:cNvPr id="1" name=""/>
+        <p:cNvGrpSpPr/>
+        <p:nvPr/>
+      </p:nvGrpSpPr>
+      <p:grpSpPr>
+        <a:xfrm>
+          <a:off x="0" y="0"/>
+          <a:ext cx="0" cy="0"/>
+          <a:chOff x="0" y="0"/>
+          <a:chExt cx="0" cy="0"/>
+        </a:xfrm>
+      </p:grpSpPr>
       <p:sp>
         <p:nvSpPr>
           <p:cNvPr id="2" name="Title 1">
@@ -3416,7 +3681,7 @@
 </p:sld>
 </file>
 
-<file path=ppt/slides/slide11.xml><?xml version="1.0" encoding="utf-8"?>
+<file path=ppt/slides/slide12.xml><?xml version="1.0" encoding="utf-8"?>
 <p:sld xmlns:a="http://schemas.openxmlformats.org/drawingml/2006/main" xmlns:r="http://schemas.openxmlformats.org/officeDocument/2006/relationships" xmlns:p="http://schemas.openxmlformats.org/presentationml/2006/main">
   <p:cSld>
     <p:spTree>
@@ -3776,204 +4041,6 @@
     <p:extLst>
       <p:ext uri="{BB962C8B-B14F-4D97-AF65-F5344CB8AC3E}">
         <p14:creationId xmlns:p14="http://schemas.microsoft.com/office/powerpoint/2010/main" val="3215222808"/>
-      </p:ext>
-    </p:extLst>
-  </p:cSld>
-  <p:clrMapOvr>
-    <a:masterClrMapping/>
-  </p:clrMapOvr>
-</p:sld>
-</file>
-
-<file path=ppt/slides/slide12.xml><?xml version="1.0" encoding="utf-8"?>
-<p:sld xmlns:a="http://schemas.openxmlformats.org/drawingml/2006/main" xmlns:r="http://schemas.openxmlformats.org/officeDocument/2006/relationships" xmlns:p="http://schemas.openxmlformats.org/presentationml/2006/main">
-  <p:cSld>
-    <p:spTree>
-      <p:nvGrpSpPr>
-        <p:cNvPr id="1" name=""/>
-        <p:cNvGrpSpPr/>
-        <p:nvPr/>
-      </p:nvGrpSpPr>
-      <p:grpSpPr>
-        <a:xfrm>
-          <a:off x="0" y="0"/>
-          <a:ext cx="0" cy="0"/>
-          <a:chOff x="0" y="0"/>
-          <a:chExt cx="0" cy="0"/>
-        </a:xfrm>
-      </p:grpSpPr>
-      <p:sp>
-        <p:nvSpPr>
-          <p:cNvPr id="2" name="Title 1">
-            <a:extLst>
-              <a:ext uri="{FF2B5EF4-FFF2-40B4-BE49-F238E27FC236}">
-                <a16:creationId xmlns:a16="http://schemas.microsoft.com/office/drawing/2014/main" id="{F07483F7-F105-EE9E-F945-2F2CB35CB47D}"/>
-              </a:ext>
-            </a:extLst>
-          </p:cNvPr>
-          <p:cNvSpPr>
-            <a:spLocks noGrp="1"/>
-          </p:cNvSpPr>
-          <p:nvPr>
-            <p:ph type="title"/>
-          </p:nvPr>
-        </p:nvSpPr>
-        <p:spPr/>
-        <p:txBody>
-          <a:bodyPr/>
-          <a:lstStyle/>
-          <a:p>
-            <a:r>
-              <a:rPr lang="en-US"/>
-              <a:t>Report:</a:t>
-            </a:r>
-          </a:p>
-        </p:txBody>
-      </p:sp>
-      <p:sp>
-        <p:nvSpPr>
-          <p:cNvPr id="3" name="Content Placeholder 2">
-            <a:extLst>
-              <a:ext uri="{FF2B5EF4-FFF2-40B4-BE49-F238E27FC236}">
-                <a16:creationId xmlns:a16="http://schemas.microsoft.com/office/drawing/2014/main" id="{33A656DA-C422-EF35-BC3F-B165CA0927E0}"/>
-              </a:ext>
-            </a:extLst>
-          </p:cNvPr>
-          <p:cNvSpPr>
-            <a:spLocks noGrp="1"/>
-          </p:cNvSpPr>
-          <p:nvPr>
-            <p:ph idx="1"/>
-          </p:nvPr>
-        </p:nvSpPr>
-        <p:spPr/>
-        <p:txBody>
-          <a:bodyPr>
-            <a:normAutofit/>
-          </a:bodyPr>
-          <a:lstStyle/>
-          <a:p>
-            <a:pPr marL="0" indent="0">
-              <a:buNone/>
-            </a:pPr>
-            <a:r>
-              <a:rPr lang="en-US" dirty="0"/>
-              <a:t>Similar to wilderness1.wav:</a:t>
-            </a:r>
-          </a:p>
-          <a:p>
-            <a:pPr marL="0" indent="0">
-              <a:buNone/>
-            </a:pPr>
-            <a:r>
-              <a:rPr lang="en-US" dirty="0"/>
-              <a:t>wilderness1.wav: 1</a:t>
-            </a:r>
-          </a:p>
-          <a:p>
-            <a:pPr marL="0" indent="0">
-              <a:buNone/>
-            </a:pPr>
-            <a:r>
-              <a:rPr lang="en-US" dirty="0"/>
-              <a:t>wilderness2.wav: 0.7229432647124682</a:t>
-            </a:r>
-          </a:p>
-          <a:p>
-            <a:pPr marL="0" indent="0">
-              <a:buNone/>
-            </a:pPr>
-            <a:endParaRPr lang="en-US" dirty="0"/>
-          </a:p>
-          <a:p>
-            <a:pPr marL="0" indent="0">
-              <a:buNone/>
-            </a:pPr>
-            <a:r>
-              <a:rPr lang="en-US" dirty="0"/>
-              <a:t>jesus2.wav: 0.3134769071964211</a:t>
-            </a:r>
-          </a:p>
-          <a:p>
-            <a:pPr marL="0" indent="0">
-              <a:buNone/>
-            </a:pPr>
-            <a:r>
-              <a:rPr lang="en-US" dirty="0"/>
-              <a:t>God1.wav: 0.23680512842732715</a:t>
-            </a:r>
-          </a:p>
-          <a:p>
-            <a:pPr marL="0" indent="0">
-              <a:buNone/>
-            </a:pPr>
-            <a:r>
-              <a:rPr lang="en-US" dirty="0"/>
-              <a:t>jesus1.wav: 0.21231795463558845</a:t>
-            </a:r>
-          </a:p>
-          <a:p>
-            <a:pPr marL="0" indent="0">
-              <a:buNone/>
-            </a:pPr>
-            <a:r>
-              <a:rPr lang="en-US" dirty="0"/>
-              <a:t>God2.wav: 0.1635381466180469 </a:t>
-            </a:r>
-          </a:p>
-        </p:txBody>
-      </p:sp>
-      <p:pic>
-        <p:nvPicPr>
-          <p:cNvPr id="1026" name="Picture 2" descr="works on my machine, starburst">
-            <a:extLst>
-              <a:ext uri="{FF2B5EF4-FFF2-40B4-BE49-F238E27FC236}">
-                <a16:creationId xmlns:a16="http://schemas.microsoft.com/office/drawing/2014/main" id="{BB8EF7DC-FBE5-822B-4324-2DAEFC2EC8BF}"/>
-              </a:ext>
-            </a:extLst>
-          </p:cNvPr>
-          <p:cNvPicPr>
-            <a:picLocks noChangeAspect="1" noChangeArrowheads="1"/>
-          </p:cNvPicPr>
-          <p:nvPr/>
-        </p:nvPicPr>
-        <p:blipFill>
-          <a:blip r:embed="rId2">
-            <a:extLst>
-              <a:ext uri="{28A0092B-C50C-407E-A947-70E740481C1C}">
-                <a14:useLocalDpi xmlns:a14="http://schemas.microsoft.com/office/drawing/2010/main" val="0"/>
-              </a:ext>
-            </a:extLst>
-          </a:blip>
-          <a:srcRect/>
-          <a:stretch>
-            <a:fillRect/>
-          </a:stretch>
-        </p:blipFill>
-        <p:spPr bwMode="auto">
-          <a:xfrm>
-            <a:off x="8064253" y="838994"/>
-            <a:ext cx="1905000" cy="1838325"/>
-          </a:xfrm>
-          <a:prstGeom prst="rect">
-            <a:avLst/>
-          </a:prstGeom>
-          <a:noFill/>
-          <a:extLst>
-            <a:ext uri="{909E8E84-426E-40DD-AFC4-6F175D3DCCD1}">
-              <a14:hiddenFill xmlns:a14="http://schemas.microsoft.com/office/drawing/2010/main">
-                <a:solidFill>
-                  <a:srgbClr val="FFFFFF"/>
-                </a:solidFill>
-              </a14:hiddenFill>
-            </a:ext>
-          </a:extLst>
-        </p:spPr>
-      </p:pic>
-    </p:spTree>
-    <p:extLst>
-      <p:ext uri="{BB962C8B-B14F-4D97-AF65-F5344CB8AC3E}">
-        <p14:creationId xmlns:p14="http://schemas.microsoft.com/office/powerpoint/2010/main" val="2692368703"/>
       </p:ext>
     </p:extLst>
   </p:cSld>
@@ -4005,6 +4072,204 @@
           <p:cNvPr id="2" name="Title 1">
             <a:extLst>
               <a:ext uri="{FF2B5EF4-FFF2-40B4-BE49-F238E27FC236}">
+                <a16:creationId xmlns:a16="http://schemas.microsoft.com/office/drawing/2014/main" id="{F07483F7-F105-EE9E-F945-2F2CB35CB47D}"/>
+              </a:ext>
+            </a:extLst>
+          </p:cNvPr>
+          <p:cNvSpPr>
+            <a:spLocks noGrp="1"/>
+          </p:cNvSpPr>
+          <p:nvPr>
+            <p:ph type="title"/>
+          </p:nvPr>
+        </p:nvSpPr>
+        <p:spPr/>
+        <p:txBody>
+          <a:bodyPr/>
+          <a:lstStyle/>
+          <a:p>
+            <a:r>
+              <a:rPr lang="en-US"/>
+              <a:t>Report:</a:t>
+            </a:r>
+          </a:p>
+        </p:txBody>
+      </p:sp>
+      <p:sp>
+        <p:nvSpPr>
+          <p:cNvPr id="3" name="Content Placeholder 2">
+            <a:extLst>
+              <a:ext uri="{FF2B5EF4-FFF2-40B4-BE49-F238E27FC236}">
+                <a16:creationId xmlns:a16="http://schemas.microsoft.com/office/drawing/2014/main" id="{33A656DA-C422-EF35-BC3F-B165CA0927E0}"/>
+              </a:ext>
+            </a:extLst>
+          </p:cNvPr>
+          <p:cNvSpPr>
+            <a:spLocks noGrp="1"/>
+          </p:cNvSpPr>
+          <p:nvPr>
+            <p:ph idx="1"/>
+          </p:nvPr>
+        </p:nvSpPr>
+        <p:spPr/>
+        <p:txBody>
+          <a:bodyPr>
+            <a:normAutofit/>
+          </a:bodyPr>
+          <a:lstStyle/>
+          <a:p>
+            <a:pPr marL="0" indent="0">
+              <a:buNone/>
+            </a:pPr>
+            <a:r>
+              <a:rPr lang="en-US" dirty="0"/>
+              <a:t>Similar to wilderness1.wav:</a:t>
+            </a:r>
+          </a:p>
+          <a:p>
+            <a:pPr marL="0" indent="0">
+              <a:buNone/>
+            </a:pPr>
+            <a:r>
+              <a:rPr lang="en-US" dirty="0"/>
+              <a:t>wilderness1.wav: 1</a:t>
+            </a:r>
+          </a:p>
+          <a:p>
+            <a:pPr marL="0" indent="0">
+              <a:buNone/>
+            </a:pPr>
+            <a:r>
+              <a:rPr lang="en-US" dirty="0"/>
+              <a:t>wilderness2.wav: 0.7229432647124682</a:t>
+            </a:r>
+          </a:p>
+          <a:p>
+            <a:pPr marL="0" indent="0">
+              <a:buNone/>
+            </a:pPr>
+            <a:endParaRPr lang="en-US" dirty="0"/>
+          </a:p>
+          <a:p>
+            <a:pPr marL="0" indent="0">
+              <a:buNone/>
+            </a:pPr>
+            <a:r>
+              <a:rPr lang="en-US" dirty="0"/>
+              <a:t>jesus2.wav: 0.3134769071964211</a:t>
+            </a:r>
+          </a:p>
+          <a:p>
+            <a:pPr marL="0" indent="0">
+              <a:buNone/>
+            </a:pPr>
+            <a:r>
+              <a:rPr lang="en-US" dirty="0"/>
+              <a:t>God1.wav: 0.23680512842732715</a:t>
+            </a:r>
+          </a:p>
+          <a:p>
+            <a:pPr marL="0" indent="0">
+              <a:buNone/>
+            </a:pPr>
+            <a:r>
+              <a:rPr lang="en-US" dirty="0"/>
+              <a:t>jesus1.wav: 0.21231795463558845</a:t>
+            </a:r>
+          </a:p>
+          <a:p>
+            <a:pPr marL="0" indent="0">
+              <a:buNone/>
+            </a:pPr>
+            <a:r>
+              <a:rPr lang="en-US" dirty="0"/>
+              <a:t>God2.wav: 0.1635381466180469 </a:t>
+            </a:r>
+          </a:p>
+        </p:txBody>
+      </p:sp>
+      <p:pic>
+        <p:nvPicPr>
+          <p:cNvPr id="1026" name="Picture 2" descr="works on my machine, starburst">
+            <a:extLst>
+              <a:ext uri="{FF2B5EF4-FFF2-40B4-BE49-F238E27FC236}">
+                <a16:creationId xmlns:a16="http://schemas.microsoft.com/office/drawing/2014/main" id="{BB8EF7DC-FBE5-822B-4324-2DAEFC2EC8BF}"/>
+              </a:ext>
+            </a:extLst>
+          </p:cNvPr>
+          <p:cNvPicPr>
+            <a:picLocks noChangeAspect="1" noChangeArrowheads="1"/>
+          </p:cNvPicPr>
+          <p:nvPr/>
+        </p:nvPicPr>
+        <p:blipFill>
+          <a:blip r:embed="rId2">
+            <a:extLst>
+              <a:ext uri="{28A0092B-C50C-407E-A947-70E740481C1C}">
+                <a14:useLocalDpi xmlns:a14="http://schemas.microsoft.com/office/drawing/2010/main" val="0"/>
+              </a:ext>
+            </a:extLst>
+          </a:blip>
+          <a:srcRect/>
+          <a:stretch>
+            <a:fillRect/>
+          </a:stretch>
+        </p:blipFill>
+        <p:spPr bwMode="auto">
+          <a:xfrm>
+            <a:off x="8064253" y="838994"/>
+            <a:ext cx="1905000" cy="1838325"/>
+          </a:xfrm>
+          <a:prstGeom prst="rect">
+            <a:avLst/>
+          </a:prstGeom>
+          <a:noFill/>
+          <a:extLst>
+            <a:ext uri="{909E8E84-426E-40DD-AFC4-6F175D3DCCD1}">
+              <a14:hiddenFill xmlns:a14="http://schemas.microsoft.com/office/drawing/2010/main">
+                <a:solidFill>
+                  <a:srgbClr val="FFFFFF"/>
+                </a:solidFill>
+              </a14:hiddenFill>
+            </a:ext>
+          </a:extLst>
+        </p:spPr>
+      </p:pic>
+    </p:spTree>
+    <p:extLst>
+      <p:ext uri="{BB962C8B-B14F-4D97-AF65-F5344CB8AC3E}">
+        <p14:creationId xmlns:p14="http://schemas.microsoft.com/office/powerpoint/2010/main" val="2692368703"/>
+      </p:ext>
+    </p:extLst>
+  </p:cSld>
+  <p:clrMapOvr>
+    <a:masterClrMapping/>
+  </p:clrMapOvr>
+</p:sld>
+</file>
+
+<file path=ppt/slides/slide14.xml><?xml version="1.0" encoding="utf-8"?>
+<p:sld xmlns:a="http://schemas.openxmlformats.org/drawingml/2006/main" xmlns:r="http://schemas.openxmlformats.org/officeDocument/2006/relationships" xmlns:p="http://schemas.openxmlformats.org/presentationml/2006/main">
+  <p:cSld>
+    <p:spTree>
+      <p:nvGrpSpPr>
+        <p:cNvPr id="1" name=""/>
+        <p:cNvGrpSpPr/>
+        <p:nvPr/>
+      </p:nvGrpSpPr>
+      <p:grpSpPr>
+        <a:xfrm>
+          <a:off x="0" y="0"/>
+          <a:ext cx="0" cy="0"/>
+          <a:chOff x="0" y="0"/>
+          <a:chExt cx="0" cy="0"/>
+        </a:xfrm>
+      </p:grpSpPr>
+      <p:sp>
+        <p:nvSpPr>
+          <p:cNvPr id="2" name="Title 1">
+            <a:extLst>
+              <a:ext uri="{FF2B5EF4-FFF2-40B4-BE49-F238E27FC236}">
                 <a16:creationId xmlns:a16="http://schemas.microsoft.com/office/drawing/2014/main" id="{5B24CD70-B7ED-27E6-4EAD-F9192B5AB679}"/>
               </a:ext>
             </a:extLst>
@@ -4078,7 +4343,7 @@
 </p:sld>
 </file>
 
-<file path=ppt/slides/slide14.xml><?xml version="1.0" encoding="utf-8"?>
+<file path=ppt/slides/slide15.xml><?xml version="1.0" encoding="utf-8"?>
 <p:sld xmlns:a="http://schemas.openxmlformats.org/drawingml/2006/main" xmlns:r="http://schemas.openxmlformats.org/officeDocument/2006/relationships" xmlns:p="http://schemas.openxmlformats.org/presentationml/2006/main">
   <p:cSld>
     <p:spTree>
@@ -5261,7 +5526,7 @@
 </p:sld>
 </file>
 
-<file path=ppt/slides/slide15.xml><?xml version="1.0" encoding="utf-8"?>
+<file path=ppt/slides/slide16.xml><?xml version="1.0" encoding="utf-8"?>
 <p:sld xmlns:a="http://schemas.openxmlformats.org/drawingml/2006/main" xmlns:r="http://schemas.openxmlformats.org/officeDocument/2006/relationships" xmlns:p="http://schemas.openxmlformats.org/presentationml/2006/main">
   <p:cSld>
     <p:spTree>
@@ -5412,7 +5677,7 @@
 </p:sld>
 </file>
 
-<file path=ppt/slides/slide16.xml><?xml version="1.0" encoding="utf-8"?>
+<file path=ppt/slides/slide17.xml><?xml version="1.0" encoding="utf-8"?>
 <p:sld xmlns:a="http://schemas.openxmlformats.org/drawingml/2006/main" xmlns:r="http://schemas.openxmlformats.org/officeDocument/2006/relationships" xmlns:p="http://schemas.openxmlformats.org/presentationml/2006/main">
   <p:cSld>
     <p:spTree>
@@ -5612,7 +5877,7 @@
         <p:cNvPr id="1" name="">
           <a:extLst>
             <a:ext uri="{FF2B5EF4-FFF2-40B4-BE49-F238E27FC236}">
-              <a16:creationId xmlns:a16="http://schemas.microsoft.com/office/drawing/2014/main" id="{22DF9C79-3E28-99C8-7637-4083F42174A5}"/>
+              <a16:creationId xmlns:a16="http://schemas.microsoft.com/office/drawing/2014/main" id="{97C0E83A-6F52-BF5D-795A-D800AC06C377}"/>
             </a:ext>
           </a:extLst>
         </p:cNvPr>
@@ -5627,309 +5892,12 @@
           <a:chExt cx="0" cy="0"/>
         </a:xfrm>
       </p:grpSpPr>
-      <p:sp>
-        <p:nvSpPr>
-          <p:cNvPr id="2" name="Title 1">
-            <a:extLst>
-              <a:ext uri="{FF2B5EF4-FFF2-40B4-BE49-F238E27FC236}">
-                <a16:creationId xmlns:a16="http://schemas.microsoft.com/office/drawing/2014/main" id="{3111F55A-5E9D-E1FD-1E9E-E03CF38D1192}"/>
-              </a:ext>
-            </a:extLst>
-          </p:cNvPr>
-          <p:cNvSpPr>
-            <a:spLocks noGrp="1"/>
-          </p:cNvSpPr>
-          <p:nvPr>
-            <p:ph type="title"/>
-          </p:nvPr>
-        </p:nvSpPr>
-        <p:spPr/>
-        <p:txBody>
-          <a:bodyPr/>
-          <a:lstStyle/>
-          <a:p>
-            <a:r>
-              <a:rPr lang="en-US" dirty="0" err="1"/>
-              <a:t>uW</a:t>
-            </a:r>
-            <a:r>
-              <a:rPr lang="en-US" dirty="0"/>
-              <a:t> Hackathon – 2024</a:t>
-            </a:r>
-          </a:p>
-        </p:txBody>
-      </p:sp>
-      <p:sp>
-        <p:nvSpPr>
-          <p:cNvPr id="3" name="Content Placeholder 2">
-            <a:extLst>
-              <a:ext uri="{FF2B5EF4-FFF2-40B4-BE49-F238E27FC236}">
-                <a16:creationId xmlns:a16="http://schemas.microsoft.com/office/drawing/2014/main" id="{6897B471-8C70-2B80-6711-11F968847A27}"/>
-              </a:ext>
-            </a:extLst>
-          </p:cNvPr>
-          <p:cNvSpPr>
-            <a:spLocks noGrp="1"/>
-          </p:cNvSpPr>
-          <p:nvPr>
-            <p:ph idx="1"/>
-          </p:nvPr>
-        </p:nvSpPr>
-        <p:spPr>
-          <a:xfrm>
-            <a:off x="328246" y="2076167"/>
-            <a:ext cx="11025554" cy="4511064"/>
-          </a:xfrm>
-        </p:spPr>
-        <p:txBody>
-          <a:bodyPr>
-            <a:normAutofit/>
-          </a:bodyPr>
-          <a:lstStyle/>
-          <a:p>
-            <a:pPr marL="0" indent="0">
-              <a:lnSpc>
-                <a:spcPct val="120000"/>
-              </a:lnSpc>
-              <a:buNone/>
-            </a:pPr>
-            <a:r>
-              <a:rPr lang="en-US" sz="3600" dirty="0">
-                <a:latin typeface="Georgia" panose="02040502050405020303" pitchFamily="18" charset="0"/>
-              </a:rPr>
-              <a:t>Keyword checking prototype </a:t>
-            </a:r>
-          </a:p>
-          <a:p>
-            <a:pPr marL="0" indent="0">
-              <a:lnSpc>
-                <a:spcPct val="120000"/>
-              </a:lnSpc>
-              <a:buNone/>
-            </a:pPr>
-            <a:r>
-              <a:rPr lang="en-US" sz="3600" dirty="0">
-                <a:latin typeface="Georgia" panose="02040502050405020303" pitchFamily="18" charset="0"/>
-              </a:rPr>
-              <a:t>AKA – “Is this thing on?”</a:t>
-            </a:r>
-          </a:p>
-        </p:txBody>
-      </p:sp>
       <p:pic>
         <p:nvPicPr>
-          <p:cNvPr id="6" name="Picture 5" descr="A person standing on a stage holding a box with a microphone&#10;&#10;Description automatically generated">
+          <p:cNvPr id="4" name="Picture 3" descr="A red and white tag with white text&#10;&#10;Description automatically generated">
             <a:extLst>
               <a:ext uri="{FF2B5EF4-FFF2-40B4-BE49-F238E27FC236}">
-                <a16:creationId xmlns:a16="http://schemas.microsoft.com/office/drawing/2014/main" id="{BA41436D-E2B5-32E3-074C-4D0A7FA9BEC1}"/>
-              </a:ext>
-            </a:extLst>
-          </p:cNvPr>
-          <p:cNvPicPr>
-            <a:picLocks noChangeAspect="1"/>
-          </p:cNvPicPr>
-          <p:nvPr/>
-        </p:nvPicPr>
-        <p:blipFill>
-          <a:blip r:embed="rId2">
-            <a:extLst>
-              <a:ext uri="{28A0092B-C50C-407E-A947-70E740481C1C}">
-                <a14:useLocalDpi xmlns:a14="http://schemas.microsoft.com/office/drawing/2010/main" val="0"/>
-              </a:ext>
-            </a:extLst>
-          </a:blip>
-          <a:stretch>
-            <a:fillRect/>
-          </a:stretch>
-        </p:blipFill>
-        <p:spPr>
-          <a:xfrm>
-            <a:off x="7246815" y="2076167"/>
-            <a:ext cx="4763477" cy="4763477"/>
-          </a:xfrm>
-          <a:prstGeom prst="rect">
-            <a:avLst/>
-          </a:prstGeom>
-        </p:spPr>
-      </p:pic>
-    </p:spTree>
-    <p:extLst>
-      <p:ext uri="{BB962C8B-B14F-4D97-AF65-F5344CB8AC3E}">
-        <p14:creationId xmlns:p14="http://schemas.microsoft.com/office/powerpoint/2010/main" val="907859234"/>
-      </p:ext>
-    </p:extLst>
-  </p:cSld>
-  <p:clrMapOvr>
-    <a:masterClrMapping/>
-  </p:clrMapOvr>
-</p:sld>
-</file>
-
-<file path=ppt/slides/slide3.xml><?xml version="1.0" encoding="utf-8"?>
-<p:sld xmlns:a="http://schemas.openxmlformats.org/drawingml/2006/main" xmlns:r="http://schemas.openxmlformats.org/officeDocument/2006/relationships" xmlns:p="http://schemas.openxmlformats.org/presentationml/2006/main">
-  <p:cSld>
-    <p:spTree>
-      <p:nvGrpSpPr>
-        <p:cNvPr id="1" name="">
-          <a:extLst>
-            <a:ext uri="{FF2B5EF4-FFF2-40B4-BE49-F238E27FC236}">
-              <a16:creationId xmlns:a16="http://schemas.microsoft.com/office/drawing/2014/main" id="{0EA09A20-E3F8-FA3B-6E2C-A5A930467781}"/>
-            </a:ext>
-          </a:extLst>
-        </p:cNvPr>
-        <p:cNvGrpSpPr/>
-        <p:nvPr/>
-      </p:nvGrpSpPr>
-      <p:grpSpPr>
-        <a:xfrm>
-          <a:off x="0" y="0"/>
-          <a:ext cx="0" cy="0"/>
-          <a:chOff x="0" y="0"/>
-          <a:chExt cx="0" cy="0"/>
-        </a:xfrm>
-      </p:grpSpPr>
-      <p:sp>
-        <p:nvSpPr>
-          <p:cNvPr id="3" name="Content Placeholder 2">
-            <a:extLst>
-              <a:ext uri="{FF2B5EF4-FFF2-40B4-BE49-F238E27FC236}">
-                <a16:creationId xmlns:a16="http://schemas.microsoft.com/office/drawing/2014/main" id="{9D090549-E39A-95CD-1921-17A8F4E3F1A5}"/>
-              </a:ext>
-            </a:extLst>
-          </p:cNvPr>
-          <p:cNvSpPr>
-            <a:spLocks noGrp="1"/>
-          </p:cNvSpPr>
-          <p:nvPr>
-            <p:ph idx="1"/>
-          </p:nvPr>
-        </p:nvSpPr>
-        <p:spPr/>
-        <p:txBody>
-          <a:bodyPr>
-            <a:normAutofit/>
-          </a:bodyPr>
-          <a:lstStyle/>
-          <a:p>
-            <a:pPr marL="0" indent="0">
-              <a:buNone/>
-            </a:pPr>
-            <a:r>
-              <a:rPr lang="en-US" dirty="0"/>
-              <a:t>Method:</a:t>
-            </a:r>
-          </a:p>
-          <a:p>
-            <a:pPr marL="0" indent="0">
-              <a:buNone/>
-            </a:pPr>
-            <a:r>
-              <a:rPr lang="en-US" dirty="0"/>
-              <a:t>Python packages:</a:t>
-            </a:r>
-          </a:p>
-          <a:p>
-            <a:pPr marL="0" indent="0">
-              <a:buNone/>
-            </a:pPr>
-            <a:r>
-              <a:rPr lang="en-US" dirty="0"/>
-              <a:t>- </a:t>
-            </a:r>
-            <a:r>
-              <a:rPr lang="en-US" dirty="0" err="1"/>
-              <a:t>librosa</a:t>
-            </a:r>
-            <a:r>
-              <a:rPr lang="en-US" dirty="0"/>
-              <a:t>	Encoding audio data</a:t>
-            </a:r>
-          </a:p>
-          <a:p>
-            <a:pPr marL="0" indent="0">
-              <a:buNone/>
-            </a:pPr>
-            <a:endParaRPr lang="en-US" dirty="0"/>
-          </a:p>
-          <a:p>
-            <a:pPr marL="514350" indent="-514350">
-              <a:buAutoNum type="arabicPeriod"/>
-            </a:pPr>
-            <a:r>
-              <a:rPr lang="en-US" dirty="0"/>
-              <a:t>Collect the Data</a:t>
-            </a:r>
-          </a:p>
-          <a:p>
-            <a:pPr marL="514350" indent="-514350">
-              <a:buAutoNum type="arabicPeriod"/>
-            </a:pPr>
-            <a:r>
-              <a:rPr lang="en-US" dirty="0"/>
-              <a:t>Clean the Data</a:t>
-            </a:r>
-          </a:p>
-          <a:p>
-            <a:pPr marL="514350" indent="-514350">
-              <a:buAutoNum type="arabicPeriod"/>
-            </a:pPr>
-            <a:r>
-              <a:rPr lang="en-US" dirty="0"/>
-              <a:t>Explore/Visualize the Data</a:t>
-            </a:r>
-          </a:p>
-          <a:p>
-            <a:pPr marL="0" indent="0">
-              <a:buNone/>
-            </a:pPr>
-            <a:endParaRPr lang="en-US" dirty="0"/>
-          </a:p>
-          <a:p>
-            <a:pPr marL="0" indent="0">
-              <a:buNone/>
-            </a:pPr>
-            <a:endParaRPr lang="en-US" dirty="0"/>
-          </a:p>
-        </p:txBody>
-      </p:sp>
-      <p:sp>
-        <p:nvSpPr>
-          <p:cNvPr id="2" name="Title 1">
-            <a:extLst>
-              <a:ext uri="{FF2B5EF4-FFF2-40B4-BE49-F238E27FC236}">
-                <a16:creationId xmlns:a16="http://schemas.microsoft.com/office/drawing/2014/main" id="{186F3137-2A61-B919-17E2-7AE5D8C49FDE}"/>
-              </a:ext>
-            </a:extLst>
-          </p:cNvPr>
-          <p:cNvSpPr>
-            <a:spLocks noGrp="1"/>
-          </p:cNvSpPr>
-          <p:nvPr>
-            <p:ph type="title"/>
-          </p:nvPr>
-        </p:nvSpPr>
-        <p:spPr/>
-        <p:txBody>
-          <a:bodyPr/>
-          <a:lstStyle/>
-          <a:p>
-            <a:r>
-              <a:rPr lang="en-US" dirty="0" err="1"/>
-              <a:t>uW</a:t>
-            </a:r>
-            <a:r>
-              <a:rPr lang="en-US" dirty="0"/>
-              <a:t> Hackathon – 2024</a:t>
-            </a:r>
-          </a:p>
-        </p:txBody>
-      </p:sp>
-      <p:pic>
-        <p:nvPicPr>
-          <p:cNvPr id="5" name="Picture 4" descr="A red and white tag with white text&#10;&#10;Description automatically generated">
-            <a:extLst>
-              <a:ext uri="{FF2B5EF4-FFF2-40B4-BE49-F238E27FC236}">
-                <a16:creationId xmlns:a16="http://schemas.microsoft.com/office/drawing/2014/main" id="{AED5D47C-E738-287E-2DDC-2F4377258A6C}"/>
+                <a16:creationId xmlns:a16="http://schemas.microsoft.com/office/drawing/2014/main" id="{3D627B4B-8EB7-DE39-02C0-F5DB71765DF7}"/>
               </a:ext>
             </a:extLst>
           </p:cNvPr>
@@ -5980,6 +5948,543 @@
         </p:blipFill>
         <p:spPr>
           <a:xfrm>
+            <a:off x="11117020" y="1210280"/>
+            <a:ext cx="473560" cy="473560"/>
+          </a:xfrm>
+          <a:prstGeom prst="rect">
+            <a:avLst/>
+          </a:prstGeom>
+        </p:spPr>
+      </p:pic>
+      <p:sp>
+        <p:nvSpPr>
+          <p:cNvPr id="2" name="Title 1">
+            <a:extLst>
+              <a:ext uri="{FF2B5EF4-FFF2-40B4-BE49-F238E27FC236}">
+                <a16:creationId xmlns:a16="http://schemas.microsoft.com/office/drawing/2014/main" id="{F48BAF01-A3E1-C6C6-CD1F-DACA7357555C}"/>
+              </a:ext>
+            </a:extLst>
+          </p:cNvPr>
+          <p:cNvSpPr>
+            <a:spLocks noGrp="1"/>
+          </p:cNvSpPr>
+          <p:nvPr>
+            <p:ph type="title"/>
+          </p:nvPr>
+        </p:nvSpPr>
+        <p:spPr/>
+        <p:txBody>
+          <a:bodyPr/>
+          <a:lstStyle/>
+          <a:p>
+            <a:r>
+              <a:rPr lang="en-US" dirty="0" err="1"/>
+              <a:t>uW</a:t>
+            </a:r>
+            <a:r>
+              <a:rPr lang="en-US" dirty="0"/>
+              <a:t> Hackathon – 2024</a:t>
+            </a:r>
+          </a:p>
+        </p:txBody>
+      </p:sp>
+      <p:sp>
+        <p:nvSpPr>
+          <p:cNvPr id="3" name="Content Placeholder 2">
+            <a:extLst>
+              <a:ext uri="{FF2B5EF4-FFF2-40B4-BE49-F238E27FC236}">
+                <a16:creationId xmlns:a16="http://schemas.microsoft.com/office/drawing/2014/main" id="{3DCB4847-4956-EC1B-6BA1-CF49E7545679}"/>
+              </a:ext>
+            </a:extLst>
+          </p:cNvPr>
+          <p:cNvSpPr>
+            <a:spLocks noGrp="1"/>
+          </p:cNvSpPr>
+          <p:nvPr>
+            <p:ph idx="1"/>
+          </p:nvPr>
+        </p:nvSpPr>
+        <p:spPr>
+          <a:xfrm>
+            <a:off x="1180730" y="1447060"/>
+            <a:ext cx="10173070" cy="5140171"/>
+          </a:xfrm>
+        </p:spPr>
+        <p:txBody>
+          <a:bodyPr>
+            <a:normAutofit/>
+          </a:bodyPr>
+          <a:lstStyle/>
+          <a:p>
+            <a:pPr marL="0" indent="0">
+              <a:lnSpc>
+                <a:spcPct val="120000"/>
+              </a:lnSpc>
+              <a:buNone/>
+            </a:pPr>
+            <a:endParaRPr lang="en-US" sz="2000" dirty="0">
+              <a:latin typeface="Georgia" panose="02040502050405020303" pitchFamily="18" charset="0"/>
+            </a:endParaRPr>
+          </a:p>
+          <a:p>
+            <a:pPr marL="0" indent="0">
+              <a:lnSpc>
+                <a:spcPct val="120000"/>
+              </a:lnSpc>
+              <a:buNone/>
+            </a:pPr>
+            <a:r>
+              <a:rPr lang="en-US" sz="2000" b="1" dirty="0">
+                <a:latin typeface="Georgia" panose="02040502050405020303" pitchFamily="18" charset="0"/>
+              </a:rPr>
+              <a:t>Thesis</a:t>
+            </a:r>
+            <a:r>
+              <a:rPr lang="en-US" sz="2000" dirty="0">
+                <a:latin typeface="Georgia" panose="02040502050405020303" pitchFamily="18" charset="0"/>
+              </a:rPr>
+              <a:t>: Find a stable method for recognizing individual words in low-resource languages.</a:t>
+            </a:r>
+          </a:p>
+          <a:p>
+            <a:pPr marL="0" indent="0">
+              <a:lnSpc>
+                <a:spcPct val="120000"/>
+              </a:lnSpc>
+              <a:buNone/>
+            </a:pPr>
+            <a:r>
+              <a:rPr lang="en-US" sz="2000" dirty="0">
+                <a:latin typeface="Georgia" panose="02040502050405020303" pitchFamily="18" charset="0"/>
+              </a:rPr>
+              <a:t>Here, we propose a model to recognize individual spoken words in </a:t>
+            </a:r>
+            <a:r>
+              <a:rPr lang="en-US" sz="2000" dirty="0" err="1">
+                <a:latin typeface="Georgia" panose="02040502050405020303" pitchFamily="18" charset="0"/>
+              </a:rPr>
+              <a:t>Dholuo</a:t>
+            </a:r>
+            <a:r>
+              <a:rPr lang="en-US" sz="2000" dirty="0">
+                <a:latin typeface="Georgia" panose="02040502050405020303" pitchFamily="18" charset="0"/>
+              </a:rPr>
+              <a:t>.</a:t>
+            </a:r>
+          </a:p>
+          <a:p>
+            <a:pPr marL="0" indent="0">
+              <a:lnSpc>
+                <a:spcPct val="120000"/>
+              </a:lnSpc>
+              <a:buNone/>
+            </a:pPr>
+            <a:endParaRPr lang="en-US" sz="2000" dirty="0">
+              <a:latin typeface="Georgia" panose="02040502050405020303" pitchFamily="18" charset="0"/>
+            </a:endParaRPr>
+          </a:p>
+          <a:p>
+            <a:pPr marL="0" indent="0">
+              <a:lnSpc>
+                <a:spcPct val="120000"/>
+              </a:lnSpc>
+              <a:buNone/>
+            </a:pPr>
+            <a:endParaRPr lang="en-US" sz="2000" dirty="0">
+              <a:latin typeface="Georgia" panose="02040502050405020303" pitchFamily="18" charset="0"/>
+            </a:endParaRPr>
+          </a:p>
+        </p:txBody>
+      </p:sp>
+    </p:spTree>
+    <p:extLst>
+      <p:ext uri="{BB962C8B-B14F-4D97-AF65-F5344CB8AC3E}">
+        <p14:creationId xmlns:p14="http://schemas.microsoft.com/office/powerpoint/2010/main" val="3108004200"/>
+      </p:ext>
+    </p:extLst>
+  </p:cSld>
+  <p:clrMapOvr>
+    <a:masterClrMapping/>
+  </p:clrMapOvr>
+</p:sld>
+</file>
+
+<file path=ppt/slides/slide3.xml><?xml version="1.0" encoding="utf-8"?>
+<p:sld xmlns:a="http://schemas.openxmlformats.org/drawingml/2006/main" xmlns:r="http://schemas.openxmlformats.org/officeDocument/2006/relationships" xmlns:p="http://schemas.openxmlformats.org/presentationml/2006/main">
+  <p:cSld>
+    <p:spTree>
+      <p:nvGrpSpPr>
+        <p:cNvPr id="1" name="">
+          <a:extLst>
+            <a:ext uri="{FF2B5EF4-FFF2-40B4-BE49-F238E27FC236}">
+              <a16:creationId xmlns:a16="http://schemas.microsoft.com/office/drawing/2014/main" id="{22DF9C79-3E28-99C8-7637-4083F42174A5}"/>
+            </a:ext>
+          </a:extLst>
+        </p:cNvPr>
+        <p:cNvGrpSpPr/>
+        <p:nvPr/>
+      </p:nvGrpSpPr>
+      <p:grpSpPr>
+        <a:xfrm>
+          <a:off x="0" y="0"/>
+          <a:ext cx="0" cy="0"/>
+          <a:chOff x="0" y="0"/>
+          <a:chExt cx="0" cy="0"/>
+        </a:xfrm>
+      </p:grpSpPr>
+      <p:sp>
+        <p:nvSpPr>
+          <p:cNvPr id="2" name="Title 1">
+            <a:extLst>
+              <a:ext uri="{FF2B5EF4-FFF2-40B4-BE49-F238E27FC236}">
+                <a16:creationId xmlns:a16="http://schemas.microsoft.com/office/drawing/2014/main" id="{3111F55A-5E9D-E1FD-1E9E-E03CF38D1192}"/>
+              </a:ext>
+            </a:extLst>
+          </p:cNvPr>
+          <p:cNvSpPr>
+            <a:spLocks noGrp="1"/>
+          </p:cNvSpPr>
+          <p:nvPr>
+            <p:ph type="title"/>
+          </p:nvPr>
+        </p:nvSpPr>
+        <p:spPr/>
+        <p:txBody>
+          <a:bodyPr/>
+          <a:lstStyle/>
+          <a:p>
+            <a:r>
+              <a:rPr lang="en-US" dirty="0" err="1"/>
+              <a:t>uW</a:t>
+            </a:r>
+            <a:r>
+              <a:rPr lang="en-US" dirty="0"/>
+              <a:t> Hackathon – 2024</a:t>
+            </a:r>
+          </a:p>
+        </p:txBody>
+      </p:sp>
+      <p:sp>
+        <p:nvSpPr>
+          <p:cNvPr id="3" name="Content Placeholder 2">
+            <a:extLst>
+              <a:ext uri="{FF2B5EF4-FFF2-40B4-BE49-F238E27FC236}">
+                <a16:creationId xmlns:a16="http://schemas.microsoft.com/office/drawing/2014/main" id="{6897B471-8C70-2B80-6711-11F968847A27}"/>
+              </a:ext>
+            </a:extLst>
+          </p:cNvPr>
+          <p:cNvSpPr>
+            <a:spLocks noGrp="1"/>
+          </p:cNvSpPr>
+          <p:nvPr>
+            <p:ph idx="1"/>
+          </p:nvPr>
+        </p:nvSpPr>
+        <p:spPr>
+          <a:xfrm>
+            <a:off x="328246" y="2076167"/>
+            <a:ext cx="11025554" cy="4511064"/>
+          </a:xfrm>
+        </p:spPr>
+        <p:txBody>
+          <a:bodyPr>
+            <a:normAutofit/>
+          </a:bodyPr>
+          <a:lstStyle/>
+          <a:p>
+            <a:pPr marL="0" indent="0">
+              <a:lnSpc>
+                <a:spcPct val="120000"/>
+              </a:lnSpc>
+              <a:buNone/>
+            </a:pPr>
+            <a:r>
+              <a:rPr lang="en-US" sz="3600" dirty="0">
+                <a:latin typeface="Georgia" panose="02040502050405020303" pitchFamily="18" charset="0"/>
+              </a:rPr>
+              <a:t>Keyword checking prototype </a:t>
+            </a:r>
+          </a:p>
+          <a:p>
+            <a:pPr marL="0" indent="0">
+              <a:lnSpc>
+                <a:spcPct val="120000"/>
+              </a:lnSpc>
+              <a:buNone/>
+            </a:pPr>
+            <a:r>
+              <a:rPr lang="en-US" sz="3600" dirty="0">
+                <a:latin typeface="Georgia" panose="02040502050405020303" pitchFamily="18" charset="0"/>
+              </a:rPr>
+              <a:t>AKA – “Is this thing on?”</a:t>
+            </a:r>
+          </a:p>
+        </p:txBody>
+      </p:sp>
+      <p:pic>
+        <p:nvPicPr>
+          <p:cNvPr id="6" name="Picture 5" descr="A person standing on a stage holding a box with a microphone&#10;&#10;Description automatically generated">
+            <a:extLst>
+              <a:ext uri="{FF2B5EF4-FFF2-40B4-BE49-F238E27FC236}">
+                <a16:creationId xmlns:a16="http://schemas.microsoft.com/office/drawing/2014/main" id="{BA41436D-E2B5-32E3-074C-4D0A7FA9BEC1}"/>
+              </a:ext>
+            </a:extLst>
+          </p:cNvPr>
+          <p:cNvPicPr>
+            <a:picLocks noChangeAspect="1"/>
+          </p:cNvPicPr>
+          <p:nvPr/>
+        </p:nvPicPr>
+        <p:blipFill>
+          <a:blip r:embed="rId2">
+            <a:extLst>
+              <a:ext uri="{28A0092B-C50C-407E-A947-70E740481C1C}">
+                <a14:useLocalDpi xmlns:a14="http://schemas.microsoft.com/office/drawing/2010/main" val="0"/>
+              </a:ext>
+            </a:extLst>
+          </a:blip>
+          <a:stretch>
+            <a:fillRect/>
+          </a:stretch>
+        </p:blipFill>
+        <p:spPr>
+          <a:xfrm>
+            <a:off x="7246815" y="2076167"/>
+            <a:ext cx="4763477" cy="4763477"/>
+          </a:xfrm>
+          <a:prstGeom prst="rect">
+            <a:avLst/>
+          </a:prstGeom>
+        </p:spPr>
+      </p:pic>
+    </p:spTree>
+    <p:extLst>
+      <p:ext uri="{BB962C8B-B14F-4D97-AF65-F5344CB8AC3E}">
+        <p14:creationId xmlns:p14="http://schemas.microsoft.com/office/powerpoint/2010/main" val="907859234"/>
+      </p:ext>
+    </p:extLst>
+  </p:cSld>
+  <p:clrMapOvr>
+    <a:masterClrMapping/>
+  </p:clrMapOvr>
+</p:sld>
+</file>
+
+<file path=ppt/slides/slide4.xml><?xml version="1.0" encoding="utf-8"?>
+<p:sld xmlns:a="http://schemas.openxmlformats.org/drawingml/2006/main" xmlns:r="http://schemas.openxmlformats.org/officeDocument/2006/relationships" xmlns:p="http://schemas.openxmlformats.org/presentationml/2006/main">
+  <p:cSld>
+    <p:spTree>
+      <p:nvGrpSpPr>
+        <p:cNvPr id="1" name="">
+          <a:extLst>
+            <a:ext uri="{FF2B5EF4-FFF2-40B4-BE49-F238E27FC236}">
+              <a16:creationId xmlns:a16="http://schemas.microsoft.com/office/drawing/2014/main" id="{0EA09A20-E3F8-FA3B-6E2C-A5A930467781}"/>
+            </a:ext>
+          </a:extLst>
+        </p:cNvPr>
+        <p:cNvGrpSpPr/>
+        <p:nvPr/>
+      </p:nvGrpSpPr>
+      <p:grpSpPr>
+        <a:xfrm>
+          <a:off x="0" y="0"/>
+          <a:ext cx="0" cy="0"/>
+          <a:chOff x="0" y="0"/>
+          <a:chExt cx="0" cy="0"/>
+        </a:xfrm>
+      </p:grpSpPr>
+      <p:sp>
+        <p:nvSpPr>
+          <p:cNvPr id="3" name="Content Placeholder 2">
+            <a:extLst>
+              <a:ext uri="{FF2B5EF4-FFF2-40B4-BE49-F238E27FC236}">
+                <a16:creationId xmlns:a16="http://schemas.microsoft.com/office/drawing/2014/main" id="{9D090549-E39A-95CD-1921-17A8F4E3F1A5}"/>
+              </a:ext>
+            </a:extLst>
+          </p:cNvPr>
+          <p:cNvSpPr>
+            <a:spLocks noGrp="1"/>
+          </p:cNvSpPr>
+          <p:nvPr>
+            <p:ph idx="1"/>
+          </p:nvPr>
+        </p:nvSpPr>
+        <p:spPr/>
+        <p:txBody>
+          <a:bodyPr>
+            <a:normAutofit/>
+          </a:bodyPr>
+          <a:lstStyle/>
+          <a:p>
+            <a:pPr marL="0" indent="0">
+              <a:buNone/>
+            </a:pPr>
+            <a:r>
+              <a:rPr lang="en-US" dirty="0"/>
+              <a:t>Method:</a:t>
+            </a:r>
+          </a:p>
+          <a:p>
+            <a:pPr marL="0" indent="0">
+              <a:buNone/>
+            </a:pPr>
+            <a:r>
+              <a:rPr lang="en-US" dirty="0"/>
+              <a:t>Python packages:</a:t>
+            </a:r>
+          </a:p>
+          <a:p>
+            <a:pPr marL="0" indent="0">
+              <a:buNone/>
+            </a:pPr>
+            <a:r>
+              <a:rPr lang="en-US" dirty="0"/>
+              <a:t>- </a:t>
+            </a:r>
+            <a:r>
+              <a:rPr lang="en-US" dirty="0" err="1"/>
+              <a:t>librosa</a:t>
+            </a:r>
+            <a:r>
+              <a:rPr lang="en-US" dirty="0"/>
+              <a:t>	Encoding audio data</a:t>
+            </a:r>
+          </a:p>
+          <a:p>
+            <a:pPr marL="0" indent="0">
+              <a:buNone/>
+            </a:pPr>
+            <a:endParaRPr lang="en-US" dirty="0"/>
+          </a:p>
+          <a:p>
+            <a:pPr marL="514350" indent="-514350">
+              <a:buAutoNum type="arabicPeriod"/>
+            </a:pPr>
+            <a:r>
+              <a:rPr lang="en-US" dirty="0"/>
+              <a:t>Collect the Data</a:t>
+            </a:r>
+          </a:p>
+          <a:p>
+            <a:pPr marL="514350" indent="-514350">
+              <a:buAutoNum type="arabicPeriod"/>
+            </a:pPr>
+            <a:r>
+              <a:rPr lang="en-US" dirty="0"/>
+              <a:t>Clean the Data</a:t>
+            </a:r>
+          </a:p>
+          <a:p>
+            <a:pPr marL="514350" indent="-514350">
+              <a:buAutoNum type="arabicPeriod"/>
+            </a:pPr>
+            <a:r>
+              <a:rPr lang="en-US" dirty="0"/>
+              <a:t>Explore/Visualize the Data</a:t>
+            </a:r>
+          </a:p>
+          <a:p>
+            <a:pPr marL="0" indent="0">
+              <a:buNone/>
+            </a:pPr>
+            <a:endParaRPr lang="en-US" dirty="0"/>
+          </a:p>
+          <a:p>
+            <a:pPr marL="0" indent="0">
+              <a:buNone/>
+            </a:pPr>
+            <a:endParaRPr lang="en-US" dirty="0"/>
+          </a:p>
+        </p:txBody>
+      </p:sp>
+      <p:sp>
+        <p:nvSpPr>
+          <p:cNvPr id="2" name="Title 1">
+            <a:extLst>
+              <a:ext uri="{FF2B5EF4-FFF2-40B4-BE49-F238E27FC236}">
+                <a16:creationId xmlns:a16="http://schemas.microsoft.com/office/drawing/2014/main" id="{186F3137-2A61-B919-17E2-7AE5D8C49FDE}"/>
+              </a:ext>
+            </a:extLst>
+          </p:cNvPr>
+          <p:cNvSpPr>
+            <a:spLocks noGrp="1"/>
+          </p:cNvSpPr>
+          <p:nvPr>
+            <p:ph type="title"/>
+          </p:nvPr>
+        </p:nvSpPr>
+        <p:spPr/>
+        <p:txBody>
+          <a:bodyPr/>
+          <a:lstStyle/>
+          <a:p>
+            <a:r>
+              <a:rPr lang="en-US" dirty="0" err="1"/>
+              <a:t>uW</a:t>
+            </a:r>
+            <a:r>
+              <a:rPr lang="en-US" dirty="0"/>
+              <a:t> Hackathon – 2024</a:t>
+            </a:r>
+          </a:p>
+        </p:txBody>
+      </p:sp>
+      <p:pic>
+        <p:nvPicPr>
+          <p:cNvPr id="5" name="Picture 4" descr="A red and white tag with white text&#10;&#10;Description automatically generated">
+            <a:extLst>
+              <a:ext uri="{FF2B5EF4-FFF2-40B4-BE49-F238E27FC236}">
+                <a16:creationId xmlns:a16="http://schemas.microsoft.com/office/drawing/2014/main" id="{AED5D47C-E738-287E-2DDC-2F4377258A6C}"/>
+              </a:ext>
+            </a:extLst>
+          </p:cNvPr>
+          <p:cNvPicPr>
+            <a:picLocks noChangeAspect="1"/>
+          </p:cNvPicPr>
+          <p:nvPr/>
+        </p:nvPicPr>
+        <p:blipFill>
+          <a:blip r:embed="rId2">
+            <a:extLst>
+              <a:ext uri="{BEBA8EAE-BF5A-486C-A8C5-ECC9F3942E4B}">
+                <a14:imgProps xmlns:a14="http://schemas.microsoft.com/office/drawing/2010/main">
+                  <a14:imgLayer r:embed="rId3">
+                    <a14:imgEffect>
+                      <a14:backgroundRemoval t="10000" b="90000" l="10000" r="90000">
+                        <a14:foregroundMark x1="23242" y1="34277" x2="19922" y2="49902"/>
+                        <a14:foregroundMark x1="19922" y1="49902" x2="27051" y2="56055"/>
+                        <a14:foregroundMark x1="27051" y1="56055" x2="35547" y2="50195"/>
+                        <a14:foregroundMark x1="35547" y1="50195" x2="33398" y2="36719"/>
+                        <a14:foregroundMark x1="33398" y1="36719" x2="25195" y2="33301"/>
+                        <a14:foregroundMark x1="25195" y1="33301" x2="23438" y2="33984"/>
+                        <a14:foregroundMark x1="28809" y1="37012" x2="25195" y2="45801"/>
+                        <a14:foregroundMark x1="25195" y1="45801" x2="30371" y2="49512"/>
+                        <a14:foregroundMark x1="42480" y1="34863" x2="42773" y2="43555"/>
+                        <a14:foregroundMark x1="42773" y1="43555" x2="50488" y2="40918"/>
+                        <a14:foregroundMark x1="50488" y1="40918" x2="59961" y2="41211"/>
+                        <a14:foregroundMark x1="59961" y1="41211" x2="79492" y2="34961"/>
+                        <a14:foregroundMark x1="79492" y1="34961" x2="79395" y2="39063"/>
+                        <a14:foregroundMark x1="57715" y1="33301" x2="56934" y2="42969"/>
+                        <a14:foregroundMark x1="70703" y1="34180" x2="80664" y2="30566"/>
+                        <a14:foregroundMark x1="80664" y1="30566" x2="80957" y2="30273"/>
+                        <a14:foregroundMark x1="23535" y1="60449" x2="72754" y2="47070"/>
+                        <a14:foregroundMark x1="77344" y1="46289" x2="81738" y2="51367"/>
+                      </a14:backgroundRemoval>
+                    </a14:imgEffect>
+                  </a14:imgLayer>
+                </a14:imgProps>
+              </a:ext>
+              <a:ext uri="{28A0092B-C50C-407E-A947-70E740481C1C}">
+                <a14:useLocalDpi xmlns:a14="http://schemas.microsoft.com/office/drawing/2010/main" val="0"/>
+              </a:ext>
+            </a:extLst>
+          </a:blip>
+          <a:stretch>
+            <a:fillRect/>
+          </a:stretch>
+        </p:blipFill>
+        <p:spPr>
+          <a:xfrm>
             <a:off x="3582989" y="2109049"/>
             <a:ext cx="473560" cy="473560"/>
           </a:xfrm>
@@ -6001,7 +6506,7 @@
 </p:sld>
 </file>
 
-<file path=ppt/slides/slide4.xml><?xml version="1.0" encoding="utf-8"?>
+<file path=ppt/slides/slide5.xml><?xml version="1.0" encoding="utf-8"?>
 <p:sld xmlns:a="http://schemas.openxmlformats.org/drawingml/2006/main" xmlns:r="http://schemas.openxmlformats.org/officeDocument/2006/relationships" xmlns:p="http://schemas.openxmlformats.org/presentationml/2006/main">
   <p:cSld>
     <p:spTree>
@@ -6084,7 +6589,7 @@
 </p:sld>
 </file>
 
-<file path=ppt/slides/slide5.xml><?xml version="1.0" encoding="utf-8"?>
+<file path=ppt/slides/slide6.xml><?xml version="1.0" encoding="utf-8"?>
 <p:sld xmlns:a="http://schemas.openxmlformats.org/drawingml/2006/main" xmlns:r="http://schemas.openxmlformats.org/officeDocument/2006/relationships" xmlns:p="http://schemas.openxmlformats.org/presentationml/2006/main">
   <p:cSld>
     <p:spTree>
@@ -6181,7 +6686,7 @@
         </p:blipFill>
         <p:spPr>
           <a:xfrm>
-            <a:off x="163496" y="1923017"/>
+            <a:off x="163496" y="1930832"/>
             <a:ext cx="2954417" cy="2181529"/>
           </a:xfrm>
           <a:prstGeom prst="rect">
@@ -6226,7 +6731,7 @@
         </p:blipFill>
         <p:spPr>
           <a:xfrm>
-            <a:off x="4672271" y="1923018"/>
+            <a:off x="4672271" y="1930833"/>
             <a:ext cx="3600953" cy="2181529"/>
           </a:xfrm>
           <a:prstGeom prst="rect">
@@ -6244,6 +6749,7 @@
             </a:extLst>
           </p:cNvPr>
           <p:cNvCxnSpPr>
+            <a:cxnSpLocks/>
             <a:stCxn id="5" idx="3"/>
             <a:endCxn id="6" idx="1"/>
           </p:cNvCxnSpPr>
@@ -6251,7 +6757,7 @@
         </p:nvCxnSpPr>
         <p:spPr>
           <a:xfrm>
-            <a:off x="3117913" y="3013782"/>
+            <a:off x="3117913" y="3021597"/>
             <a:ext cx="1554358" cy="1"/>
           </a:xfrm>
           <a:prstGeom prst="straightConnector1">
@@ -6326,7 +6832,7 @@
         </p:nvSpPr>
         <p:spPr>
           <a:xfrm>
-            <a:off x="9827582" y="1923018"/>
+            <a:off x="9827582" y="1930833"/>
             <a:ext cx="2200922" cy="2181529"/>
           </a:xfrm>
           <a:prstGeom prst="flowChartProcess">
@@ -6383,7 +6889,7 @@
         </p:nvCxnSpPr>
         <p:spPr>
           <a:xfrm>
-            <a:off x="8273224" y="3013783"/>
+            <a:off x="8273224" y="3021598"/>
             <a:ext cx="1554358" cy="0"/>
           </a:xfrm>
           <a:prstGeom prst="straightConnector1">
@@ -6427,7 +6933,7 @@
 </p:sld>
 </file>
 
-<file path=ppt/slides/slide6.xml><?xml version="1.0" encoding="utf-8"?>
+<file path=ppt/slides/slide7.xml><?xml version="1.0" encoding="utf-8"?>
 <p:sld xmlns:a="http://schemas.openxmlformats.org/drawingml/2006/main" xmlns:r="http://schemas.openxmlformats.org/officeDocument/2006/relationships" xmlns:p="http://schemas.openxmlformats.org/presentationml/2006/main">
   <p:cSld>
     <p:spTree>
@@ -6634,7 +7140,7 @@
 </p:sld>
 </file>
 
-<file path=ppt/slides/slide7.xml><?xml version="1.0" encoding="utf-8"?>
+<file path=ppt/slides/slide8.xml><?xml version="1.0" encoding="utf-8"?>
 <p:sld xmlns:a="http://schemas.openxmlformats.org/drawingml/2006/main" xmlns:r="http://schemas.openxmlformats.org/officeDocument/2006/relationships" xmlns:p="http://schemas.openxmlformats.org/presentationml/2006/main">
   <p:cSld>
     <p:spTree>
@@ -6898,7 +7404,7 @@
 </p:sld>
 </file>
 
-<file path=ppt/slides/slide8.xml><?xml version="1.0" encoding="utf-8"?>
+<file path=ppt/slides/slide9.xml><?xml version="1.0" encoding="utf-8"?>
 <p:sld xmlns:a="http://schemas.openxmlformats.org/drawingml/2006/main" xmlns:r="http://schemas.openxmlformats.org/officeDocument/2006/relationships" xmlns:p="http://schemas.openxmlformats.org/presentationml/2006/main">
   <p:cSld>
     <p:spTree>
@@ -7159,270 +7665,6 @@
     <p:extLst>
       <p:ext uri="{BB962C8B-B14F-4D97-AF65-F5344CB8AC3E}">
         <p14:creationId xmlns:p14="http://schemas.microsoft.com/office/powerpoint/2010/main" val="1935979333"/>
-      </p:ext>
-    </p:extLst>
-  </p:cSld>
-  <p:clrMapOvr>
-    <a:masterClrMapping/>
-  </p:clrMapOvr>
-</p:sld>
-</file>
-
-<file path=ppt/slides/slide9.xml><?xml version="1.0" encoding="utf-8"?>
-<p:sld xmlns:a="http://schemas.openxmlformats.org/drawingml/2006/main" xmlns:r="http://schemas.openxmlformats.org/officeDocument/2006/relationships" xmlns:p="http://schemas.openxmlformats.org/presentationml/2006/main">
-  <p:cSld>
-    <p:spTree>
-      <p:nvGrpSpPr>
-        <p:cNvPr id="1" name=""/>
-        <p:cNvGrpSpPr/>
-        <p:nvPr/>
-      </p:nvGrpSpPr>
-      <p:grpSpPr>
-        <a:xfrm>
-          <a:off x="0" y="0"/>
-          <a:ext cx="0" cy="0"/>
-          <a:chOff x="0" y="0"/>
-          <a:chExt cx="0" cy="0"/>
-        </a:xfrm>
-      </p:grpSpPr>
-      <p:pic>
-        <p:nvPicPr>
-          <p:cNvPr id="5" name="Picture 4" descr="A blue and red graph&#10;&#10;Description automatically generated with medium confidence">
-            <a:extLst>
-              <a:ext uri="{FF2B5EF4-FFF2-40B4-BE49-F238E27FC236}">
-                <a16:creationId xmlns:a16="http://schemas.microsoft.com/office/drawing/2014/main" id="{5A066BEE-C736-2228-3440-6F09BEEDCDE5}"/>
-              </a:ext>
-            </a:extLst>
-          </p:cNvPr>
-          <p:cNvPicPr>
-            <a:picLocks noChangeAspect="1"/>
-          </p:cNvPicPr>
-          <p:nvPr/>
-        </p:nvPicPr>
-        <p:blipFill>
-          <a:blip r:embed="rId2">
-            <a:extLst>
-              <a:ext uri="{28A0092B-C50C-407E-A947-70E740481C1C}">
-                <a14:useLocalDpi xmlns:a14="http://schemas.microsoft.com/office/drawing/2010/main" val="0"/>
-              </a:ext>
-            </a:extLst>
-          </a:blip>
-          <a:stretch>
-            <a:fillRect/>
-          </a:stretch>
-        </p:blipFill>
-        <p:spPr>
-          <a:xfrm>
-            <a:off x="895885" y="1371600"/>
-            <a:ext cx="4690663" cy="2743200"/>
-          </a:xfrm>
-          <a:prstGeom prst="rect">
-            <a:avLst/>
-          </a:prstGeom>
-        </p:spPr>
-      </p:pic>
-      <p:pic>
-        <p:nvPicPr>
-          <p:cNvPr id="7" name="Picture 6" descr="A blue and white screen&#10;&#10;Description automatically generated with medium confidence">
-            <a:extLst>
-              <a:ext uri="{FF2B5EF4-FFF2-40B4-BE49-F238E27FC236}">
-                <a16:creationId xmlns:a16="http://schemas.microsoft.com/office/drawing/2014/main" id="{3E897AA9-E6CF-0EF5-1E81-FB46379FE636}"/>
-              </a:ext>
-            </a:extLst>
-          </p:cNvPr>
-          <p:cNvPicPr>
-            <a:picLocks noChangeAspect="1"/>
-          </p:cNvPicPr>
-          <p:nvPr/>
-        </p:nvPicPr>
-        <p:blipFill>
-          <a:blip r:embed="rId3">
-            <a:extLst>
-              <a:ext uri="{28A0092B-C50C-407E-A947-70E740481C1C}">
-                <a14:useLocalDpi xmlns:a14="http://schemas.microsoft.com/office/drawing/2010/main" val="0"/>
-              </a:ext>
-            </a:extLst>
-          </a:blip>
-          <a:stretch>
-            <a:fillRect/>
-          </a:stretch>
-        </p:blipFill>
-        <p:spPr>
-          <a:xfrm>
-            <a:off x="895884" y="4114800"/>
-            <a:ext cx="4516159" cy="2743200"/>
-          </a:xfrm>
-          <a:prstGeom prst="rect">
-            <a:avLst/>
-          </a:prstGeom>
-        </p:spPr>
-      </p:pic>
-      <p:pic>
-        <p:nvPicPr>
-          <p:cNvPr id="9" name="Picture 8" descr="A blue screen with white lines&#10;&#10;Description automatically generated">
-            <a:extLst>
-              <a:ext uri="{FF2B5EF4-FFF2-40B4-BE49-F238E27FC236}">
-                <a16:creationId xmlns:a16="http://schemas.microsoft.com/office/drawing/2014/main" id="{4283C9BC-28B4-CCFC-49AC-F55A2761DFD4}"/>
-              </a:ext>
-            </a:extLst>
-          </p:cNvPr>
-          <p:cNvPicPr>
-            <a:picLocks noChangeAspect="1"/>
-          </p:cNvPicPr>
-          <p:nvPr/>
-        </p:nvPicPr>
-        <p:blipFill>
-          <a:blip r:embed="rId4">
-            <a:extLst>
-              <a:ext uri="{28A0092B-C50C-407E-A947-70E740481C1C}">
-                <a14:useLocalDpi xmlns:a14="http://schemas.microsoft.com/office/drawing/2010/main" val="0"/>
-              </a:ext>
-            </a:extLst>
-          </a:blip>
-          <a:stretch>
-            <a:fillRect/>
-          </a:stretch>
-        </p:blipFill>
-        <p:spPr>
-          <a:xfrm>
-            <a:off x="6655294" y="1371600"/>
-            <a:ext cx="4516159" cy="2743200"/>
-          </a:xfrm>
-          <a:prstGeom prst="rect">
-            <a:avLst/>
-          </a:prstGeom>
-        </p:spPr>
-      </p:pic>
-      <p:pic>
-        <p:nvPicPr>
-          <p:cNvPr id="11" name="Picture 10" descr="A blue screen with white lines&#10;&#10;Description automatically generated">
-            <a:extLst>
-              <a:ext uri="{FF2B5EF4-FFF2-40B4-BE49-F238E27FC236}">
-                <a16:creationId xmlns:a16="http://schemas.microsoft.com/office/drawing/2014/main" id="{170419DD-F4F4-7033-C47B-EEC047BE1D7D}"/>
-              </a:ext>
-            </a:extLst>
-          </p:cNvPr>
-          <p:cNvPicPr>
-            <a:picLocks noChangeAspect="1"/>
-          </p:cNvPicPr>
-          <p:nvPr/>
-        </p:nvPicPr>
-        <p:blipFill>
-          <a:blip r:embed="rId5">
-            <a:extLst>
-              <a:ext uri="{28A0092B-C50C-407E-A947-70E740481C1C}">
-                <a14:useLocalDpi xmlns:a14="http://schemas.microsoft.com/office/drawing/2010/main" val="0"/>
-              </a:ext>
-            </a:extLst>
-          </a:blip>
-          <a:stretch>
-            <a:fillRect/>
-          </a:stretch>
-        </p:blipFill>
-        <p:spPr>
-          <a:xfrm>
-            <a:off x="6655293" y="4114800"/>
-            <a:ext cx="4516159" cy="2743200"/>
-          </a:xfrm>
-          <a:prstGeom prst="rect">
-            <a:avLst/>
-          </a:prstGeom>
-        </p:spPr>
-      </p:pic>
-      <p:sp>
-        <p:nvSpPr>
-          <p:cNvPr id="2" name="Title 1">
-            <a:extLst>
-              <a:ext uri="{FF2B5EF4-FFF2-40B4-BE49-F238E27FC236}">
-                <a16:creationId xmlns:a16="http://schemas.microsoft.com/office/drawing/2014/main" id="{52A374CE-A32F-D188-5958-2820E4BDC9D9}"/>
-              </a:ext>
-            </a:extLst>
-          </p:cNvPr>
-          <p:cNvSpPr txBox="1">
-            <a:spLocks/>
-          </p:cNvSpPr>
-          <p:nvPr/>
-        </p:nvSpPr>
-        <p:spPr>
-          <a:xfrm>
-            <a:off x="838200" y="107673"/>
-            <a:ext cx="10515600" cy="904382"/>
-          </a:xfrm>
-          <a:prstGeom prst="rect">
-            <a:avLst/>
-          </a:prstGeom>
-        </p:spPr>
-        <p:txBody>
-          <a:bodyPr vert="horz" lIns="91440" tIns="45720" rIns="91440" bIns="45720" rtlCol="0" anchor="b">
-            <a:normAutofit lnSpcReduction="10000"/>
-          </a:bodyPr>
-          <a:lstStyle>
-            <a:lvl1pPr algn="ctr" defTabSz="914400" rtl="0" eaLnBrk="1" latinLnBrk="0" hangingPunct="1">
-              <a:lnSpc>
-                <a:spcPct val="90000"/>
-              </a:lnSpc>
-              <a:spcBef>
-                <a:spcPct val="0"/>
-              </a:spcBef>
-              <a:buNone/>
-              <a:defRPr sz="6000" kern="1200">
-                <a:solidFill>
-                  <a:schemeClr val="tx1"/>
-                </a:solidFill>
-                <a:latin typeface="+mj-lt"/>
-                <a:ea typeface="+mj-ea"/>
-                <a:cs typeface="+mj-cs"/>
-              </a:defRPr>
-            </a:lvl1pPr>
-          </a:lstStyle>
-          <a:p>
-            <a:r>
-              <a:rPr lang="en-US" dirty="0"/>
-              <a:t>Explore/Visualize the Data</a:t>
-            </a:r>
-          </a:p>
-        </p:txBody>
-      </p:sp>
-      <p:cxnSp>
-        <p:nvCxnSpPr>
-          <p:cNvPr id="3" name="Straight Connector 2">
-            <a:extLst>
-              <a:ext uri="{FF2B5EF4-FFF2-40B4-BE49-F238E27FC236}">
-                <a16:creationId xmlns:a16="http://schemas.microsoft.com/office/drawing/2014/main" id="{69F028A0-17F1-DE2C-397E-311FD527E14F}"/>
-              </a:ext>
-            </a:extLst>
-          </p:cNvPr>
-          <p:cNvCxnSpPr/>
-          <p:nvPr/>
-        </p:nvCxnSpPr>
-        <p:spPr>
-          <a:xfrm>
-            <a:off x="5930283" y="1340528"/>
-            <a:ext cx="0" cy="5255581"/>
-          </a:xfrm>
-          <a:prstGeom prst="line">
-            <a:avLst/>
-          </a:prstGeom>
-        </p:spPr>
-        <p:style>
-          <a:lnRef idx="2">
-            <a:schemeClr val="accent1"/>
-          </a:lnRef>
-          <a:fillRef idx="0">
-            <a:schemeClr val="accent1"/>
-          </a:fillRef>
-          <a:effectRef idx="1">
-            <a:schemeClr val="accent1"/>
-          </a:effectRef>
-          <a:fontRef idx="minor">
-            <a:schemeClr val="tx1"/>
-          </a:fontRef>
-        </p:style>
-      </p:cxnSp>
-    </p:spTree>
-    <p:extLst>
-      <p:ext uri="{BB962C8B-B14F-4D97-AF65-F5344CB8AC3E}">
-        <p14:creationId xmlns:p14="http://schemas.microsoft.com/office/powerpoint/2010/main" val="2066331840"/>
       </p:ext>
     </p:extLst>
   </p:cSld>

</xml_diff>